<commit_message>
changes to writeup and install file
</commit_message>
<xml_diff>
--- a/Writeup/Page designs.pptx
+++ b/Writeup/Page designs.pptx
@@ -5,7 +5,7 @@
     <p:sldMasterId id="2147483648" r:id="rId1"/>
   </p:sldMasterIdLst>
   <p:notesMasterIdLst>
-    <p:notesMasterId r:id="rId14"/>
+    <p:notesMasterId r:id="rId18"/>
   </p:notesMasterIdLst>
   <p:sldIdLst>
     <p:sldId id="257" r:id="rId2"/>
@@ -14,12 +14,16 @@
     <p:sldId id="267" r:id="rId5"/>
     <p:sldId id="259" r:id="rId6"/>
     <p:sldId id="260" r:id="rId7"/>
-    <p:sldId id="261" r:id="rId8"/>
-    <p:sldId id="262" r:id="rId9"/>
-    <p:sldId id="263" r:id="rId10"/>
-    <p:sldId id="264" r:id="rId11"/>
-    <p:sldId id="265" r:id="rId12"/>
-    <p:sldId id="266" r:id="rId13"/>
+    <p:sldId id="269" r:id="rId8"/>
+    <p:sldId id="261" r:id="rId9"/>
+    <p:sldId id="268" r:id="rId10"/>
+    <p:sldId id="262" r:id="rId11"/>
+    <p:sldId id="263" r:id="rId12"/>
+    <p:sldId id="264" r:id="rId13"/>
+    <p:sldId id="265" r:id="rId14"/>
+    <p:sldId id="266" r:id="rId15"/>
+    <p:sldId id="270" r:id="rId16"/>
+    <p:sldId id="272" r:id="rId17"/>
   </p:sldIdLst>
   <p:sldSz cx="12192000" cy="6858000"/>
   <p:notesSz cx="6858000" cy="9144000"/>
@@ -635,6 +639,258 @@
     <p:extLst>
       <p:ext uri="{BB962C8B-B14F-4D97-AF65-F5344CB8AC3E}">
         <p14:creationId xmlns:p14="http://schemas.microsoft.com/office/powerpoint/2010/main" val="1686399043"/>
+      </p:ext>
+    </p:extLst>
+  </p:cSld>
+  <p:clrMapOvr>
+    <a:masterClrMapping/>
+  </p:clrMapOvr>
+</p:notes>
+</file>
+
+<file path=ppt/notesSlides/notesSlide3.xml><?xml version="1.0" encoding="utf-8"?>
+<p:notes xmlns:a="http://schemas.openxmlformats.org/drawingml/2006/main" xmlns:r="http://schemas.openxmlformats.org/officeDocument/2006/relationships" xmlns:p="http://schemas.openxmlformats.org/presentationml/2006/main">
+  <p:cSld>
+    <p:spTree>
+      <p:nvGrpSpPr>
+        <p:cNvPr id="1" name=""/>
+        <p:cNvGrpSpPr/>
+        <p:nvPr/>
+      </p:nvGrpSpPr>
+      <p:grpSpPr>
+        <a:xfrm>
+          <a:off x="0" y="0"/>
+          <a:ext cx="0" cy="0"/>
+          <a:chOff x="0" y="0"/>
+          <a:chExt cx="0" cy="0"/>
+        </a:xfrm>
+      </p:grpSpPr>
+      <p:sp>
+        <p:nvSpPr>
+          <p:cNvPr id="2" name="Slide Image Placeholder 1"/>
+          <p:cNvSpPr>
+            <a:spLocks noGrp="1" noRot="1" noChangeAspect="1"/>
+          </p:cNvSpPr>
+          <p:nvPr>
+            <p:ph type="sldImg"/>
+          </p:nvPr>
+        </p:nvSpPr>
+        <p:spPr/>
+      </p:sp>
+      <p:sp>
+        <p:nvSpPr>
+          <p:cNvPr id="3" name="Notes Placeholder 2"/>
+          <p:cNvSpPr>
+            <a:spLocks noGrp="1"/>
+          </p:cNvSpPr>
+          <p:nvPr>
+            <p:ph type="body" idx="1"/>
+          </p:nvPr>
+        </p:nvSpPr>
+        <p:spPr/>
+        <p:txBody>
+          <a:bodyPr/>
+          <a:lstStyle/>
+          <a:p>
+            <a:endParaRPr lang="en-GB" dirty="0"/>
+          </a:p>
+        </p:txBody>
+      </p:sp>
+      <p:sp>
+        <p:nvSpPr>
+          <p:cNvPr id="4" name="Slide Number Placeholder 3"/>
+          <p:cNvSpPr>
+            <a:spLocks noGrp="1"/>
+          </p:cNvSpPr>
+          <p:nvPr>
+            <p:ph type="sldNum" sz="quarter" idx="5"/>
+          </p:nvPr>
+        </p:nvSpPr>
+        <p:spPr/>
+        <p:txBody>
+          <a:bodyPr/>
+          <a:lstStyle/>
+          <a:p>
+            <a:fld id="{C74020FE-8C96-4489-AA9C-8781786544CA}" type="slidenum">
+              <a:rPr lang="en-GB" smtClean="0"/>
+              <a:t>7</a:t>
+            </a:fld>
+            <a:endParaRPr lang="en-GB"/>
+          </a:p>
+        </p:txBody>
+      </p:sp>
+    </p:spTree>
+    <p:extLst>
+      <p:ext uri="{BB962C8B-B14F-4D97-AF65-F5344CB8AC3E}">
+        <p14:creationId xmlns:p14="http://schemas.microsoft.com/office/powerpoint/2010/main" val="3985909965"/>
+      </p:ext>
+    </p:extLst>
+  </p:cSld>
+  <p:clrMapOvr>
+    <a:masterClrMapping/>
+  </p:clrMapOvr>
+</p:notes>
+</file>
+
+<file path=ppt/notesSlides/notesSlide4.xml><?xml version="1.0" encoding="utf-8"?>
+<p:notes xmlns:a="http://schemas.openxmlformats.org/drawingml/2006/main" xmlns:r="http://schemas.openxmlformats.org/officeDocument/2006/relationships" xmlns:p="http://schemas.openxmlformats.org/presentationml/2006/main">
+  <p:cSld>
+    <p:spTree>
+      <p:nvGrpSpPr>
+        <p:cNvPr id="1" name=""/>
+        <p:cNvGrpSpPr/>
+        <p:nvPr/>
+      </p:nvGrpSpPr>
+      <p:grpSpPr>
+        <a:xfrm>
+          <a:off x="0" y="0"/>
+          <a:ext cx="0" cy="0"/>
+          <a:chOff x="0" y="0"/>
+          <a:chExt cx="0" cy="0"/>
+        </a:xfrm>
+      </p:grpSpPr>
+      <p:sp>
+        <p:nvSpPr>
+          <p:cNvPr id="2" name="Slide Image Placeholder 1"/>
+          <p:cNvSpPr>
+            <a:spLocks noGrp="1" noRot="1" noChangeAspect="1"/>
+          </p:cNvSpPr>
+          <p:nvPr>
+            <p:ph type="sldImg"/>
+          </p:nvPr>
+        </p:nvSpPr>
+        <p:spPr/>
+      </p:sp>
+      <p:sp>
+        <p:nvSpPr>
+          <p:cNvPr id="3" name="Notes Placeholder 2"/>
+          <p:cNvSpPr>
+            <a:spLocks noGrp="1"/>
+          </p:cNvSpPr>
+          <p:nvPr>
+            <p:ph type="body" idx="1"/>
+          </p:nvPr>
+        </p:nvSpPr>
+        <p:spPr/>
+        <p:txBody>
+          <a:bodyPr/>
+          <a:lstStyle/>
+          <a:p>
+            <a:endParaRPr lang="en-GB" dirty="0"/>
+          </a:p>
+        </p:txBody>
+      </p:sp>
+      <p:sp>
+        <p:nvSpPr>
+          <p:cNvPr id="4" name="Slide Number Placeholder 3"/>
+          <p:cNvSpPr>
+            <a:spLocks noGrp="1"/>
+          </p:cNvSpPr>
+          <p:nvPr>
+            <p:ph type="sldNum" sz="quarter" idx="5"/>
+          </p:nvPr>
+        </p:nvSpPr>
+        <p:spPr/>
+        <p:txBody>
+          <a:bodyPr/>
+          <a:lstStyle/>
+          <a:p>
+            <a:fld id="{C74020FE-8C96-4489-AA9C-8781786544CA}" type="slidenum">
+              <a:rPr lang="en-GB" smtClean="0"/>
+              <a:t>9</a:t>
+            </a:fld>
+            <a:endParaRPr lang="en-GB"/>
+          </a:p>
+        </p:txBody>
+      </p:sp>
+    </p:spTree>
+    <p:extLst>
+      <p:ext uri="{BB962C8B-B14F-4D97-AF65-F5344CB8AC3E}">
+        <p14:creationId xmlns:p14="http://schemas.microsoft.com/office/powerpoint/2010/main" val="3068334325"/>
+      </p:ext>
+    </p:extLst>
+  </p:cSld>
+  <p:clrMapOvr>
+    <a:masterClrMapping/>
+  </p:clrMapOvr>
+</p:notes>
+</file>
+
+<file path=ppt/notesSlides/notesSlide5.xml><?xml version="1.0" encoding="utf-8"?>
+<p:notes xmlns:a="http://schemas.openxmlformats.org/drawingml/2006/main" xmlns:r="http://schemas.openxmlformats.org/officeDocument/2006/relationships" xmlns:p="http://schemas.openxmlformats.org/presentationml/2006/main">
+  <p:cSld>
+    <p:spTree>
+      <p:nvGrpSpPr>
+        <p:cNvPr id="1" name=""/>
+        <p:cNvGrpSpPr/>
+        <p:nvPr/>
+      </p:nvGrpSpPr>
+      <p:grpSpPr>
+        <a:xfrm>
+          <a:off x="0" y="0"/>
+          <a:ext cx="0" cy="0"/>
+          <a:chOff x="0" y="0"/>
+          <a:chExt cx="0" cy="0"/>
+        </a:xfrm>
+      </p:grpSpPr>
+      <p:sp>
+        <p:nvSpPr>
+          <p:cNvPr id="2" name="Slide Image Placeholder 1"/>
+          <p:cNvSpPr>
+            <a:spLocks noGrp="1" noRot="1" noChangeAspect="1"/>
+          </p:cNvSpPr>
+          <p:nvPr>
+            <p:ph type="sldImg"/>
+          </p:nvPr>
+        </p:nvSpPr>
+        <p:spPr/>
+      </p:sp>
+      <p:sp>
+        <p:nvSpPr>
+          <p:cNvPr id="3" name="Notes Placeholder 2"/>
+          <p:cNvSpPr>
+            <a:spLocks noGrp="1"/>
+          </p:cNvSpPr>
+          <p:nvPr>
+            <p:ph type="body" idx="1"/>
+          </p:nvPr>
+        </p:nvSpPr>
+        <p:spPr/>
+        <p:txBody>
+          <a:bodyPr/>
+          <a:lstStyle/>
+          <a:p>
+            <a:endParaRPr lang="en-GB" dirty="0"/>
+          </a:p>
+        </p:txBody>
+      </p:sp>
+      <p:sp>
+        <p:nvSpPr>
+          <p:cNvPr id="4" name="Slide Number Placeholder 3"/>
+          <p:cNvSpPr>
+            <a:spLocks noGrp="1"/>
+          </p:cNvSpPr>
+          <p:nvPr>
+            <p:ph type="sldNum" sz="quarter" idx="5"/>
+          </p:nvPr>
+        </p:nvSpPr>
+        <p:spPr/>
+        <p:txBody>
+          <a:bodyPr/>
+          <a:lstStyle/>
+          <a:p>
+            <a:fld id="{C74020FE-8C96-4489-AA9C-8781786544CA}" type="slidenum">
+              <a:rPr lang="en-GB" smtClean="0"/>
+              <a:t>16</a:t>
+            </a:fld>
+            <a:endParaRPr lang="en-GB"/>
+          </a:p>
+        </p:txBody>
+      </p:sp>
+    </p:spTree>
+    <p:extLst>
+      <p:ext uri="{BB962C8B-B14F-4D97-AF65-F5344CB8AC3E}">
+        <p14:creationId xmlns:p14="http://schemas.microsoft.com/office/powerpoint/2010/main" val="3526703631"/>
       </p:ext>
     </p:extLst>
   </p:cSld>
@@ -3960,7 +4216,7 @@
           <a:p>
             <a:r>
               <a:rPr lang="en-GB" dirty="0"/>
-              <a:t>About us</a:t>
+              <a:t>Login page</a:t>
             </a:r>
           </a:p>
         </p:txBody>
@@ -3968,7 +4224,7 @@
     </p:spTree>
     <p:extLst>
       <p:ext uri="{BB962C8B-B14F-4D97-AF65-F5344CB8AC3E}">
-        <p14:creationId xmlns:p14="http://schemas.microsoft.com/office/powerpoint/2010/main" val="2570558528"/>
+        <p14:creationId xmlns:p14="http://schemas.microsoft.com/office/powerpoint/2010/main" val="2292907489"/>
       </p:ext>
     </p:extLst>
   </p:cSld>
@@ -4018,7 +4274,7 @@
           <a:p>
             <a:r>
               <a:rPr lang="en-GB" dirty="0"/>
-              <a:t>Shop</a:t>
+              <a:t>Sign up page</a:t>
             </a:r>
           </a:p>
         </p:txBody>
@@ -4026,7 +4282,7 @@
     </p:spTree>
     <p:extLst>
       <p:ext uri="{BB962C8B-B14F-4D97-AF65-F5344CB8AC3E}">
-        <p14:creationId xmlns:p14="http://schemas.microsoft.com/office/powerpoint/2010/main" val="3384611430"/>
+        <p14:creationId xmlns:p14="http://schemas.microsoft.com/office/powerpoint/2010/main" val="2088973411"/>
       </p:ext>
     </p:extLst>
   </p:cSld>
@@ -4076,6 +4332,122 @@
           <a:p>
             <a:r>
               <a:rPr lang="en-GB" dirty="0"/>
+              <a:t>About us</a:t>
+            </a:r>
+          </a:p>
+        </p:txBody>
+      </p:sp>
+    </p:spTree>
+    <p:extLst>
+      <p:ext uri="{BB962C8B-B14F-4D97-AF65-F5344CB8AC3E}">
+        <p14:creationId xmlns:p14="http://schemas.microsoft.com/office/powerpoint/2010/main" val="2570558528"/>
+      </p:ext>
+    </p:extLst>
+  </p:cSld>
+  <p:clrMapOvr>
+    <a:masterClrMapping/>
+  </p:clrMapOvr>
+</p:sld>
+</file>
+
+<file path=ppt/slides/slide13.xml><?xml version="1.0" encoding="utf-8"?>
+<p:sld xmlns:a="http://schemas.openxmlformats.org/drawingml/2006/main" xmlns:r="http://schemas.openxmlformats.org/officeDocument/2006/relationships" xmlns:p="http://schemas.openxmlformats.org/presentationml/2006/main">
+  <p:cSld>
+    <p:spTree>
+      <p:nvGrpSpPr>
+        <p:cNvPr id="1" name=""/>
+        <p:cNvGrpSpPr/>
+        <p:nvPr/>
+      </p:nvGrpSpPr>
+      <p:grpSpPr>
+        <a:xfrm>
+          <a:off x="0" y="0"/>
+          <a:ext cx="0" cy="0"/>
+          <a:chOff x="0" y="0"/>
+          <a:chExt cx="0" cy="0"/>
+        </a:xfrm>
+      </p:grpSpPr>
+      <p:sp>
+        <p:nvSpPr>
+          <p:cNvPr id="2" name="Title 1">
+            <a:extLst>
+              <a:ext uri="{FF2B5EF4-FFF2-40B4-BE49-F238E27FC236}">
+                <a16:creationId xmlns:a16="http://schemas.microsoft.com/office/drawing/2014/main" id="{587A13A3-98F1-A632-56E3-7D2561130BE8}"/>
+              </a:ext>
+            </a:extLst>
+          </p:cNvPr>
+          <p:cNvSpPr>
+            <a:spLocks noGrp="1"/>
+          </p:cNvSpPr>
+          <p:nvPr>
+            <p:ph type="title"/>
+          </p:nvPr>
+        </p:nvSpPr>
+        <p:spPr/>
+        <p:txBody>
+          <a:bodyPr/>
+          <a:lstStyle/>
+          <a:p>
+            <a:r>
+              <a:rPr lang="en-GB" dirty="0"/>
+              <a:t>Online Shop</a:t>
+            </a:r>
+          </a:p>
+        </p:txBody>
+      </p:sp>
+    </p:spTree>
+    <p:extLst>
+      <p:ext uri="{BB962C8B-B14F-4D97-AF65-F5344CB8AC3E}">
+        <p14:creationId xmlns:p14="http://schemas.microsoft.com/office/powerpoint/2010/main" val="3384611430"/>
+      </p:ext>
+    </p:extLst>
+  </p:cSld>
+  <p:clrMapOvr>
+    <a:masterClrMapping/>
+  </p:clrMapOvr>
+</p:sld>
+</file>
+
+<file path=ppt/slides/slide14.xml><?xml version="1.0" encoding="utf-8"?>
+<p:sld xmlns:a="http://schemas.openxmlformats.org/drawingml/2006/main" xmlns:r="http://schemas.openxmlformats.org/officeDocument/2006/relationships" xmlns:p="http://schemas.openxmlformats.org/presentationml/2006/main">
+  <p:cSld>
+    <p:spTree>
+      <p:nvGrpSpPr>
+        <p:cNvPr id="1" name=""/>
+        <p:cNvGrpSpPr/>
+        <p:nvPr/>
+      </p:nvGrpSpPr>
+      <p:grpSpPr>
+        <a:xfrm>
+          <a:off x="0" y="0"/>
+          <a:ext cx="0" cy="0"/>
+          <a:chOff x="0" y="0"/>
+          <a:chExt cx="0" cy="0"/>
+        </a:xfrm>
+      </p:grpSpPr>
+      <p:sp>
+        <p:nvSpPr>
+          <p:cNvPr id="2" name="Title 1">
+            <a:extLst>
+              <a:ext uri="{FF2B5EF4-FFF2-40B4-BE49-F238E27FC236}">
+                <a16:creationId xmlns:a16="http://schemas.microsoft.com/office/drawing/2014/main" id="{587A13A3-98F1-A632-56E3-7D2561130BE8}"/>
+              </a:ext>
+            </a:extLst>
+          </p:cNvPr>
+          <p:cNvSpPr>
+            <a:spLocks noGrp="1"/>
+          </p:cNvSpPr>
+          <p:nvPr>
+            <p:ph type="title"/>
+          </p:nvPr>
+        </p:nvSpPr>
+        <p:spPr/>
+        <p:txBody>
+          <a:bodyPr/>
+          <a:lstStyle/>
+          <a:p>
+            <a:r>
+              <a:rPr lang="en-GB" dirty="0"/>
               <a:t>Add users</a:t>
             </a:r>
           </a:p>
@@ -4085,6 +4457,698 @@
     <p:extLst>
       <p:ext uri="{BB962C8B-B14F-4D97-AF65-F5344CB8AC3E}">
         <p14:creationId xmlns:p14="http://schemas.microsoft.com/office/powerpoint/2010/main" val="1398335402"/>
+      </p:ext>
+    </p:extLst>
+  </p:cSld>
+  <p:clrMapOvr>
+    <a:masterClrMapping/>
+  </p:clrMapOvr>
+</p:sld>
+</file>
+
+<file path=ppt/slides/slide15.xml><?xml version="1.0" encoding="utf-8"?>
+<p:sld xmlns:a="http://schemas.openxmlformats.org/drawingml/2006/main" xmlns:r="http://schemas.openxmlformats.org/officeDocument/2006/relationships" xmlns:p="http://schemas.openxmlformats.org/presentationml/2006/main">
+  <p:cSld>
+    <p:spTree>
+      <p:nvGrpSpPr>
+        <p:cNvPr id="1" name=""/>
+        <p:cNvGrpSpPr/>
+        <p:nvPr/>
+      </p:nvGrpSpPr>
+      <p:grpSpPr>
+        <a:xfrm>
+          <a:off x="0" y="0"/>
+          <a:ext cx="0" cy="0"/>
+          <a:chOff x="0" y="0"/>
+          <a:chExt cx="0" cy="0"/>
+        </a:xfrm>
+      </p:grpSpPr>
+      <p:sp>
+        <p:nvSpPr>
+          <p:cNvPr id="2" name="Title 1">
+            <a:extLst>
+              <a:ext uri="{FF2B5EF4-FFF2-40B4-BE49-F238E27FC236}">
+                <a16:creationId xmlns:a16="http://schemas.microsoft.com/office/drawing/2014/main" id="{587A13A3-98F1-A632-56E3-7D2561130BE8}"/>
+              </a:ext>
+            </a:extLst>
+          </p:cNvPr>
+          <p:cNvSpPr>
+            <a:spLocks noGrp="1"/>
+          </p:cNvSpPr>
+          <p:nvPr>
+            <p:ph type="title"/>
+          </p:nvPr>
+        </p:nvSpPr>
+        <p:spPr/>
+        <p:txBody>
+          <a:bodyPr/>
+          <a:lstStyle/>
+          <a:p>
+            <a:r>
+              <a:rPr lang="en-GB" dirty="0"/>
+              <a:t>Checkout system</a:t>
+            </a:r>
+          </a:p>
+        </p:txBody>
+      </p:sp>
+    </p:spTree>
+    <p:extLst>
+      <p:ext uri="{BB962C8B-B14F-4D97-AF65-F5344CB8AC3E}">
+        <p14:creationId xmlns:p14="http://schemas.microsoft.com/office/powerpoint/2010/main" val="560281624"/>
+      </p:ext>
+    </p:extLst>
+  </p:cSld>
+  <p:clrMapOvr>
+    <a:masterClrMapping/>
+  </p:clrMapOvr>
+</p:sld>
+</file>
+
+<file path=ppt/slides/slide16.xml><?xml version="1.0" encoding="utf-8"?>
+<p:sld xmlns:a="http://schemas.openxmlformats.org/drawingml/2006/main" xmlns:r="http://schemas.openxmlformats.org/officeDocument/2006/relationships" xmlns:p="http://schemas.openxmlformats.org/presentationml/2006/main">
+  <p:cSld>
+    <p:spTree>
+      <p:nvGrpSpPr>
+        <p:cNvPr id="1" name=""/>
+        <p:cNvGrpSpPr/>
+        <p:nvPr/>
+      </p:nvGrpSpPr>
+      <p:grpSpPr>
+        <a:xfrm>
+          <a:off x="0" y="0"/>
+          <a:ext cx="0" cy="0"/>
+          <a:chOff x="0" y="0"/>
+          <a:chExt cx="0" cy="0"/>
+        </a:xfrm>
+      </p:grpSpPr>
+      <p:sp>
+        <p:nvSpPr>
+          <p:cNvPr id="4" name="Rectangle 3">
+            <a:extLst>
+              <a:ext uri="{FF2B5EF4-FFF2-40B4-BE49-F238E27FC236}">
+                <a16:creationId xmlns:a16="http://schemas.microsoft.com/office/drawing/2014/main" id="{9DF92B7C-3248-8476-5639-82C1CDFBFA0C}"/>
+              </a:ext>
+            </a:extLst>
+          </p:cNvPr>
+          <p:cNvSpPr/>
+          <p:nvPr/>
+        </p:nvSpPr>
+        <p:spPr>
+          <a:xfrm>
+            <a:off x="0" y="0"/>
+            <a:ext cx="12192000" cy="1060255"/>
+          </a:xfrm>
+          <a:prstGeom prst="rect">
+            <a:avLst/>
+          </a:prstGeom>
+        </p:spPr>
+        <p:style>
+          <a:lnRef idx="2">
+            <a:schemeClr val="accent1">
+              <a:shade val="15000"/>
+            </a:schemeClr>
+          </a:lnRef>
+          <a:fillRef idx="1">
+            <a:schemeClr val="accent1"/>
+          </a:fillRef>
+          <a:effectRef idx="0">
+            <a:schemeClr val="accent1"/>
+          </a:effectRef>
+          <a:fontRef idx="minor">
+            <a:schemeClr val="lt1"/>
+          </a:fontRef>
+        </p:style>
+        <p:txBody>
+          <a:bodyPr rtlCol="0" anchor="ctr"/>
+          <a:lstStyle/>
+          <a:p>
+            <a:pPr algn="ctr"/>
+            <a:endParaRPr lang="en-GB"/>
+          </a:p>
+        </p:txBody>
+      </p:sp>
+      <p:sp>
+        <p:nvSpPr>
+          <p:cNvPr id="5" name="Rectangle 4">
+            <a:extLst>
+              <a:ext uri="{FF2B5EF4-FFF2-40B4-BE49-F238E27FC236}">
+                <a16:creationId xmlns:a16="http://schemas.microsoft.com/office/drawing/2014/main" id="{CD2803DB-E044-51FC-403D-F08AE77A7E99}"/>
+              </a:ext>
+            </a:extLst>
+          </p:cNvPr>
+          <p:cNvSpPr/>
+          <p:nvPr/>
+        </p:nvSpPr>
+        <p:spPr>
+          <a:xfrm>
+            <a:off x="10210799" y="126219"/>
+            <a:ext cx="1851238" cy="807813"/>
+          </a:xfrm>
+          <a:prstGeom prst="rect">
+            <a:avLst/>
+          </a:prstGeom>
+          <a:solidFill>
+            <a:schemeClr val="bg1"/>
+          </a:solidFill>
+          <a:ln>
+            <a:solidFill>
+              <a:schemeClr val="bg1"/>
+            </a:solidFill>
+          </a:ln>
+        </p:spPr>
+        <p:style>
+          <a:lnRef idx="2">
+            <a:schemeClr val="accent1">
+              <a:shade val="15000"/>
+            </a:schemeClr>
+          </a:lnRef>
+          <a:fillRef idx="1">
+            <a:schemeClr val="accent1"/>
+          </a:fillRef>
+          <a:effectRef idx="0">
+            <a:schemeClr val="accent1"/>
+          </a:effectRef>
+          <a:fontRef idx="minor">
+            <a:schemeClr val="lt1"/>
+          </a:fontRef>
+        </p:style>
+        <p:txBody>
+          <a:bodyPr rtlCol="0" anchor="ctr"/>
+          <a:lstStyle/>
+          <a:p>
+            <a:pPr algn="ctr"/>
+            <a:r>
+              <a:rPr lang="en-GB" dirty="0">
+                <a:ln>
+                  <a:solidFill>
+                    <a:schemeClr val="tx1"/>
+                  </a:solidFill>
+                </a:ln>
+                <a:solidFill>
+                  <a:sysClr val="windowText" lastClr="000000"/>
+                </a:solidFill>
+              </a:rPr>
+              <a:t>My account</a:t>
+            </a:r>
+          </a:p>
+        </p:txBody>
+      </p:sp>
+      <p:sp>
+        <p:nvSpPr>
+          <p:cNvPr id="7" name="Rectangle 6">
+            <a:extLst>
+              <a:ext uri="{FF2B5EF4-FFF2-40B4-BE49-F238E27FC236}">
+                <a16:creationId xmlns:a16="http://schemas.microsoft.com/office/drawing/2014/main" id="{1B235E0F-009B-1013-6831-46A3F03BD58E}"/>
+              </a:ext>
+            </a:extLst>
+          </p:cNvPr>
+          <p:cNvSpPr/>
+          <p:nvPr/>
+        </p:nvSpPr>
+        <p:spPr>
+          <a:xfrm>
+            <a:off x="2163516" y="126216"/>
+            <a:ext cx="1684816" cy="807813"/>
+          </a:xfrm>
+          <a:prstGeom prst="rect">
+            <a:avLst/>
+          </a:prstGeom>
+          <a:solidFill>
+            <a:schemeClr val="bg1"/>
+          </a:solidFill>
+          <a:ln>
+            <a:solidFill>
+              <a:schemeClr val="bg1"/>
+            </a:solidFill>
+          </a:ln>
+        </p:spPr>
+        <p:style>
+          <a:lnRef idx="2">
+            <a:schemeClr val="accent1">
+              <a:shade val="15000"/>
+            </a:schemeClr>
+          </a:lnRef>
+          <a:fillRef idx="1">
+            <a:schemeClr val="accent1"/>
+          </a:fillRef>
+          <a:effectRef idx="0">
+            <a:schemeClr val="accent1"/>
+          </a:effectRef>
+          <a:fontRef idx="minor">
+            <a:schemeClr val="lt1"/>
+          </a:fontRef>
+        </p:style>
+        <p:txBody>
+          <a:bodyPr rtlCol="0" anchor="ctr"/>
+          <a:lstStyle/>
+          <a:p>
+            <a:pPr algn="ctr"/>
+            <a:r>
+              <a:rPr lang="en-GB" dirty="0">
+                <a:ln>
+                  <a:solidFill>
+                    <a:schemeClr val="tx1"/>
+                  </a:solidFill>
+                </a:ln>
+                <a:solidFill>
+                  <a:sysClr val="windowText" lastClr="000000"/>
+                </a:solidFill>
+              </a:rPr>
+              <a:t>Add stock</a:t>
+            </a:r>
+          </a:p>
+        </p:txBody>
+      </p:sp>
+      <p:sp>
+        <p:nvSpPr>
+          <p:cNvPr id="10" name="Rectangle 9">
+            <a:extLst>
+              <a:ext uri="{FF2B5EF4-FFF2-40B4-BE49-F238E27FC236}">
+                <a16:creationId xmlns:a16="http://schemas.microsoft.com/office/drawing/2014/main" id="{F1057B64-A798-249A-5611-A65D107D054E}"/>
+              </a:ext>
+            </a:extLst>
+          </p:cNvPr>
+          <p:cNvSpPr/>
+          <p:nvPr/>
+        </p:nvSpPr>
+        <p:spPr>
+          <a:xfrm>
+            <a:off x="4226530" y="126217"/>
+            <a:ext cx="1742314" cy="807813"/>
+          </a:xfrm>
+          <a:prstGeom prst="rect">
+            <a:avLst/>
+          </a:prstGeom>
+          <a:solidFill>
+            <a:schemeClr val="bg1"/>
+          </a:solidFill>
+          <a:ln>
+            <a:solidFill>
+              <a:schemeClr val="bg1"/>
+            </a:solidFill>
+          </a:ln>
+        </p:spPr>
+        <p:style>
+          <a:lnRef idx="2">
+            <a:schemeClr val="accent1">
+              <a:shade val="15000"/>
+            </a:schemeClr>
+          </a:lnRef>
+          <a:fillRef idx="1">
+            <a:schemeClr val="accent1"/>
+          </a:fillRef>
+          <a:effectRef idx="0">
+            <a:schemeClr val="accent1"/>
+          </a:effectRef>
+          <a:fontRef idx="minor">
+            <a:schemeClr val="lt1"/>
+          </a:fontRef>
+        </p:style>
+        <p:txBody>
+          <a:bodyPr rtlCol="0" anchor="ctr"/>
+          <a:lstStyle/>
+          <a:p>
+            <a:pPr algn="ctr"/>
+            <a:r>
+              <a:rPr lang="en-GB" dirty="0">
+                <a:ln>
+                  <a:solidFill>
+                    <a:schemeClr val="tx1"/>
+                  </a:solidFill>
+                </a:ln>
+                <a:solidFill>
+                  <a:sysClr val="windowText" lastClr="000000"/>
+                </a:solidFill>
+              </a:rPr>
+              <a:t>Generate barcodes</a:t>
+            </a:r>
+          </a:p>
+        </p:txBody>
+      </p:sp>
+      <p:sp>
+        <p:nvSpPr>
+          <p:cNvPr id="11" name="Rectangle 10">
+            <a:extLst>
+              <a:ext uri="{FF2B5EF4-FFF2-40B4-BE49-F238E27FC236}">
+                <a16:creationId xmlns:a16="http://schemas.microsoft.com/office/drawing/2014/main" id="{ADDEAA7B-FEE5-32EE-3E35-D027BA8F5919}"/>
+              </a:ext>
+            </a:extLst>
+          </p:cNvPr>
+          <p:cNvSpPr/>
+          <p:nvPr/>
+        </p:nvSpPr>
+        <p:spPr>
+          <a:xfrm>
+            <a:off x="6287670" y="126218"/>
+            <a:ext cx="1594122" cy="807813"/>
+          </a:xfrm>
+          <a:prstGeom prst="rect">
+            <a:avLst/>
+          </a:prstGeom>
+          <a:solidFill>
+            <a:schemeClr val="bg1"/>
+          </a:solidFill>
+          <a:ln>
+            <a:solidFill>
+              <a:schemeClr val="bg1"/>
+            </a:solidFill>
+          </a:ln>
+        </p:spPr>
+        <p:style>
+          <a:lnRef idx="2">
+            <a:schemeClr val="accent1">
+              <a:shade val="15000"/>
+            </a:schemeClr>
+          </a:lnRef>
+          <a:fillRef idx="1">
+            <a:schemeClr val="accent1"/>
+          </a:fillRef>
+          <a:effectRef idx="0">
+            <a:schemeClr val="accent1"/>
+          </a:effectRef>
+          <a:fontRef idx="minor">
+            <a:schemeClr val="lt1"/>
+          </a:fontRef>
+        </p:style>
+        <p:txBody>
+          <a:bodyPr rtlCol="0" anchor="ctr"/>
+          <a:lstStyle/>
+          <a:p>
+            <a:pPr algn="ctr"/>
+            <a:r>
+              <a:rPr lang="en-GB" dirty="0">
+                <a:ln>
+                  <a:solidFill>
+                    <a:schemeClr val="tx1"/>
+                  </a:solidFill>
+                </a:ln>
+                <a:solidFill>
+                  <a:sysClr val="windowText" lastClr="000000"/>
+                </a:solidFill>
+              </a:rPr>
+              <a:t>Checkout system</a:t>
+            </a:r>
+          </a:p>
+        </p:txBody>
+      </p:sp>
+      <p:sp>
+        <p:nvSpPr>
+          <p:cNvPr id="14" name="Rectangle 13">
+            <a:extLst>
+              <a:ext uri="{FF2B5EF4-FFF2-40B4-BE49-F238E27FC236}">
+                <a16:creationId xmlns:a16="http://schemas.microsoft.com/office/drawing/2014/main" id="{97F62398-4A97-5D3B-8996-A9D3A1BDEE7B}"/>
+              </a:ext>
+            </a:extLst>
+          </p:cNvPr>
+          <p:cNvSpPr/>
+          <p:nvPr/>
+        </p:nvSpPr>
+        <p:spPr>
+          <a:xfrm>
+            <a:off x="8258584" y="126219"/>
+            <a:ext cx="1676400" cy="807813"/>
+          </a:xfrm>
+          <a:prstGeom prst="rect">
+            <a:avLst/>
+          </a:prstGeom>
+          <a:solidFill>
+            <a:schemeClr val="bg1"/>
+          </a:solidFill>
+          <a:ln>
+            <a:solidFill>
+              <a:schemeClr val="bg1"/>
+            </a:solidFill>
+          </a:ln>
+        </p:spPr>
+        <p:style>
+          <a:lnRef idx="2">
+            <a:schemeClr val="accent1">
+              <a:shade val="15000"/>
+            </a:schemeClr>
+          </a:lnRef>
+          <a:fillRef idx="1">
+            <a:schemeClr val="accent1"/>
+          </a:fillRef>
+          <a:effectRef idx="0">
+            <a:schemeClr val="accent1"/>
+          </a:effectRef>
+          <a:fontRef idx="minor">
+            <a:schemeClr val="lt1"/>
+          </a:fontRef>
+        </p:style>
+        <p:txBody>
+          <a:bodyPr rtlCol="0" anchor="ctr"/>
+          <a:lstStyle/>
+          <a:p>
+            <a:pPr algn="ctr"/>
+            <a:r>
+              <a:rPr lang="en-GB" dirty="0">
+                <a:ln>
+                  <a:solidFill>
+                    <a:schemeClr val="tx1"/>
+                  </a:solidFill>
+                </a:ln>
+                <a:solidFill>
+                  <a:sysClr val="windowText" lastClr="000000"/>
+                </a:solidFill>
+              </a:rPr>
+              <a:t>View orders</a:t>
+            </a:r>
+          </a:p>
+        </p:txBody>
+      </p:sp>
+      <p:sp>
+        <p:nvSpPr>
+          <p:cNvPr id="16" name="Rectangle 15">
+            <a:extLst>
+              <a:ext uri="{FF2B5EF4-FFF2-40B4-BE49-F238E27FC236}">
+                <a16:creationId xmlns:a16="http://schemas.microsoft.com/office/drawing/2014/main" id="{BB745BDA-0EA4-B1EE-2C07-92B3FA6BD789}"/>
+              </a:ext>
+            </a:extLst>
+          </p:cNvPr>
+          <p:cNvSpPr/>
+          <p:nvPr/>
+        </p:nvSpPr>
+        <p:spPr>
+          <a:xfrm>
+            <a:off x="159874" y="126215"/>
+            <a:ext cx="1684816" cy="807813"/>
+          </a:xfrm>
+          <a:prstGeom prst="rect">
+            <a:avLst/>
+          </a:prstGeom>
+          <a:solidFill>
+            <a:schemeClr val="bg1"/>
+          </a:solidFill>
+          <a:ln>
+            <a:solidFill>
+              <a:schemeClr val="bg1"/>
+            </a:solidFill>
+          </a:ln>
+        </p:spPr>
+        <p:style>
+          <a:lnRef idx="2">
+            <a:schemeClr val="accent1">
+              <a:shade val="15000"/>
+            </a:schemeClr>
+          </a:lnRef>
+          <a:fillRef idx="1">
+            <a:schemeClr val="accent1"/>
+          </a:fillRef>
+          <a:effectRef idx="0">
+            <a:schemeClr val="accent1"/>
+          </a:effectRef>
+          <a:fontRef idx="minor">
+            <a:schemeClr val="lt1"/>
+          </a:fontRef>
+        </p:style>
+        <p:txBody>
+          <a:bodyPr rtlCol="0" anchor="ctr"/>
+          <a:lstStyle/>
+          <a:p>
+            <a:pPr algn="ctr"/>
+            <a:r>
+              <a:rPr lang="en-GB" dirty="0">
+                <a:ln>
+                  <a:solidFill>
+                    <a:schemeClr val="tx1"/>
+                  </a:solidFill>
+                </a:ln>
+                <a:solidFill>
+                  <a:sysClr val="windowText" lastClr="000000"/>
+                </a:solidFill>
+              </a:rPr>
+              <a:t>Home</a:t>
+            </a:r>
+          </a:p>
+        </p:txBody>
+      </p:sp>
+      <p:sp>
+        <p:nvSpPr>
+          <p:cNvPr id="2" name="TextBox 1">
+            <a:extLst>
+              <a:ext uri="{FF2B5EF4-FFF2-40B4-BE49-F238E27FC236}">
+                <a16:creationId xmlns:a16="http://schemas.microsoft.com/office/drawing/2014/main" id="{82D2EE23-0245-02D2-692A-541BFCB47CB5}"/>
+              </a:ext>
+            </a:extLst>
+          </p:cNvPr>
+          <p:cNvSpPr txBox="1"/>
+          <p:nvPr/>
+        </p:nvSpPr>
+        <p:spPr>
+          <a:xfrm>
+            <a:off x="212234" y="1748889"/>
+            <a:ext cx="1632456" cy="369332"/>
+          </a:xfrm>
+          <a:prstGeom prst="rect">
+            <a:avLst/>
+          </a:prstGeom>
+          <a:noFill/>
+        </p:spPr>
+        <p:txBody>
+          <a:bodyPr wrap="square" rtlCol="0">
+            <a:spAutoFit/>
+          </a:bodyPr>
+          <a:lstStyle/>
+          <a:p>
+            <a:r>
+              <a:rPr lang="en-GB" dirty="0"/>
+              <a:t>Scan barcode:</a:t>
+            </a:r>
+          </a:p>
+        </p:txBody>
+      </p:sp>
+      <p:sp>
+        <p:nvSpPr>
+          <p:cNvPr id="3" name="TextBox 2">
+            <a:extLst>
+              <a:ext uri="{FF2B5EF4-FFF2-40B4-BE49-F238E27FC236}">
+                <a16:creationId xmlns:a16="http://schemas.microsoft.com/office/drawing/2014/main" id="{62EF5EF7-39DB-8388-BFAA-4FFC0FA573D9}"/>
+              </a:ext>
+            </a:extLst>
+          </p:cNvPr>
+          <p:cNvSpPr txBox="1"/>
+          <p:nvPr/>
+        </p:nvSpPr>
+        <p:spPr>
+          <a:xfrm>
+            <a:off x="8745703" y="1194891"/>
+            <a:ext cx="3253693" cy="1477328"/>
+          </a:xfrm>
+          <a:prstGeom prst="rect">
+            <a:avLst/>
+          </a:prstGeom>
+          <a:noFill/>
+        </p:spPr>
+        <p:txBody>
+          <a:bodyPr wrap="square" rtlCol="0">
+            <a:spAutoFit/>
+          </a:bodyPr>
+          <a:lstStyle/>
+          <a:p>
+            <a:r>
+              <a:rPr lang="en-GB" dirty="0"/>
+              <a:t>Basket:</a:t>
+            </a:r>
+          </a:p>
+          <a:p>
+            <a:endParaRPr lang="en-GB" dirty="0"/>
+          </a:p>
+          <a:p>
+            <a:endParaRPr lang="en-GB" dirty="0"/>
+          </a:p>
+          <a:p>
+            <a:endParaRPr lang="en-GB" dirty="0"/>
+          </a:p>
+          <a:p>
+            <a:r>
+              <a:rPr lang="en-GB" dirty="0"/>
+              <a:t>Basket items</a:t>
+            </a:r>
+          </a:p>
+        </p:txBody>
+      </p:sp>
+      <p:sp>
+        <p:nvSpPr>
+          <p:cNvPr id="6" name="TextBox 5">
+            <a:extLst>
+              <a:ext uri="{FF2B5EF4-FFF2-40B4-BE49-F238E27FC236}">
+                <a16:creationId xmlns:a16="http://schemas.microsoft.com/office/drawing/2014/main" id="{04754E8D-4641-913F-D2F9-62BFF7410B44}"/>
+              </a:ext>
+            </a:extLst>
+          </p:cNvPr>
+          <p:cNvSpPr txBox="1"/>
+          <p:nvPr/>
+        </p:nvSpPr>
+        <p:spPr>
+          <a:xfrm>
+            <a:off x="212234" y="3412171"/>
+            <a:ext cx="2013924" cy="369332"/>
+          </a:xfrm>
+          <a:prstGeom prst="rect">
+            <a:avLst/>
+          </a:prstGeom>
+          <a:noFill/>
+          <a:ln>
+            <a:solidFill>
+              <a:schemeClr val="tx1"/>
+            </a:solidFill>
+          </a:ln>
+        </p:spPr>
+        <p:txBody>
+          <a:bodyPr wrap="square" rtlCol="0">
+            <a:spAutoFit/>
+          </a:bodyPr>
+          <a:lstStyle/>
+          <a:p>
+            <a:r>
+              <a:rPr lang="en-GB" dirty="0"/>
+              <a:t>Or input manually</a:t>
+            </a:r>
+          </a:p>
+        </p:txBody>
+      </p:sp>
+      <p:sp>
+        <p:nvSpPr>
+          <p:cNvPr id="9" name="TextBox 8">
+            <a:extLst>
+              <a:ext uri="{FF2B5EF4-FFF2-40B4-BE49-F238E27FC236}">
+                <a16:creationId xmlns:a16="http://schemas.microsoft.com/office/drawing/2014/main" id="{F48FE565-16D5-D9B7-51C1-0A8C47774451}"/>
+              </a:ext>
+            </a:extLst>
+          </p:cNvPr>
+          <p:cNvSpPr txBox="1"/>
+          <p:nvPr/>
+        </p:nvSpPr>
+        <p:spPr>
+          <a:xfrm>
+            <a:off x="1844690" y="1748889"/>
+            <a:ext cx="1852179" cy="369332"/>
+          </a:xfrm>
+          <a:prstGeom prst="rect">
+            <a:avLst/>
+          </a:prstGeom>
+          <a:noFill/>
+          <a:ln>
+            <a:solidFill>
+              <a:schemeClr val="tx1"/>
+            </a:solidFill>
+          </a:ln>
+        </p:spPr>
+        <p:txBody>
+          <a:bodyPr wrap="square" rtlCol="0">
+            <a:spAutoFit/>
+          </a:bodyPr>
+          <a:lstStyle/>
+          <a:p>
+            <a:endParaRPr lang="en-GB" dirty="0"/>
+          </a:p>
+        </p:txBody>
+      </p:sp>
+    </p:spTree>
+    <p:extLst>
+      <p:ext uri="{BB962C8B-B14F-4D97-AF65-F5344CB8AC3E}">
+        <p14:creationId xmlns:p14="http://schemas.microsoft.com/office/powerpoint/2010/main" val="1154686776"/>
       </p:ext>
     </p:extLst>
   </p:cSld>
@@ -5946,28 +7010,640 @@
       </p:grpSpPr>
       <p:sp>
         <p:nvSpPr>
-          <p:cNvPr id="2" name="Title 1">
-            <a:extLst>
-              <a:ext uri="{FF2B5EF4-FFF2-40B4-BE49-F238E27FC236}">
-                <a16:creationId xmlns:a16="http://schemas.microsoft.com/office/drawing/2014/main" id="{587A13A3-98F1-A632-56E3-7D2561130BE8}"/>
-              </a:ext>
-            </a:extLst>
-          </p:cNvPr>
-          <p:cNvSpPr>
-            <a:spLocks noGrp="1"/>
-          </p:cNvSpPr>
-          <p:nvPr>
-            <p:ph type="title"/>
-          </p:nvPr>
-        </p:nvSpPr>
-        <p:spPr/>
-        <p:txBody>
-          <a:bodyPr/>
-          <a:lstStyle/>
-          <a:p>
-            <a:r>
-              <a:rPr lang="en-GB" dirty="0"/>
-              <a:t>Home page (admin)</a:t>
+          <p:cNvPr id="4" name="Rectangle 3">
+            <a:extLst>
+              <a:ext uri="{FF2B5EF4-FFF2-40B4-BE49-F238E27FC236}">
+                <a16:creationId xmlns:a16="http://schemas.microsoft.com/office/drawing/2014/main" id="{9DF92B7C-3248-8476-5639-82C1CDFBFA0C}"/>
+              </a:ext>
+            </a:extLst>
+          </p:cNvPr>
+          <p:cNvSpPr/>
+          <p:nvPr/>
+        </p:nvSpPr>
+        <p:spPr>
+          <a:xfrm>
+            <a:off x="0" y="0"/>
+            <a:ext cx="12192000" cy="1060255"/>
+          </a:xfrm>
+          <a:prstGeom prst="rect">
+            <a:avLst/>
+          </a:prstGeom>
+        </p:spPr>
+        <p:style>
+          <a:lnRef idx="2">
+            <a:schemeClr val="accent1">
+              <a:shade val="15000"/>
+            </a:schemeClr>
+          </a:lnRef>
+          <a:fillRef idx="1">
+            <a:schemeClr val="accent1"/>
+          </a:fillRef>
+          <a:effectRef idx="0">
+            <a:schemeClr val="accent1"/>
+          </a:effectRef>
+          <a:fontRef idx="minor">
+            <a:schemeClr val="lt1"/>
+          </a:fontRef>
+        </p:style>
+        <p:txBody>
+          <a:bodyPr rtlCol="0" anchor="ctr"/>
+          <a:lstStyle/>
+          <a:p>
+            <a:pPr algn="ctr"/>
+            <a:endParaRPr lang="en-GB"/>
+          </a:p>
+        </p:txBody>
+      </p:sp>
+      <p:sp>
+        <p:nvSpPr>
+          <p:cNvPr id="5" name="Rectangle 4">
+            <a:extLst>
+              <a:ext uri="{FF2B5EF4-FFF2-40B4-BE49-F238E27FC236}">
+                <a16:creationId xmlns:a16="http://schemas.microsoft.com/office/drawing/2014/main" id="{CD2803DB-E044-51FC-403D-F08AE77A7E99}"/>
+              </a:ext>
+            </a:extLst>
+          </p:cNvPr>
+          <p:cNvSpPr/>
+          <p:nvPr/>
+        </p:nvSpPr>
+        <p:spPr>
+          <a:xfrm>
+            <a:off x="10210799" y="126219"/>
+            <a:ext cx="1851238" cy="807813"/>
+          </a:xfrm>
+          <a:prstGeom prst="rect">
+            <a:avLst/>
+          </a:prstGeom>
+          <a:solidFill>
+            <a:schemeClr val="bg1"/>
+          </a:solidFill>
+          <a:ln>
+            <a:solidFill>
+              <a:schemeClr val="bg1"/>
+            </a:solidFill>
+          </a:ln>
+        </p:spPr>
+        <p:style>
+          <a:lnRef idx="2">
+            <a:schemeClr val="accent1">
+              <a:shade val="15000"/>
+            </a:schemeClr>
+          </a:lnRef>
+          <a:fillRef idx="1">
+            <a:schemeClr val="accent1"/>
+          </a:fillRef>
+          <a:effectRef idx="0">
+            <a:schemeClr val="accent1"/>
+          </a:effectRef>
+          <a:fontRef idx="minor">
+            <a:schemeClr val="lt1"/>
+          </a:fontRef>
+        </p:style>
+        <p:txBody>
+          <a:bodyPr rtlCol="0" anchor="ctr"/>
+          <a:lstStyle/>
+          <a:p>
+            <a:pPr algn="ctr"/>
+            <a:r>
+              <a:rPr lang="en-GB" dirty="0">
+                <a:ln>
+                  <a:solidFill>
+                    <a:schemeClr val="tx1"/>
+                  </a:solidFill>
+                </a:ln>
+                <a:solidFill>
+                  <a:sysClr val="windowText" lastClr="000000"/>
+                </a:solidFill>
+              </a:rPr>
+              <a:t>My account</a:t>
+            </a:r>
+          </a:p>
+        </p:txBody>
+      </p:sp>
+      <p:sp>
+        <p:nvSpPr>
+          <p:cNvPr id="7" name="Rectangle 6">
+            <a:extLst>
+              <a:ext uri="{FF2B5EF4-FFF2-40B4-BE49-F238E27FC236}">
+                <a16:creationId xmlns:a16="http://schemas.microsoft.com/office/drawing/2014/main" id="{1B235E0F-009B-1013-6831-46A3F03BD58E}"/>
+              </a:ext>
+            </a:extLst>
+          </p:cNvPr>
+          <p:cNvSpPr/>
+          <p:nvPr/>
+        </p:nvSpPr>
+        <p:spPr>
+          <a:xfrm>
+            <a:off x="2163516" y="126216"/>
+            <a:ext cx="1684816" cy="807813"/>
+          </a:xfrm>
+          <a:prstGeom prst="rect">
+            <a:avLst/>
+          </a:prstGeom>
+          <a:solidFill>
+            <a:schemeClr val="bg1"/>
+          </a:solidFill>
+          <a:ln>
+            <a:solidFill>
+              <a:schemeClr val="bg1"/>
+            </a:solidFill>
+          </a:ln>
+        </p:spPr>
+        <p:style>
+          <a:lnRef idx="2">
+            <a:schemeClr val="accent1">
+              <a:shade val="15000"/>
+            </a:schemeClr>
+          </a:lnRef>
+          <a:fillRef idx="1">
+            <a:schemeClr val="accent1"/>
+          </a:fillRef>
+          <a:effectRef idx="0">
+            <a:schemeClr val="accent1"/>
+          </a:effectRef>
+          <a:fontRef idx="minor">
+            <a:schemeClr val="lt1"/>
+          </a:fontRef>
+        </p:style>
+        <p:txBody>
+          <a:bodyPr rtlCol="0" anchor="ctr"/>
+          <a:lstStyle/>
+          <a:p>
+            <a:pPr algn="ctr"/>
+            <a:r>
+              <a:rPr lang="en-GB" dirty="0">
+                <a:ln>
+                  <a:solidFill>
+                    <a:schemeClr val="tx1"/>
+                  </a:solidFill>
+                </a:ln>
+                <a:solidFill>
+                  <a:sysClr val="windowText" lastClr="000000"/>
+                </a:solidFill>
+              </a:rPr>
+              <a:t>Add stock</a:t>
+            </a:r>
+          </a:p>
+        </p:txBody>
+      </p:sp>
+      <p:sp>
+        <p:nvSpPr>
+          <p:cNvPr id="10" name="Rectangle 9">
+            <a:extLst>
+              <a:ext uri="{FF2B5EF4-FFF2-40B4-BE49-F238E27FC236}">
+                <a16:creationId xmlns:a16="http://schemas.microsoft.com/office/drawing/2014/main" id="{F1057B64-A798-249A-5611-A65D107D054E}"/>
+              </a:ext>
+            </a:extLst>
+          </p:cNvPr>
+          <p:cNvSpPr/>
+          <p:nvPr/>
+        </p:nvSpPr>
+        <p:spPr>
+          <a:xfrm>
+            <a:off x="4226530" y="126217"/>
+            <a:ext cx="1742314" cy="807813"/>
+          </a:xfrm>
+          <a:prstGeom prst="rect">
+            <a:avLst/>
+          </a:prstGeom>
+          <a:solidFill>
+            <a:schemeClr val="bg1"/>
+          </a:solidFill>
+          <a:ln>
+            <a:solidFill>
+              <a:schemeClr val="bg1"/>
+            </a:solidFill>
+          </a:ln>
+        </p:spPr>
+        <p:style>
+          <a:lnRef idx="2">
+            <a:schemeClr val="accent1">
+              <a:shade val="15000"/>
+            </a:schemeClr>
+          </a:lnRef>
+          <a:fillRef idx="1">
+            <a:schemeClr val="accent1"/>
+          </a:fillRef>
+          <a:effectRef idx="0">
+            <a:schemeClr val="accent1"/>
+          </a:effectRef>
+          <a:fontRef idx="minor">
+            <a:schemeClr val="lt1"/>
+          </a:fontRef>
+        </p:style>
+        <p:txBody>
+          <a:bodyPr rtlCol="0" anchor="ctr"/>
+          <a:lstStyle/>
+          <a:p>
+            <a:pPr algn="ctr"/>
+            <a:r>
+              <a:rPr lang="en-GB" dirty="0">
+                <a:ln>
+                  <a:solidFill>
+                    <a:schemeClr val="tx1"/>
+                  </a:solidFill>
+                </a:ln>
+                <a:solidFill>
+                  <a:sysClr val="windowText" lastClr="000000"/>
+                </a:solidFill>
+              </a:rPr>
+              <a:t>Generate barcodes</a:t>
+            </a:r>
+          </a:p>
+        </p:txBody>
+      </p:sp>
+      <p:sp>
+        <p:nvSpPr>
+          <p:cNvPr id="11" name="Rectangle 10">
+            <a:extLst>
+              <a:ext uri="{FF2B5EF4-FFF2-40B4-BE49-F238E27FC236}">
+                <a16:creationId xmlns:a16="http://schemas.microsoft.com/office/drawing/2014/main" id="{ADDEAA7B-FEE5-32EE-3E35-D027BA8F5919}"/>
+              </a:ext>
+            </a:extLst>
+          </p:cNvPr>
+          <p:cNvSpPr/>
+          <p:nvPr/>
+        </p:nvSpPr>
+        <p:spPr>
+          <a:xfrm>
+            <a:off x="6287670" y="126218"/>
+            <a:ext cx="1594122" cy="807813"/>
+          </a:xfrm>
+          <a:prstGeom prst="rect">
+            <a:avLst/>
+          </a:prstGeom>
+          <a:solidFill>
+            <a:schemeClr val="bg1"/>
+          </a:solidFill>
+          <a:ln>
+            <a:solidFill>
+              <a:schemeClr val="bg1"/>
+            </a:solidFill>
+          </a:ln>
+        </p:spPr>
+        <p:style>
+          <a:lnRef idx="2">
+            <a:schemeClr val="accent1">
+              <a:shade val="15000"/>
+            </a:schemeClr>
+          </a:lnRef>
+          <a:fillRef idx="1">
+            <a:schemeClr val="accent1"/>
+          </a:fillRef>
+          <a:effectRef idx="0">
+            <a:schemeClr val="accent1"/>
+          </a:effectRef>
+          <a:fontRef idx="minor">
+            <a:schemeClr val="lt1"/>
+          </a:fontRef>
+        </p:style>
+        <p:txBody>
+          <a:bodyPr rtlCol="0" anchor="ctr"/>
+          <a:lstStyle/>
+          <a:p>
+            <a:pPr algn="ctr"/>
+            <a:r>
+              <a:rPr lang="en-GB" dirty="0">
+                <a:ln>
+                  <a:solidFill>
+                    <a:schemeClr val="tx1"/>
+                  </a:solidFill>
+                </a:ln>
+                <a:solidFill>
+                  <a:sysClr val="windowText" lastClr="000000"/>
+                </a:solidFill>
+              </a:rPr>
+              <a:t>Checkout system</a:t>
+            </a:r>
+          </a:p>
+        </p:txBody>
+      </p:sp>
+      <p:sp>
+        <p:nvSpPr>
+          <p:cNvPr id="14" name="Rectangle 13">
+            <a:extLst>
+              <a:ext uri="{FF2B5EF4-FFF2-40B4-BE49-F238E27FC236}">
+                <a16:creationId xmlns:a16="http://schemas.microsoft.com/office/drawing/2014/main" id="{97F62398-4A97-5D3B-8996-A9D3A1BDEE7B}"/>
+              </a:ext>
+            </a:extLst>
+          </p:cNvPr>
+          <p:cNvSpPr/>
+          <p:nvPr/>
+        </p:nvSpPr>
+        <p:spPr>
+          <a:xfrm>
+            <a:off x="8258584" y="126219"/>
+            <a:ext cx="1676400" cy="807813"/>
+          </a:xfrm>
+          <a:prstGeom prst="rect">
+            <a:avLst/>
+          </a:prstGeom>
+          <a:solidFill>
+            <a:schemeClr val="bg1"/>
+          </a:solidFill>
+          <a:ln>
+            <a:solidFill>
+              <a:schemeClr val="bg1"/>
+            </a:solidFill>
+          </a:ln>
+        </p:spPr>
+        <p:style>
+          <a:lnRef idx="2">
+            <a:schemeClr val="accent1">
+              <a:shade val="15000"/>
+            </a:schemeClr>
+          </a:lnRef>
+          <a:fillRef idx="1">
+            <a:schemeClr val="accent1"/>
+          </a:fillRef>
+          <a:effectRef idx="0">
+            <a:schemeClr val="accent1"/>
+          </a:effectRef>
+          <a:fontRef idx="minor">
+            <a:schemeClr val="lt1"/>
+          </a:fontRef>
+        </p:style>
+        <p:txBody>
+          <a:bodyPr rtlCol="0" anchor="ctr"/>
+          <a:lstStyle/>
+          <a:p>
+            <a:pPr algn="ctr"/>
+            <a:r>
+              <a:rPr lang="en-GB" dirty="0">
+                <a:ln>
+                  <a:solidFill>
+                    <a:schemeClr val="tx1"/>
+                  </a:solidFill>
+                </a:ln>
+                <a:solidFill>
+                  <a:sysClr val="windowText" lastClr="000000"/>
+                </a:solidFill>
+              </a:rPr>
+              <a:t>View orders</a:t>
+            </a:r>
+          </a:p>
+        </p:txBody>
+      </p:sp>
+      <p:sp>
+        <p:nvSpPr>
+          <p:cNvPr id="16" name="Rectangle 15">
+            <a:extLst>
+              <a:ext uri="{FF2B5EF4-FFF2-40B4-BE49-F238E27FC236}">
+                <a16:creationId xmlns:a16="http://schemas.microsoft.com/office/drawing/2014/main" id="{BB745BDA-0EA4-B1EE-2C07-92B3FA6BD789}"/>
+              </a:ext>
+            </a:extLst>
+          </p:cNvPr>
+          <p:cNvSpPr/>
+          <p:nvPr/>
+        </p:nvSpPr>
+        <p:spPr>
+          <a:xfrm>
+            <a:off x="159874" y="126215"/>
+            <a:ext cx="1684816" cy="807813"/>
+          </a:xfrm>
+          <a:prstGeom prst="rect">
+            <a:avLst/>
+          </a:prstGeom>
+          <a:solidFill>
+            <a:schemeClr val="bg1"/>
+          </a:solidFill>
+          <a:ln>
+            <a:solidFill>
+              <a:schemeClr val="bg1"/>
+            </a:solidFill>
+          </a:ln>
+        </p:spPr>
+        <p:style>
+          <a:lnRef idx="2">
+            <a:schemeClr val="accent1">
+              <a:shade val="15000"/>
+            </a:schemeClr>
+          </a:lnRef>
+          <a:fillRef idx="1">
+            <a:schemeClr val="accent1"/>
+          </a:fillRef>
+          <a:effectRef idx="0">
+            <a:schemeClr val="accent1"/>
+          </a:effectRef>
+          <a:fontRef idx="minor">
+            <a:schemeClr val="lt1"/>
+          </a:fontRef>
+        </p:style>
+        <p:txBody>
+          <a:bodyPr rtlCol="0" anchor="ctr"/>
+          <a:lstStyle/>
+          <a:p>
+            <a:pPr algn="ctr"/>
+            <a:r>
+              <a:rPr lang="en-GB" dirty="0">
+                <a:ln>
+                  <a:solidFill>
+                    <a:schemeClr val="tx1"/>
+                  </a:solidFill>
+                </a:ln>
+                <a:solidFill>
+                  <a:sysClr val="windowText" lastClr="000000"/>
+                </a:solidFill>
+              </a:rPr>
+              <a:t>Home</a:t>
+            </a:r>
+          </a:p>
+        </p:txBody>
+      </p:sp>
+      <p:sp>
+        <p:nvSpPr>
+          <p:cNvPr id="17" name="Rectangle 16">
+            <a:extLst>
+              <a:ext uri="{FF2B5EF4-FFF2-40B4-BE49-F238E27FC236}">
+                <a16:creationId xmlns:a16="http://schemas.microsoft.com/office/drawing/2014/main" id="{5E8A6800-E429-2B5D-E165-0577B14C860B}"/>
+              </a:ext>
+            </a:extLst>
+          </p:cNvPr>
+          <p:cNvSpPr/>
+          <p:nvPr/>
+        </p:nvSpPr>
+        <p:spPr>
+          <a:xfrm>
+            <a:off x="84171" y="1186464"/>
+            <a:ext cx="5234940" cy="2606040"/>
+          </a:xfrm>
+          <a:prstGeom prst="rect">
+            <a:avLst/>
+          </a:prstGeom>
+          <a:solidFill>
+            <a:schemeClr val="bg1"/>
+          </a:solidFill>
+          <a:ln>
+            <a:solidFill>
+              <a:schemeClr val="tx1"/>
+            </a:solidFill>
+          </a:ln>
+        </p:spPr>
+        <p:style>
+          <a:lnRef idx="2">
+            <a:schemeClr val="accent1">
+              <a:shade val="15000"/>
+            </a:schemeClr>
+          </a:lnRef>
+          <a:fillRef idx="1">
+            <a:schemeClr val="accent1"/>
+          </a:fillRef>
+          <a:effectRef idx="0">
+            <a:schemeClr val="accent1"/>
+          </a:effectRef>
+          <a:fontRef idx="minor">
+            <a:schemeClr val="lt1"/>
+          </a:fontRef>
+        </p:style>
+        <p:txBody>
+          <a:bodyPr rtlCol="0" anchor="ctr"/>
+          <a:lstStyle/>
+          <a:p>
+            <a:pPr algn="ctr"/>
+            <a:r>
+              <a:rPr lang="en-GB" dirty="0">
+                <a:ln>
+                  <a:solidFill>
+                    <a:schemeClr val="tx1"/>
+                  </a:solidFill>
+                </a:ln>
+                <a:solidFill>
+                  <a:sysClr val="windowText" lastClr="000000"/>
+                </a:solidFill>
+              </a:rPr>
+              <a:t>Sale dates</a:t>
+            </a:r>
+          </a:p>
+        </p:txBody>
+      </p:sp>
+      <p:sp>
+        <p:nvSpPr>
+          <p:cNvPr id="18" name="Rectangle 17">
+            <a:extLst>
+              <a:ext uri="{FF2B5EF4-FFF2-40B4-BE49-F238E27FC236}">
+                <a16:creationId xmlns:a16="http://schemas.microsoft.com/office/drawing/2014/main" id="{4BE516B8-FB2F-08DE-40A2-D0A829A4F029}"/>
+              </a:ext>
+            </a:extLst>
+          </p:cNvPr>
+          <p:cNvSpPr/>
+          <p:nvPr/>
+        </p:nvSpPr>
+        <p:spPr>
+          <a:xfrm>
+            <a:off x="6226920" y="1186464"/>
+            <a:ext cx="5234940" cy="2606040"/>
+          </a:xfrm>
+          <a:prstGeom prst="rect">
+            <a:avLst/>
+          </a:prstGeom>
+          <a:solidFill>
+            <a:schemeClr val="bg1"/>
+          </a:solidFill>
+          <a:ln>
+            <a:solidFill>
+              <a:schemeClr val="tx1"/>
+            </a:solidFill>
+          </a:ln>
+        </p:spPr>
+        <p:style>
+          <a:lnRef idx="2">
+            <a:schemeClr val="accent1">
+              <a:shade val="15000"/>
+            </a:schemeClr>
+          </a:lnRef>
+          <a:fillRef idx="1">
+            <a:schemeClr val="accent1"/>
+          </a:fillRef>
+          <a:effectRef idx="0">
+            <a:schemeClr val="accent1"/>
+          </a:effectRef>
+          <a:fontRef idx="minor">
+            <a:schemeClr val="lt1"/>
+          </a:fontRef>
+        </p:style>
+        <p:txBody>
+          <a:bodyPr rtlCol="0" anchor="ctr"/>
+          <a:lstStyle/>
+          <a:p>
+            <a:pPr algn="ctr"/>
+            <a:r>
+              <a:rPr lang="en-GB" dirty="0">
+                <a:ln>
+                  <a:solidFill>
+                    <a:schemeClr val="tx1"/>
+                  </a:solidFill>
+                </a:ln>
+                <a:solidFill>
+                  <a:sysClr val="windowText" lastClr="000000"/>
+                </a:solidFill>
+              </a:rPr>
+              <a:t>Orders that need completing</a:t>
+            </a:r>
+          </a:p>
+        </p:txBody>
+      </p:sp>
+      <p:sp>
+        <p:nvSpPr>
+          <p:cNvPr id="19" name="Rectangle 18">
+            <a:extLst>
+              <a:ext uri="{FF2B5EF4-FFF2-40B4-BE49-F238E27FC236}">
+                <a16:creationId xmlns:a16="http://schemas.microsoft.com/office/drawing/2014/main" id="{EACABD0C-99DF-7C3B-9CD9-80162DF0128F}"/>
+              </a:ext>
+            </a:extLst>
+          </p:cNvPr>
+          <p:cNvSpPr/>
+          <p:nvPr/>
+        </p:nvSpPr>
+        <p:spPr>
+          <a:xfrm>
+            <a:off x="84171" y="3918713"/>
+            <a:ext cx="5234940" cy="2606040"/>
+          </a:xfrm>
+          <a:prstGeom prst="rect">
+            <a:avLst/>
+          </a:prstGeom>
+          <a:solidFill>
+            <a:schemeClr val="bg1"/>
+          </a:solidFill>
+          <a:ln>
+            <a:solidFill>
+              <a:schemeClr val="tx1"/>
+            </a:solidFill>
+          </a:ln>
+        </p:spPr>
+        <p:style>
+          <a:lnRef idx="2">
+            <a:schemeClr val="accent1">
+              <a:shade val="15000"/>
+            </a:schemeClr>
+          </a:lnRef>
+          <a:fillRef idx="1">
+            <a:schemeClr val="accent1"/>
+          </a:fillRef>
+          <a:effectRef idx="0">
+            <a:schemeClr val="accent1"/>
+          </a:effectRef>
+          <a:fontRef idx="minor">
+            <a:schemeClr val="lt1"/>
+          </a:fontRef>
+        </p:style>
+        <p:txBody>
+          <a:bodyPr rtlCol="0" anchor="ctr"/>
+          <a:lstStyle/>
+          <a:p>
+            <a:pPr algn="ctr"/>
+            <a:r>
+              <a:rPr lang="en-GB" dirty="0">
+                <a:ln>
+                  <a:solidFill>
+                    <a:schemeClr val="tx1"/>
+                  </a:solidFill>
+                </a:ln>
+                <a:solidFill>
+                  <a:sysClr val="windowText" lastClr="000000"/>
+                </a:solidFill>
+              </a:rPr>
+              <a:t>Sale dates</a:t>
             </a:r>
           </a:p>
         </p:txBody>
@@ -5975,7 +7651,7 @@
     </p:spTree>
     <p:extLst>
       <p:ext uri="{BB962C8B-B14F-4D97-AF65-F5344CB8AC3E}">
-        <p14:creationId xmlns:p14="http://schemas.microsoft.com/office/powerpoint/2010/main" val="2255478051"/>
+        <p14:creationId xmlns:p14="http://schemas.microsoft.com/office/powerpoint/2010/main" val="284099482"/>
       </p:ext>
     </p:extLst>
   </p:cSld>
@@ -6025,7 +7701,7 @@
           <a:p>
             <a:r>
               <a:rPr lang="en-GB" dirty="0"/>
-              <a:t>Login page</a:t>
+              <a:t>Home page (admin)</a:t>
             </a:r>
           </a:p>
         </p:txBody>
@@ -6033,7 +7709,7 @@
     </p:spTree>
     <p:extLst>
       <p:ext uri="{BB962C8B-B14F-4D97-AF65-F5344CB8AC3E}">
-        <p14:creationId xmlns:p14="http://schemas.microsoft.com/office/powerpoint/2010/main" val="2292907489"/>
+        <p14:creationId xmlns:p14="http://schemas.microsoft.com/office/powerpoint/2010/main" val="2255478051"/>
       </p:ext>
     </p:extLst>
   </p:cSld>
@@ -6062,28 +7738,706 @@
       </p:grpSpPr>
       <p:sp>
         <p:nvSpPr>
-          <p:cNvPr id="2" name="Title 1">
-            <a:extLst>
-              <a:ext uri="{FF2B5EF4-FFF2-40B4-BE49-F238E27FC236}">
-                <a16:creationId xmlns:a16="http://schemas.microsoft.com/office/drawing/2014/main" id="{587A13A3-98F1-A632-56E3-7D2561130BE8}"/>
-              </a:ext>
-            </a:extLst>
-          </p:cNvPr>
-          <p:cNvSpPr>
-            <a:spLocks noGrp="1"/>
-          </p:cNvSpPr>
-          <p:nvPr>
-            <p:ph type="title"/>
-          </p:nvPr>
-        </p:nvSpPr>
-        <p:spPr/>
-        <p:txBody>
-          <a:bodyPr/>
-          <a:lstStyle/>
-          <a:p>
-            <a:r>
-              <a:rPr lang="en-GB" dirty="0"/>
-              <a:t>Sign up page</a:t>
+          <p:cNvPr id="4" name="Rectangle 3">
+            <a:extLst>
+              <a:ext uri="{FF2B5EF4-FFF2-40B4-BE49-F238E27FC236}">
+                <a16:creationId xmlns:a16="http://schemas.microsoft.com/office/drawing/2014/main" id="{9DF92B7C-3248-8476-5639-82C1CDFBFA0C}"/>
+              </a:ext>
+            </a:extLst>
+          </p:cNvPr>
+          <p:cNvSpPr/>
+          <p:nvPr/>
+        </p:nvSpPr>
+        <p:spPr>
+          <a:xfrm>
+            <a:off x="0" y="0"/>
+            <a:ext cx="12192000" cy="1060255"/>
+          </a:xfrm>
+          <a:prstGeom prst="rect">
+            <a:avLst/>
+          </a:prstGeom>
+        </p:spPr>
+        <p:style>
+          <a:lnRef idx="2">
+            <a:schemeClr val="accent1">
+              <a:shade val="15000"/>
+            </a:schemeClr>
+          </a:lnRef>
+          <a:fillRef idx="1">
+            <a:schemeClr val="accent1"/>
+          </a:fillRef>
+          <a:effectRef idx="0">
+            <a:schemeClr val="accent1"/>
+          </a:effectRef>
+          <a:fontRef idx="minor">
+            <a:schemeClr val="lt1"/>
+          </a:fontRef>
+        </p:style>
+        <p:txBody>
+          <a:bodyPr rtlCol="0" anchor="ctr"/>
+          <a:lstStyle/>
+          <a:p>
+            <a:pPr algn="ctr"/>
+            <a:endParaRPr lang="en-GB"/>
+          </a:p>
+        </p:txBody>
+      </p:sp>
+      <p:sp>
+        <p:nvSpPr>
+          <p:cNvPr id="5" name="Rectangle 4">
+            <a:extLst>
+              <a:ext uri="{FF2B5EF4-FFF2-40B4-BE49-F238E27FC236}">
+                <a16:creationId xmlns:a16="http://schemas.microsoft.com/office/drawing/2014/main" id="{CD2803DB-E044-51FC-403D-F08AE77A7E99}"/>
+              </a:ext>
+            </a:extLst>
+          </p:cNvPr>
+          <p:cNvSpPr/>
+          <p:nvPr/>
+        </p:nvSpPr>
+        <p:spPr>
+          <a:xfrm>
+            <a:off x="5674787" y="126209"/>
+            <a:ext cx="1230896" cy="807813"/>
+          </a:xfrm>
+          <a:prstGeom prst="rect">
+            <a:avLst/>
+          </a:prstGeom>
+          <a:solidFill>
+            <a:schemeClr val="bg1"/>
+          </a:solidFill>
+          <a:ln>
+            <a:solidFill>
+              <a:schemeClr val="bg1"/>
+            </a:solidFill>
+          </a:ln>
+        </p:spPr>
+        <p:style>
+          <a:lnRef idx="2">
+            <a:schemeClr val="accent1">
+              <a:shade val="15000"/>
+            </a:schemeClr>
+          </a:lnRef>
+          <a:fillRef idx="1">
+            <a:schemeClr val="accent1"/>
+          </a:fillRef>
+          <a:effectRef idx="0">
+            <a:schemeClr val="accent1"/>
+          </a:effectRef>
+          <a:fontRef idx="minor">
+            <a:schemeClr val="lt1"/>
+          </a:fontRef>
+        </p:style>
+        <p:txBody>
+          <a:bodyPr rtlCol="0" anchor="ctr"/>
+          <a:lstStyle/>
+          <a:p>
+            <a:pPr algn="ctr"/>
+            <a:r>
+              <a:rPr lang="en-GB" dirty="0">
+                <a:ln>
+                  <a:solidFill>
+                    <a:schemeClr val="tx1"/>
+                  </a:solidFill>
+                </a:ln>
+                <a:solidFill>
+                  <a:sysClr val="windowText" lastClr="000000"/>
+                </a:solidFill>
+              </a:rPr>
+              <a:t>View users</a:t>
+            </a:r>
+          </a:p>
+        </p:txBody>
+      </p:sp>
+      <p:sp>
+        <p:nvSpPr>
+          <p:cNvPr id="7" name="Rectangle 6">
+            <a:extLst>
+              <a:ext uri="{FF2B5EF4-FFF2-40B4-BE49-F238E27FC236}">
+                <a16:creationId xmlns:a16="http://schemas.microsoft.com/office/drawing/2014/main" id="{1B235E0F-009B-1013-6831-46A3F03BD58E}"/>
+              </a:ext>
+            </a:extLst>
+          </p:cNvPr>
+          <p:cNvSpPr/>
+          <p:nvPr/>
+        </p:nvSpPr>
+        <p:spPr>
+          <a:xfrm>
+            <a:off x="119676" y="126220"/>
+            <a:ext cx="1172394" cy="807813"/>
+          </a:xfrm>
+          <a:prstGeom prst="rect">
+            <a:avLst/>
+          </a:prstGeom>
+          <a:solidFill>
+            <a:schemeClr val="bg1"/>
+          </a:solidFill>
+          <a:ln>
+            <a:solidFill>
+              <a:schemeClr val="bg1"/>
+            </a:solidFill>
+          </a:ln>
+        </p:spPr>
+        <p:style>
+          <a:lnRef idx="2">
+            <a:schemeClr val="accent1">
+              <a:shade val="15000"/>
+            </a:schemeClr>
+          </a:lnRef>
+          <a:fillRef idx="1">
+            <a:schemeClr val="accent1"/>
+          </a:fillRef>
+          <a:effectRef idx="0">
+            <a:schemeClr val="accent1"/>
+          </a:effectRef>
+          <a:fontRef idx="minor">
+            <a:schemeClr val="lt1"/>
+          </a:fontRef>
+        </p:style>
+        <p:txBody>
+          <a:bodyPr rtlCol="0" anchor="ctr"/>
+          <a:lstStyle/>
+          <a:p>
+            <a:pPr algn="ctr"/>
+            <a:r>
+              <a:rPr lang="en-GB" dirty="0">
+                <a:ln>
+                  <a:solidFill>
+                    <a:schemeClr val="tx1"/>
+                  </a:solidFill>
+                </a:ln>
+                <a:solidFill>
+                  <a:sysClr val="windowText" lastClr="000000"/>
+                </a:solidFill>
+              </a:rPr>
+              <a:t>Add stock</a:t>
+            </a:r>
+          </a:p>
+        </p:txBody>
+      </p:sp>
+      <p:sp>
+        <p:nvSpPr>
+          <p:cNvPr id="10" name="Rectangle 9">
+            <a:extLst>
+              <a:ext uri="{FF2B5EF4-FFF2-40B4-BE49-F238E27FC236}">
+                <a16:creationId xmlns:a16="http://schemas.microsoft.com/office/drawing/2014/main" id="{F1057B64-A798-249A-5611-A65D107D054E}"/>
+              </a:ext>
+            </a:extLst>
+          </p:cNvPr>
+          <p:cNvSpPr/>
+          <p:nvPr/>
+        </p:nvSpPr>
+        <p:spPr>
+          <a:xfrm>
+            <a:off x="1450958" y="126210"/>
+            <a:ext cx="1366073" cy="807813"/>
+          </a:xfrm>
+          <a:prstGeom prst="rect">
+            <a:avLst/>
+          </a:prstGeom>
+          <a:solidFill>
+            <a:schemeClr val="bg1"/>
+          </a:solidFill>
+          <a:ln>
+            <a:solidFill>
+              <a:schemeClr val="bg1"/>
+            </a:solidFill>
+          </a:ln>
+        </p:spPr>
+        <p:style>
+          <a:lnRef idx="2">
+            <a:schemeClr val="accent1">
+              <a:shade val="15000"/>
+            </a:schemeClr>
+          </a:lnRef>
+          <a:fillRef idx="1">
+            <a:schemeClr val="accent1"/>
+          </a:fillRef>
+          <a:effectRef idx="0">
+            <a:schemeClr val="accent1"/>
+          </a:effectRef>
+          <a:fontRef idx="minor">
+            <a:schemeClr val="lt1"/>
+          </a:fontRef>
+        </p:style>
+        <p:txBody>
+          <a:bodyPr rtlCol="0" anchor="ctr"/>
+          <a:lstStyle/>
+          <a:p>
+            <a:pPr algn="ctr"/>
+            <a:r>
+              <a:rPr lang="en-GB" dirty="0">
+                <a:ln>
+                  <a:solidFill>
+                    <a:schemeClr val="tx1"/>
+                  </a:solidFill>
+                </a:ln>
+                <a:solidFill>
+                  <a:sysClr val="windowText" lastClr="000000"/>
+                </a:solidFill>
+              </a:rPr>
+              <a:t>Generate barcodes</a:t>
+            </a:r>
+          </a:p>
+        </p:txBody>
+      </p:sp>
+      <p:sp>
+        <p:nvSpPr>
+          <p:cNvPr id="11" name="Rectangle 10">
+            <a:extLst>
+              <a:ext uri="{FF2B5EF4-FFF2-40B4-BE49-F238E27FC236}">
+                <a16:creationId xmlns:a16="http://schemas.microsoft.com/office/drawing/2014/main" id="{ADDEAA7B-FEE5-32EE-3E35-D027BA8F5919}"/>
+              </a:ext>
+            </a:extLst>
+          </p:cNvPr>
+          <p:cNvSpPr/>
+          <p:nvPr/>
+        </p:nvSpPr>
+        <p:spPr>
+          <a:xfrm>
+            <a:off x="2942464" y="126210"/>
+            <a:ext cx="1325525" cy="807813"/>
+          </a:xfrm>
+          <a:prstGeom prst="rect">
+            <a:avLst/>
+          </a:prstGeom>
+          <a:solidFill>
+            <a:schemeClr val="bg1"/>
+          </a:solidFill>
+          <a:ln>
+            <a:solidFill>
+              <a:schemeClr val="bg1"/>
+            </a:solidFill>
+          </a:ln>
+        </p:spPr>
+        <p:style>
+          <a:lnRef idx="2">
+            <a:schemeClr val="accent1">
+              <a:shade val="15000"/>
+            </a:schemeClr>
+          </a:lnRef>
+          <a:fillRef idx="1">
+            <a:schemeClr val="accent1"/>
+          </a:fillRef>
+          <a:effectRef idx="0">
+            <a:schemeClr val="accent1"/>
+          </a:effectRef>
+          <a:fontRef idx="minor">
+            <a:schemeClr val="lt1"/>
+          </a:fontRef>
+        </p:style>
+        <p:txBody>
+          <a:bodyPr rtlCol="0" anchor="ctr"/>
+          <a:lstStyle/>
+          <a:p>
+            <a:pPr algn="ctr"/>
+            <a:r>
+              <a:rPr lang="en-GB" dirty="0">
+                <a:ln>
+                  <a:solidFill>
+                    <a:schemeClr val="tx1"/>
+                  </a:solidFill>
+                </a:ln>
+                <a:solidFill>
+                  <a:sysClr val="windowText" lastClr="000000"/>
+                </a:solidFill>
+              </a:rPr>
+              <a:t>Checkout system</a:t>
+            </a:r>
+          </a:p>
+        </p:txBody>
+      </p:sp>
+      <p:sp>
+        <p:nvSpPr>
+          <p:cNvPr id="14" name="Rectangle 13">
+            <a:extLst>
+              <a:ext uri="{FF2B5EF4-FFF2-40B4-BE49-F238E27FC236}">
+                <a16:creationId xmlns:a16="http://schemas.microsoft.com/office/drawing/2014/main" id="{97F62398-4A97-5D3B-8996-A9D3A1BDEE7B}"/>
+              </a:ext>
+            </a:extLst>
+          </p:cNvPr>
+          <p:cNvSpPr/>
+          <p:nvPr/>
+        </p:nvSpPr>
+        <p:spPr>
+          <a:xfrm>
+            <a:off x="4400310" y="126209"/>
+            <a:ext cx="1172395" cy="807813"/>
+          </a:xfrm>
+          <a:prstGeom prst="rect">
+            <a:avLst/>
+          </a:prstGeom>
+          <a:solidFill>
+            <a:schemeClr val="bg1"/>
+          </a:solidFill>
+          <a:ln>
+            <a:solidFill>
+              <a:schemeClr val="bg1"/>
+            </a:solidFill>
+          </a:ln>
+        </p:spPr>
+        <p:style>
+          <a:lnRef idx="2">
+            <a:schemeClr val="accent1">
+              <a:shade val="15000"/>
+            </a:schemeClr>
+          </a:lnRef>
+          <a:fillRef idx="1">
+            <a:schemeClr val="accent1"/>
+          </a:fillRef>
+          <a:effectRef idx="0">
+            <a:schemeClr val="accent1"/>
+          </a:effectRef>
+          <a:fontRef idx="minor">
+            <a:schemeClr val="lt1"/>
+          </a:fontRef>
+        </p:style>
+        <p:txBody>
+          <a:bodyPr rtlCol="0" anchor="ctr"/>
+          <a:lstStyle/>
+          <a:p>
+            <a:pPr algn="ctr"/>
+            <a:r>
+              <a:rPr lang="en-GB" dirty="0">
+                <a:ln>
+                  <a:solidFill>
+                    <a:schemeClr val="tx1"/>
+                  </a:solidFill>
+                </a:ln>
+                <a:solidFill>
+                  <a:sysClr val="windowText" lastClr="000000"/>
+                </a:solidFill>
+              </a:rPr>
+              <a:t>Add users</a:t>
+            </a:r>
+          </a:p>
+        </p:txBody>
+      </p:sp>
+      <p:sp>
+        <p:nvSpPr>
+          <p:cNvPr id="16" name="Rectangle 15">
+            <a:extLst>
+              <a:ext uri="{FF2B5EF4-FFF2-40B4-BE49-F238E27FC236}">
+                <a16:creationId xmlns:a16="http://schemas.microsoft.com/office/drawing/2014/main" id="{E3E50C83-BD8B-3902-9CC0-E4A64D5A12E2}"/>
+              </a:ext>
+            </a:extLst>
+          </p:cNvPr>
+          <p:cNvSpPr/>
+          <p:nvPr/>
+        </p:nvSpPr>
+        <p:spPr>
+          <a:xfrm>
+            <a:off x="43967" y="1186464"/>
+            <a:ext cx="5234940" cy="2606040"/>
+          </a:xfrm>
+          <a:prstGeom prst="rect">
+            <a:avLst/>
+          </a:prstGeom>
+          <a:solidFill>
+            <a:schemeClr val="bg1"/>
+          </a:solidFill>
+          <a:ln>
+            <a:solidFill>
+              <a:schemeClr val="tx1"/>
+            </a:solidFill>
+          </a:ln>
+        </p:spPr>
+        <p:style>
+          <a:lnRef idx="2">
+            <a:schemeClr val="accent1">
+              <a:shade val="15000"/>
+            </a:schemeClr>
+          </a:lnRef>
+          <a:fillRef idx="1">
+            <a:schemeClr val="accent1"/>
+          </a:fillRef>
+          <a:effectRef idx="0">
+            <a:schemeClr val="accent1"/>
+          </a:effectRef>
+          <a:fontRef idx="minor">
+            <a:schemeClr val="lt1"/>
+          </a:fontRef>
+        </p:style>
+        <p:txBody>
+          <a:bodyPr rtlCol="0" anchor="ctr"/>
+          <a:lstStyle/>
+          <a:p>
+            <a:pPr algn="ctr"/>
+            <a:r>
+              <a:rPr lang="en-GB" dirty="0">
+                <a:ln>
+                  <a:solidFill>
+                    <a:schemeClr val="tx1"/>
+                  </a:solidFill>
+                </a:ln>
+                <a:solidFill>
+                  <a:sysClr val="windowText" lastClr="000000"/>
+                </a:solidFill>
+              </a:rPr>
+              <a:t>Most recent sale totals</a:t>
+            </a:r>
+          </a:p>
+        </p:txBody>
+      </p:sp>
+      <p:sp>
+        <p:nvSpPr>
+          <p:cNvPr id="17" name="Rectangle 16">
+            <a:extLst>
+              <a:ext uri="{FF2B5EF4-FFF2-40B4-BE49-F238E27FC236}">
+                <a16:creationId xmlns:a16="http://schemas.microsoft.com/office/drawing/2014/main" id="{25749210-7804-DA47-2C62-637B30562334}"/>
+              </a:ext>
+            </a:extLst>
+          </p:cNvPr>
+          <p:cNvSpPr/>
+          <p:nvPr/>
+        </p:nvSpPr>
+        <p:spPr>
+          <a:xfrm>
+            <a:off x="10823807" y="126208"/>
+            <a:ext cx="1256063" cy="807813"/>
+          </a:xfrm>
+          <a:prstGeom prst="rect">
+            <a:avLst/>
+          </a:prstGeom>
+          <a:solidFill>
+            <a:schemeClr val="bg1"/>
+          </a:solidFill>
+          <a:ln>
+            <a:solidFill>
+              <a:schemeClr val="bg1"/>
+            </a:solidFill>
+          </a:ln>
+        </p:spPr>
+        <p:style>
+          <a:lnRef idx="2">
+            <a:schemeClr val="accent1">
+              <a:shade val="15000"/>
+            </a:schemeClr>
+          </a:lnRef>
+          <a:fillRef idx="1">
+            <a:schemeClr val="accent1"/>
+          </a:fillRef>
+          <a:effectRef idx="0">
+            <a:schemeClr val="accent1"/>
+          </a:effectRef>
+          <a:fontRef idx="minor">
+            <a:schemeClr val="lt1"/>
+          </a:fontRef>
+        </p:style>
+        <p:txBody>
+          <a:bodyPr rtlCol="0" anchor="ctr"/>
+          <a:lstStyle/>
+          <a:p>
+            <a:pPr algn="ctr"/>
+            <a:r>
+              <a:rPr lang="en-GB" dirty="0">
+                <a:ln>
+                  <a:solidFill>
+                    <a:schemeClr val="tx1"/>
+                  </a:solidFill>
+                </a:ln>
+                <a:solidFill>
+                  <a:sysClr val="windowText" lastClr="000000"/>
+                </a:solidFill>
+              </a:rPr>
+              <a:t>Manage accounts</a:t>
+            </a:r>
+          </a:p>
+        </p:txBody>
+      </p:sp>
+      <p:sp>
+        <p:nvSpPr>
+          <p:cNvPr id="18" name="Rectangle 17">
+            <a:extLst>
+              <a:ext uri="{FF2B5EF4-FFF2-40B4-BE49-F238E27FC236}">
+                <a16:creationId xmlns:a16="http://schemas.microsoft.com/office/drawing/2014/main" id="{9C1AD78B-99EF-6B34-C7A9-570119DD32FA}"/>
+              </a:ext>
+            </a:extLst>
+          </p:cNvPr>
+          <p:cNvSpPr/>
+          <p:nvPr/>
+        </p:nvSpPr>
+        <p:spPr>
+          <a:xfrm>
+            <a:off x="7007765" y="126209"/>
+            <a:ext cx="1366073" cy="807813"/>
+          </a:xfrm>
+          <a:prstGeom prst="rect">
+            <a:avLst/>
+          </a:prstGeom>
+          <a:solidFill>
+            <a:schemeClr val="bg1"/>
+          </a:solidFill>
+          <a:ln>
+            <a:solidFill>
+              <a:schemeClr val="bg1"/>
+            </a:solidFill>
+          </a:ln>
+        </p:spPr>
+        <p:style>
+          <a:lnRef idx="2">
+            <a:schemeClr val="accent1">
+              <a:shade val="15000"/>
+            </a:schemeClr>
+          </a:lnRef>
+          <a:fillRef idx="1">
+            <a:schemeClr val="accent1"/>
+          </a:fillRef>
+          <a:effectRef idx="0">
+            <a:schemeClr val="accent1"/>
+          </a:effectRef>
+          <a:fontRef idx="minor">
+            <a:schemeClr val="lt1"/>
+          </a:fontRef>
+        </p:style>
+        <p:txBody>
+          <a:bodyPr rtlCol="0" anchor="ctr"/>
+          <a:lstStyle/>
+          <a:p>
+            <a:pPr algn="ctr"/>
+            <a:r>
+              <a:rPr lang="en-GB" dirty="0">
+                <a:ln>
+                  <a:solidFill>
+                    <a:schemeClr val="tx1"/>
+                  </a:solidFill>
+                </a:ln>
+                <a:solidFill>
+                  <a:sysClr val="windowText" lastClr="000000"/>
+                </a:solidFill>
+              </a:rPr>
+              <a:t>Edit/add uniform</a:t>
+            </a:r>
+          </a:p>
+        </p:txBody>
+      </p:sp>
+      <p:sp>
+        <p:nvSpPr>
+          <p:cNvPr id="19" name="Rectangle 18">
+            <a:extLst>
+              <a:ext uri="{FF2B5EF4-FFF2-40B4-BE49-F238E27FC236}">
+                <a16:creationId xmlns:a16="http://schemas.microsoft.com/office/drawing/2014/main" id="{9DB5B571-8669-F8E7-C91C-9F08725B9C3A}"/>
+              </a:ext>
+            </a:extLst>
+          </p:cNvPr>
+          <p:cNvSpPr/>
+          <p:nvPr/>
+        </p:nvSpPr>
+        <p:spPr>
+          <a:xfrm>
+            <a:off x="8475920" y="126208"/>
+            <a:ext cx="1172394" cy="807813"/>
+          </a:xfrm>
+          <a:prstGeom prst="rect">
+            <a:avLst/>
+          </a:prstGeom>
+          <a:solidFill>
+            <a:schemeClr val="bg1"/>
+          </a:solidFill>
+          <a:ln>
+            <a:solidFill>
+              <a:schemeClr val="bg1"/>
+            </a:solidFill>
+          </a:ln>
+        </p:spPr>
+        <p:style>
+          <a:lnRef idx="2">
+            <a:schemeClr val="accent1">
+              <a:shade val="15000"/>
+            </a:schemeClr>
+          </a:lnRef>
+          <a:fillRef idx="1">
+            <a:schemeClr val="accent1"/>
+          </a:fillRef>
+          <a:effectRef idx="0">
+            <a:schemeClr val="accent1"/>
+          </a:effectRef>
+          <a:fontRef idx="minor">
+            <a:schemeClr val="lt1"/>
+          </a:fontRef>
+        </p:style>
+        <p:txBody>
+          <a:bodyPr rtlCol="0" anchor="ctr"/>
+          <a:lstStyle/>
+          <a:p>
+            <a:pPr algn="ctr"/>
+            <a:r>
+              <a:rPr lang="en-GB" dirty="0">
+                <a:ln>
+                  <a:solidFill>
+                    <a:schemeClr val="tx1"/>
+                  </a:solidFill>
+                </a:ln>
+                <a:solidFill>
+                  <a:sysClr val="windowText" lastClr="000000"/>
+                </a:solidFill>
+              </a:rPr>
+              <a:t>Send emails</a:t>
+            </a:r>
+          </a:p>
+        </p:txBody>
+      </p:sp>
+      <p:sp>
+        <p:nvSpPr>
+          <p:cNvPr id="20" name="Rectangle 19">
+            <a:extLst>
+              <a:ext uri="{FF2B5EF4-FFF2-40B4-BE49-F238E27FC236}">
+                <a16:creationId xmlns:a16="http://schemas.microsoft.com/office/drawing/2014/main" id="{E9CE9F39-4A52-9052-EE58-6E892902AC2F}"/>
+              </a:ext>
+            </a:extLst>
+          </p:cNvPr>
+          <p:cNvSpPr/>
+          <p:nvPr/>
+        </p:nvSpPr>
+        <p:spPr>
+          <a:xfrm>
+            <a:off x="9710325" y="126208"/>
+            <a:ext cx="1030717" cy="807813"/>
+          </a:xfrm>
+          <a:prstGeom prst="rect">
+            <a:avLst/>
+          </a:prstGeom>
+          <a:solidFill>
+            <a:schemeClr val="bg1"/>
+          </a:solidFill>
+          <a:ln>
+            <a:solidFill>
+              <a:schemeClr val="bg1"/>
+            </a:solidFill>
+          </a:ln>
+        </p:spPr>
+        <p:style>
+          <a:lnRef idx="2">
+            <a:schemeClr val="accent1">
+              <a:shade val="15000"/>
+            </a:schemeClr>
+          </a:lnRef>
+          <a:fillRef idx="1">
+            <a:schemeClr val="accent1"/>
+          </a:fillRef>
+          <a:effectRef idx="0">
+            <a:schemeClr val="accent1"/>
+          </a:effectRef>
+          <a:fontRef idx="minor">
+            <a:schemeClr val="lt1"/>
+          </a:fontRef>
+        </p:style>
+        <p:txBody>
+          <a:bodyPr rtlCol="0" anchor="ctr"/>
+          <a:lstStyle/>
+          <a:p>
+            <a:pPr algn="ctr"/>
+            <a:r>
+              <a:rPr lang="en-GB" dirty="0">
+                <a:ln>
+                  <a:solidFill>
+                    <a:schemeClr val="tx1"/>
+                  </a:solidFill>
+                </a:ln>
+                <a:solidFill>
+                  <a:sysClr val="windowText" lastClr="000000"/>
+                </a:solidFill>
+              </a:rPr>
+              <a:t>Publish news</a:t>
             </a:r>
           </a:p>
         </p:txBody>
@@ -6091,7 +8445,7 @@
     </p:spTree>
     <p:extLst>
       <p:ext uri="{BB962C8B-B14F-4D97-AF65-F5344CB8AC3E}">
-        <p14:creationId xmlns:p14="http://schemas.microsoft.com/office/powerpoint/2010/main" val="2088973411"/>
+        <p14:creationId xmlns:p14="http://schemas.microsoft.com/office/powerpoint/2010/main" val="242514022"/>
       </p:ext>
     </p:extLst>
   </p:cSld>

</xml_diff>

<commit_message>
work on checkout page and other pages created
</commit_message>
<xml_diff>
--- a/Writeup/Page designs.pptx
+++ b/Writeup/Page designs.pptx
@@ -218,7 +218,7 @@
           <a:p>
             <a:fld id="{E9CC816A-2BD1-4061-B4C6-11C98283D186}" type="datetimeFigureOut">
               <a:rPr lang="en-GB" smtClean="0"/>
-              <a:t>17/04/2024</a:t>
+              <a:t>22/04/2024</a:t>
             </a:fld>
             <a:endParaRPr lang="en-GB"/>
           </a:p>
@@ -1475,7 +1475,7 @@
           <a:p>
             <a:fld id="{3CBDC1A8-91DF-46E5-9524-B8D429E478EA}" type="datetimeFigureOut">
               <a:rPr lang="en-GB" smtClean="0"/>
-              <a:t>17/04/2024</a:t>
+              <a:t>22/04/2024</a:t>
             </a:fld>
             <a:endParaRPr lang="en-GB"/>
           </a:p>
@@ -1675,7 +1675,7 @@
           <a:p>
             <a:fld id="{3CBDC1A8-91DF-46E5-9524-B8D429E478EA}" type="datetimeFigureOut">
               <a:rPr lang="en-GB" smtClean="0"/>
-              <a:t>17/04/2024</a:t>
+              <a:t>22/04/2024</a:t>
             </a:fld>
             <a:endParaRPr lang="en-GB"/>
           </a:p>
@@ -1885,7 +1885,7 @@
           <a:p>
             <a:fld id="{3CBDC1A8-91DF-46E5-9524-B8D429E478EA}" type="datetimeFigureOut">
               <a:rPr lang="en-GB" smtClean="0"/>
-              <a:t>17/04/2024</a:t>
+              <a:t>22/04/2024</a:t>
             </a:fld>
             <a:endParaRPr lang="en-GB"/>
           </a:p>
@@ -2085,7 +2085,7 @@
           <a:p>
             <a:fld id="{3CBDC1A8-91DF-46E5-9524-B8D429E478EA}" type="datetimeFigureOut">
               <a:rPr lang="en-GB" smtClean="0"/>
-              <a:t>17/04/2024</a:t>
+              <a:t>22/04/2024</a:t>
             </a:fld>
             <a:endParaRPr lang="en-GB"/>
           </a:p>
@@ -2361,7 +2361,7 @@
           <a:p>
             <a:fld id="{3CBDC1A8-91DF-46E5-9524-B8D429E478EA}" type="datetimeFigureOut">
               <a:rPr lang="en-GB" smtClean="0"/>
-              <a:t>17/04/2024</a:t>
+              <a:t>22/04/2024</a:t>
             </a:fld>
             <a:endParaRPr lang="en-GB"/>
           </a:p>
@@ -2629,7 +2629,7 @@
           <a:p>
             <a:fld id="{3CBDC1A8-91DF-46E5-9524-B8D429E478EA}" type="datetimeFigureOut">
               <a:rPr lang="en-GB" smtClean="0"/>
-              <a:t>17/04/2024</a:t>
+              <a:t>22/04/2024</a:t>
             </a:fld>
             <a:endParaRPr lang="en-GB"/>
           </a:p>
@@ -3044,7 +3044,7 @@
           <a:p>
             <a:fld id="{3CBDC1A8-91DF-46E5-9524-B8D429E478EA}" type="datetimeFigureOut">
               <a:rPr lang="en-GB" smtClean="0"/>
-              <a:t>17/04/2024</a:t>
+              <a:t>22/04/2024</a:t>
             </a:fld>
             <a:endParaRPr lang="en-GB"/>
           </a:p>
@@ -3186,7 +3186,7 @@
           <a:p>
             <a:fld id="{3CBDC1A8-91DF-46E5-9524-B8D429E478EA}" type="datetimeFigureOut">
               <a:rPr lang="en-GB" smtClean="0"/>
-              <a:t>17/04/2024</a:t>
+              <a:t>22/04/2024</a:t>
             </a:fld>
             <a:endParaRPr lang="en-GB"/>
           </a:p>
@@ -3299,7 +3299,7 @@
           <a:p>
             <a:fld id="{3CBDC1A8-91DF-46E5-9524-B8D429E478EA}" type="datetimeFigureOut">
               <a:rPr lang="en-GB" smtClean="0"/>
-              <a:t>17/04/2024</a:t>
+              <a:t>22/04/2024</a:t>
             </a:fld>
             <a:endParaRPr lang="en-GB"/>
           </a:p>
@@ -3612,7 +3612,7 @@
           <a:p>
             <a:fld id="{3CBDC1A8-91DF-46E5-9524-B8D429E478EA}" type="datetimeFigureOut">
               <a:rPr lang="en-GB" smtClean="0"/>
-              <a:t>17/04/2024</a:t>
+              <a:t>22/04/2024</a:t>
             </a:fld>
             <a:endParaRPr lang="en-GB"/>
           </a:p>
@@ -3901,7 +3901,7 @@
           <a:p>
             <a:fld id="{3CBDC1A8-91DF-46E5-9524-B8D429E478EA}" type="datetimeFigureOut">
               <a:rPr lang="en-GB" smtClean="0"/>
-              <a:t>17/04/2024</a:t>
+              <a:t>22/04/2024</a:t>
             </a:fld>
             <a:endParaRPr lang="en-GB"/>
           </a:p>
@@ -4144,7 +4144,7 @@
           <a:p>
             <a:fld id="{3CBDC1A8-91DF-46E5-9524-B8D429E478EA}" type="datetimeFigureOut">
               <a:rPr lang="en-GB" smtClean="0"/>
-              <a:t>17/04/2024</a:t>
+              <a:t>22/04/2024</a:t>
             </a:fld>
             <a:endParaRPr lang="en-GB"/>
           </a:p>
@@ -10692,7 +10692,7 @@
         </p:nvSpPr>
         <p:spPr>
           <a:xfrm>
-            <a:off x="2163516" y="5095522"/>
+            <a:off x="2212606" y="4181122"/>
             <a:ext cx="2013924" cy="369332"/>
           </a:xfrm>
           <a:prstGeom prst="rect">
@@ -10769,7 +10769,7 @@
         </p:nvSpPr>
         <p:spPr>
           <a:xfrm>
-            <a:off x="2354250" y="4296279"/>
+            <a:off x="2402566" y="3390206"/>
             <a:ext cx="1632456" cy="369332"/>
           </a:xfrm>
           <a:prstGeom prst="rect">
@@ -10791,46 +10791,6 @@
             <a:r>
               <a:rPr lang="en-GB" dirty="0"/>
               <a:t>Add to basket</a:t>
-            </a:r>
-          </a:p>
-        </p:txBody>
-      </p:sp>
-      <p:sp>
-        <p:nvSpPr>
-          <p:cNvPr id="12" name="TextBox 11">
-            <a:extLst>
-              <a:ext uri="{FF2B5EF4-FFF2-40B4-BE49-F238E27FC236}">
-                <a16:creationId xmlns:a16="http://schemas.microsoft.com/office/drawing/2014/main" id="{EBCBAB51-6718-76E7-DACD-96208BA2E837}"/>
-              </a:ext>
-            </a:extLst>
-          </p:cNvPr>
-          <p:cNvSpPr txBox="1"/>
-          <p:nvPr/>
-        </p:nvSpPr>
-        <p:spPr>
-          <a:xfrm>
-            <a:off x="1518524" y="2917769"/>
-            <a:ext cx="3018573" cy="646331"/>
-          </a:xfrm>
-          <a:prstGeom prst="rect">
-            <a:avLst/>
-          </a:prstGeom>
-          <a:noFill/>
-          <a:ln>
-            <a:solidFill>
-              <a:schemeClr val="tx1"/>
-            </a:solidFill>
-          </a:ln>
-        </p:spPr>
-        <p:txBody>
-          <a:bodyPr wrap="square" rtlCol="0">
-            <a:spAutoFit/>
-          </a:bodyPr>
-          <a:lstStyle/>
-          <a:p>
-            <a:r>
-              <a:rPr lang="en-GB" dirty="0"/>
-              <a:t>Details of item after barcode has been scanned</a:t>
             </a:r>
           </a:p>
         </p:txBody>

</xml_diff>

<commit_message>
log out css and boostrap started
</commit_message>
<xml_diff>
--- a/Writeup/Page designs.pptx
+++ b/Writeup/Page designs.pptx
@@ -5,7 +5,7 @@
     <p:sldMasterId id="2147483648" r:id="rId1"/>
   </p:sldMasterIdLst>
   <p:notesMasterIdLst>
-    <p:notesMasterId r:id="rId24"/>
+    <p:notesMasterId r:id="rId26"/>
   </p:notesMasterIdLst>
   <p:sldIdLst>
     <p:sldId id="257" r:id="rId2"/>
@@ -22,14 +22,16 @@
     <p:sldId id="273" r:id="rId13"/>
     <p:sldId id="263" r:id="rId14"/>
     <p:sldId id="275" r:id="rId15"/>
-    <p:sldId id="264" r:id="rId16"/>
-    <p:sldId id="276" r:id="rId17"/>
-    <p:sldId id="265" r:id="rId18"/>
-    <p:sldId id="266" r:id="rId19"/>
-    <p:sldId id="270" r:id="rId20"/>
-    <p:sldId id="272" r:id="rId21"/>
-    <p:sldId id="278" r:id="rId22"/>
-    <p:sldId id="277" r:id="rId23"/>
+    <p:sldId id="279" r:id="rId16"/>
+    <p:sldId id="280" r:id="rId17"/>
+    <p:sldId id="264" r:id="rId18"/>
+    <p:sldId id="276" r:id="rId19"/>
+    <p:sldId id="265" r:id="rId20"/>
+    <p:sldId id="266" r:id="rId21"/>
+    <p:sldId id="270" r:id="rId22"/>
+    <p:sldId id="272" r:id="rId23"/>
+    <p:sldId id="278" r:id="rId24"/>
+    <p:sldId id="277" r:id="rId25"/>
   </p:sldIdLst>
   <p:sldSz cx="12192000" cy="6858000"/>
   <p:notesSz cx="6858000" cy="9144000"/>
@@ -218,7 +220,7 @@
           <a:p>
             <a:fld id="{E9CC816A-2BD1-4061-B4C6-11C98283D186}" type="datetimeFigureOut">
               <a:rPr lang="en-GB" smtClean="0"/>
-              <a:t>20/07/2024</a:t>
+              <a:t>23/08/2024</a:t>
             </a:fld>
             <a:endParaRPr lang="en-GB"/>
           </a:p>
@@ -644,6 +646,90 @@
     </p:spTree>
     <p:extLst>
       <p:ext uri="{BB962C8B-B14F-4D97-AF65-F5344CB8AC3E}">
+        <p14:creationId xmlns:p14="http://schemas.microsoft.com/office/powerpoint/2010/main" val="3526703631"/>
+      </p:ext>
+    </p:extLst>
+  </p:cSld>
+  <p:clrMapOvr>
+    <a:masterClrMapping/>
+  </p:clrMapOvr>
+</p:notes>
+</file>
+
+<file path=ppt/notesSlides/notesSlide11.xml><?xml version="1.0" encoding="utf-8"?>
+<p:notes xmlns:a="http://schemas.openxmlformats.org/drawingml/2006/main" xmlns:r="http://schemas.openxmlformats.org/officeDocument/2006/relationships" xmlns:p="http://schemas.openxmlformats.org/presentationml/2006/main">
+  <p:cSld>
+    <p:spTree>
+      <p:nvGrpSpPr>
+        <p:cNvPr id="1" name=""/>
+        <p:cNvGrpSpPr/>
+        <p:nvPr/>
+      </p:nvGrpSpPr>
+      <p:grpSpPr>
+        <a:xfrm>
+          <a:off x="0" y="0"/>
+          <a:ext cx="0" cy="0"/>
+          <a:chOff x="0" y="0"/>
+          <a:chExt cx="0" cy="0"/>
+        </a:xfrm>
+      </p:grpSpPr>
+      <p:sp>
+        <p:nvSpPr>
+          <p:cNvPr id="2" name="Slide Image Placeholder 1"/>
+          <p:cNvSpPr>
+            <a:spLocks noGrp="1" noRot="1" noChangeAspect="1"/>
+          </p:cNvSpPr>
+          <p:nvPr>
+            <p:ph type="sldImg"/>
+          </p:nvPr>
+        </p:nvSpPr>
+        <p:spPr/>
+      </p:sp>
+      <p:sp>
+        <p:nvSpPr>
+          <p:cNvPr id="3" name="Notes Placeholder 2"/>
+          <p:cNvSpPr>
+            <a:spLocks noGrp="1"/>
+          </p:cNvSpPr>
+          <p:nvPr>
+            <p:ph type="body" idx="1"/>
+          </p:nvPr>
+        </p:nvSpPr>
+        <p:spPr/>
+        <p:txBody>
+          <a:bodyPr/>
+          <a:lstStyle/>
+          <a:p>
+            <a:endParaRPr lang="en-GB" dirty="0"/>
+          </a:p>
+        </p:txBody>
+      </p:sp>
+      <p:sp>
+        <p:nvSpPr>
+          <p:cNvPr id="4" name="Slide Number Placeholder 3"/>
+          <p:cNvSpPr>
+            <a:spLocks noGrp="1"/>
+          </p:cNvSpPr>
+          <p:nvPr>
+            <p:ph type="sldNum" sz="quarter" idx="5"/>
+          </p:nvPr>
+        </p:nvSpPr>
+        <p:spPr/>
+        <p:txBody>
+          <a:bodyPr/>
+          <a:lstStyle/>
+          <a:p>
+            <a:fld id="{C74020FE-8C96-4489-AA9C-8781786544CA}" type="slidenum">
+              <a:rPr lang="en-GB" smtClean="0"/>
+              <a:t>24</a:t>
+            </a:fld>
+            <a:endParaRPr lang="en-GB"/>
+          </a:p>
+        </p:txBody>
+      </p:sp>
+    </p:spTree>
+    <p:extLst>
+      <p:ext uri="{BB962C8B-B14F-4D97-AF65-F5344CB8AC3E}">
         <p14:creationId xmlns:p14="http://schemas.microsoft.com/office/powerpoint/2010/main" val="627384832"/>
       </p:ext>
     </p:extLst>
@@ -1232,7 +1318,7 @@
     </p:spTree>
     <p:extLst>
       <p:ext uri="{BB962C8B-B14F-4D97-AF65-F5344CB8AC3E}">
-        <p14:creationId xmlns:p14="http://schemas.microsoft.com/office/powerpoint/2010/main" val="1958444617"/>
+        <p14:creationId xmlns:p14="http://schemas.microsoft.com/office/powerpoint/2010/main" val="3166221353"/>
       </p:ext>
     </p:extLst>
   </p:cSld>
@@ -1307,7 +1393,7 @@
           <a:p>
             <a:fld id="{C74020FE-8C96-4489-AA9C-8781786544CA}" type="slidenum">
               <a:rPr lang="en-GB" smtClean="0"/>
-              <a:t>20</a:t>
+              <a:t>18</a:t>
             </a:fld>
             <a:endParaRPr lang="en-GB"/>
           </a:p>
@@ -1316,7 +1402,7 @@
     </p:spTree>
     <p:extLst>
       <p:ext uri="{BB962C8B-B14F-4D97-AF65-F5344CB8AC3E}">
-        <p14:creationId xmlns:p14="http://schemas.microsoft.com/office/powerpoint/2010/main" val="3526703631"/>
+        <p14:creationId xmlns:p14="http://schemas.microsoft.com/office/powerpoint/2010/main" val="1958444617"/>
       </p:ext>
     </p:extLst>
   </p:cSld>
@@ -1475,7 +1561,7 @@
           <a:p>
             <a:fld id="{3CBDC1A8-91DF-46E5-9524-B8D429E478EA}" type="datetimeFigureOut">
               <a:rPr lang="en-GB" smtClean="0"/>
-              <a:t>20/07/2024</a:t>
+              <a:t>23/08/2024</a:t>
             </a:fld>
             <a:endParaRPr lang="en-GB"/>
           </a:p>
@@ -1675,7 +1761,7 @@
           <a:p>
             <a:fld id="{3CBDC1A8-91DF-46E5-9524-B8D429E478EA}" type="datetimeFigureOut">
               <a:rPr lang="en-GB" smtClean="0"/>
-              <a:t>20/07/2024</a:t>
+              <a:t>23/08/2024</a:t>
             </a:fld>
             <a:endParaRPr lang="en-GB"/>
           </a:p>
@@ -1885,7 +1971,7 @@
           <a:p>
             <a:fld id="{3CBDC1A8-91DF-46E5-9524-B8D429E478EA}" type="datetimeFigureOut">
               <a:rPr lang="en-GB" smtClean="0"/>
-              <a:t>20/07/2024</a:t>
+              <a:t>23/08/2024</a:t>
             </a:fld>
             <a:endParaRPr lang="en-GB"/>
           </a:p>
@@ -2085,7 +2171,7 @@
           <a:p>
             <a:fld id="{3CBDC1A8-91DF-46E5-9524-B8D429E478EA}" type="datetimeFigureOut">
               <a:rPr lang="en-GB" smtClean="0"/>
-              <a:t>20/07/2024</a:t>
+              <a:t>23/08/2024</a:t>
             </a:fld>
             <a:endParaRPr lang="en-GB"/>
           </a:p>
@@ -2361,7 +2447,7 @@
           <a:p>
             <a:fld id="{3CBDC1A8-91DF-46E5-9524-B8D429E478EA}" type="datetimeFigureOut">
               <a:rPr lang="en-GB" smtClean="0"/>
-              <a:t>20/07/2024</a:t>
+              <a:t>23/08/2024</a:t>
             </a:fld>
             <a:endParaRPr lang="en-GB"/>
           </a:p>
@@ -2629,7 +2715,7 @@
           <a:p>
             <a:fld id="{3CBDC1A8-91DF-46E5-9524-B8D429E478EA}" type="datetimeFigureOut">
               <a:rPr lang="en-GB" smtClean="0"/>
-              <a:t>20/07/2024</a:t>
+              <a:t>23/08/2024</a:t>
             </a:fld>
             <a:endParaRPr lang="en-GB"/>
           </a:p>
@@ -3044,7 +3130,7 @@
           <a:p>
             <a:fld id="{3CBDC1A8-91DF-46E5-9524-B8D429E478EA}" type="datetimeFigureOut">
               <a:rPr lang="en-GB" smtClean="0"/>
-              <a:t>20/07/2024</a:t>
+              <a:t>23/08/2024</a:t>
             </a:fld>
             <a:endParaRPr lang="en-GB"/>
           </a:p>
@@ -3186,7 +3272,7 @@
           <a:p>
             <a:fld id="{3CBDC1A8-91DF-46E5-9524-B8D429E478EA}" type="datetimeFigureOut">
               <a:rPr lang="en-GB" smtClean="0"/>
-              <a:t>20/07/2024</a:t>
+              <a:t>23/08/2024</a:t>
             </a:fld>
             <a:endParaRPr lang="en-GB"/>
           </a:p>
@@ -3299,7 +3385,7 @@
           <a:p>
             <a:fld id="{3CBDC1A8-91DF-46E5-9524-B8D429E478EA}" type="datetimeFigureOut">
               <a:rPr lang="en-GB" smtClean="0"/>
-              <a:t>20/07/2024</a:t>
+              <a:t>23/08/2024</a:t>
             </a:fld>
             <a:endParaRPr lang="en-GB"/>
           </a:p>
@@ -3612,7 +3698,7 @@
           <a:p>
             <a:fld id="{3CBDC1A8-91DF-46E5-9524-B8D429E478EA}" type="datetimeFigureOut">
               <a:rPr lang="en-GB" smtClean="0"/>
-              <a:t>20/07/2024</a:t>
+              <a:t>23/08/2024</a:t>
             </a:fld>
             <a:endParaRPr lang="en-GB"/>
           </a:p>
@@ -3901,7 +3987,7 @@
           <a:p>
             <a:fld id="{3CBDC1A8-91DF-46E5-9524-B8D429E478EA}" type="datetimeFigureOut">
               <a:rPr lang="en-GB" smtClean="0"/>
-              <a:t>20/07/2024</a:t>
+              <a:t>23/08/2024</a:t>
             </a:fld>
             <a:endParaRPr lang="en-GB"/>
           </a:p>
@@ -4144,7 +4230,7 @@
           <a:p>
             <a:fld id="{3CBDC1A8-91DF-46E5-9524-B8D429E478EA}" type="datetimeFigureOut">
               <a:rPr lang="en-GB" smtClean="0"/>
-              <a:t>20/07/2024</a:t>
+              <a:t>23/08/2024</a:t>
             </a:fld>
             <a:endParaRPr lang="en-GB"/>
           </a:p>
@@ -8232,7 +8318,7 @@
           <a:p>
             <a:r>
               <a:rPr lang="en-GB" dirty="0"/>
-              <a:t>About us</a:t>
+              <a:t>Log out page</a:t>
             </a:r>
           </a:p>
         </p:txBody>
@@ -8240,7 +8326,7 @@
     </p:spTree>
     <p:extLst>
       <p:ext uri="{BB962C8B-B14F-4D97-AF65-F5344CB8AC3E}">
-        <p14:creationId xmlns:p14="http://schemas.microsoft.com/office/powerpoint/2010/main" val="2570558528"/>
+        <p14:creationId xmlns:p14="http://schemas.microsoft.com/office/powerpoint/2010/main" val="2826922569"/>
       </p:ext>
     </p:extLst>
   </p:cSld>
@@ -8315,10 +8401,10 @@
       </p:sp>
       <p:sp>
         <p:nvSpPr>
-          <p:cNvPr id="8" name="Rectangle 7">
-            <a:extLst>
-              <a:ext uri="{FF2B5EF4-FFF2-40B4-BE49-F238E27FC236}">
-                <a16:creationId xmlns:a16="http://schemas.microsoft.com/office/drawing/2014/main" id="{E1F92674-1E4F-BD6E-BCFA-515BC8899218}"/>
+          <p:cNvPr id="16" name="Rectangle 15">
+            <a:extLst>
+              <a:ext uri="{FF2B5EF4-FFF2-40B4-BE49-F238E27FC236}">
+                <a16:creationId xmlns:a16="http://schemas.microsoft.com/office/drawing/2014/main" id="{9368184F-328B-6E2F-3DB4-EECE1443F551}"/>
               </a:ext>
             </a:extLst>
           </p:cNvPr>
@@ -8327,8 +8413,8 @@
         </p:nvSpPr>
         <p:spPr>
           <a:xfrm>
-            <a:off x="0" y="1060253"/>
-            <a:ext cx="12192000" cy="3001254"/>
+            <a:off x="3405511" y="2501009"/>
+            <a:ext cx="4917938" cy="3046968"/>
           </a:xfrm>
           <a:prstGeom prst="rect">
             <a:avLst/>
@@ -8338,7 +8424,7 @@
           </a:solidFill>
           <a:ln>
             <a:solidFill>
-              <a:schemeClr val="tx2"/>
+              <a:schemeClr val="tx1"/>
             </a:solidFill>
           </a:ln>
         </p:spPr>
@@ -8363,77 +8449,16 @@
           <a:lstStyle/>
           <a:p>
             <a:pPr algn="ctr"/>
-            <a:r>
-              <a:rPr lang="en-GB" dirty="0">
-                <a:ln>
-                  <a:solidFill>
-                    <a:schemeClr val="tx1"/>
-                  </a:solidFill>
-                </a:ln>
-                <a:solidFill>
-                  <a:sysClr val="windowText" lastClr="000000"/>
-                </a:solidFill>
-              </a:rPr>
-              <a:t>Carousel of photos of the shop</a:t>
-            </a:r>
-          </a:p>
-        </p:txBody>
-      </p:sp>
-      <p:sp>
-        <p:nvSpPr>
-          <p:cNvPr id="12" name="Rectangle 11">
-            <a:extLst>
-              <a:ext uri="{FF2B5EF4-FFF2-40B4-BE49-F238E27FC236}">
-                <a16:creationId xmlns:a16="http://schemas.microsoft.com/office/drawing/2014/main" id="{4FC0F75B-D0F6-EB98-651C-83630B6F5E22}"/>
-              </a:ext>
-            </a:extLst>
-          </p:cNvPr>
-          <p:cNvSpPr/>
-          <p:nvPr/>
-        </p:nvSpPr>
-        <p:spPr>
-          <a:xfrm>
-            <a:off x="8650335" y="4207362"/>
-            <a:ext cx="3315401" cy="2521612"/>
-          </a:xfrm>
-          <a:prstGeom prst="rect">
-            <a:avLst/>
-          </a:prstGeom>
-          <a:solidFill>
-            <a:schemeClr val="bg1"/>
-          </a:solidFill>
-        </p:spPr>
-        <p:style>
-          <a:lnRef idx="2">
-            <a:schemeClr val="accent1">
-              <a:shade val="15000"/>
-            </a:schemeClr>
-          </a:lnRef>
-          <a:fillRef idx="1">
-            <a:schemeClr val="accent1"/>
-          </a:fillRef>
-          <a:effectRef idx="0">
-            <a:schemeClr val="accent1"/>
-          </a:effectRef>
-          <a:fontRef idx="minor">
-            <a:schemeClr val="lt1"/>
-          </a:fontRef>
-        </p:style>
-        <p:txBody>
-          <a:bodyPr rtlCol="0" anchor="ctr"/>
-          <a:lstStyle/>
-          <a:p>
-            <a:pPr algn="ctr"/>
             <a:endParaRPr lang="en-GB"/>
           </a:p>
         </p:txBody>
       </p:sp>
       <p:sp>
         <p:nvSpPr>
-          <p:cNvPr id="15" name="TextBox 14">
-            <a:extLst>
-              <a:ext uri="{FF2B5EF4-FFF2-40B4-BE49-F238E27FC236}">
-                <a16:creationId xmlns:a16="http://schemas.microsoft.com/office/drawing/2014/main" id="{8611A3C2-34EF-4BDF-C813-E020C88C1133}"/>
+          <p:cNvPr id="17" name="TextBox 16">
+            <a:extLst>
+              <a:ext uri="{FF2B5EF4-FFF2-40B4-BE49-F238E27FC236}">
+                <a16:creationId xmlns:a16="http://schemas.microsoft.com/office/drawing/2014/main" id="{617934B9-0327-094A-3954-F41C84F50B62}"/>
               </a:ext>
             </a:extLst>
           </p:cNvPr>
@@ -8442,8 +8467,8 @@
         </p:nvSpPr>
         <p:spPr>
           <a:xfrm>
-            <a:off x="9648885" y="4297119"/>
-            <a:ext cx="2530027" cy="369332"/>
+            <a:off x="3802290" y="3547439"/>
+            <a:ext cx="4124379" cy="954107"/>
           </a:xfrm>
           <a:prstGeom prst="rect">
             <a:avLst/>
@@ -8456,77 +8481,20 @@
           </a:bodyPr>
           <a:lstStyle/>
           <a:p>
-            <a:r>
-              <a:rPr lang="en-GB" dirty="0"/>
-              <a:t>Sale dates</a:t>
-            </a:r>
-          </a:p>
-        </p:txBody>
-      </p:sp>
-      <p:sp>
-        <p:nvSpPr>
-          <p:cNvPr id="2" name="Rectangle 1">
-            <a:extLst>
-              <a:ext uri="{FF2B5EF4-FFF2-40B4-BE49-F238E27FC236}">
-                <a16:creationId xmlns:a16="http://schemas.microsoft.com/office/drawing/2014/main" id="{5354D9DD-2179-AD98-FA0F-5B1B59BD3C07}"/>
-              </a:ext>
-            </a:extLst>
-          </p:cNvPr>
-          <p:cNvSpPr/>
-          <p:nvPr/>
-        </p:nvSpPr>
-        <p:spPr>
-          <a:xfrm>
-            <a:off x="80404" y="5427313"/>
-            <a:ext cx="8412855" cy="866951"/>
-          </a:xfrm>
-          <a:prstGeom prst="rect">
-            <a:avLst/>
-          </a:prstGeom>
-          <a:solidFill>
-            <a:schemeClr val="bg1"/>
-          </a:solidFill>
-        </p:spPr>
-        <p:style>
-          <a:lnRef idx="2">
-            <a:schemeClr val="accent1">
-              <a:shade val="15000"/>
-            </a:schemeClr>
-          </a:lnRef>
-          <a:fillRef idx="1">
-            <a:schemeClr val="accent1"/>
-          </a:fillRef>
-          <a:effectRef idx="0">
-            <a:schemeClr val="accent1"/>
-          </a:effectRef>
-          <a:fontRef idx="minor">
-            <a:schemeClr val="lt1"/>
-          </a:fontRef>
-        </p:style>
-        <p:txBody>
-          <a:bodyPr rtlCol="0" anchor="ctr"/>
-          <a:lstStyle/>
-          <a:p>
             <a:pPr algn="ctr"/>
-            <a:endParaRPr lang="en-GB" dirty="0">
-              <a:ln>
-                <a:solidFill>
-                  <a:sysClr val="windowText" lastClr="000000"/>
-                </a:solidFill>
-              </a:ln>
-              <a:solidFill>
-                <a:sysClr val="windowText" lastClr="000000"/>
-              </a:solidFill>
-            </a:endParaRPr>
-          </a:p>
-        </p:txBody>
-      </p:sp>
-      <p:sp>
-        <p:nvSpPr>
-          <p:cNvPr id="3" name="TextBox 2">
-            <a:extLst>
-              <a:ext uri="{FF2B5EF4-FFF2-40B4-BE49-F238E27FC236}">
-                <a16:creationId xmlns:a16="http://schemas.microsoft.com/office/drawing/2014/main" id="{F393F2CC-04CE-1DA4-0F83-0A961500573B}"/>
+            <a:r>
+              <a:rPr lang="en-GB" sz="2800" b="1" dirty="0"/>
+              <a:t>You have been logged out successfully </a:t>
+            </a:r>
+          </a:p>
+        </p:txBody>
+      </p:sp>
+      <p:sp>
+        <p:nvSpPr>
+          <p:cNvPr id="26" name="TextBox 25">
+            <a:extLst>
+              <a:ext uri="{FF2B5EF4-FFF2-40B4-BE49-F238E27FC236}">
+                <a16:creationId xmlns:a16="http://schemas.microsoft.com/office/drawing/2014/main" id="{4C500488-5DCB-19A6-A2BF-69B0C6793E84}"/>
               </a:ext>
             </a:extLst>
           </p:cNvPr>
@@ -8535,8 +8503,8 @@
         </p:nvSpPr>
         <p:spPr>
           <a:xfrm>
-            <a:off x="119675" y="5480044"/>
-            <a:ext cx="7318941" cy="754053"/>
+            <a:off x="9149610" y="2947275"/>
+            <a:ext cx="2120510" cy="646331"/>
           </a:xfrm>
           <a:prstGeom prst="rect">
             <a:avLst/>
@@ -8551,127 +8519,17 @@
           <a:p>
             <a:r>
               <a:rPr lang="en-GB" dirty="0"/>
-              <a:t>Contact us</a:t>
-            </a:r>
-          </a:p>
-          <a:p>
-            <a:endParaRPr lang="en-GB" sz="1100" dirty="0"/>
-          </a:p>
-          <a:p>
-            <a:r>
-              <a:rPr lang="en-GB" sz="1400" dirty="0"/>
-              <a:t>Contact information</a:t>
-            </a:r>
-          </a:p>
-        </p:txBody>
-      </p:sp>
-      <p:sp>
-        <p:nvSpPr>
-          <p:cNvPr id="6" name="Rectangle 5">
-            <a:extLst>
-              <a:ext uri="{FF2B5EF4-FFF2-40B4-BE49-F238E27FC236}">
-                <a16:creationId xmlns:a16="http://schemas.microsoft.com/office/drawing/2014/main" id="{ABFEF8E5-DA72-EA90-9306-A618666F88DF}"/>
-              </a:ext>
-            </a:extLst>
-          </p:cNvPr>
-          <p:cNvSpPr/>
-          <p:nvPr/>
-        </p:nvSpPr>
-        <p:spPr>
-          <a:xfrm>
-            <a:off x="80406" y="4207363"/>
-            <a:ext cx="8412855" cy="1096720"/>
-          </a:xfrm>
-          <a:prstGeom prst="rect">
-            <a:avLst/>
-          </a:prstGeom>
-          <a:solidFill>
-            <a:schemeClr val="bg1"/>
-          </a:solidFill>
-        </p:spPr>
-        <p:style>
-          <a:lnRef idx="2">
-            <a:schemeClr val="accent1">
-              <a:shade val="15000"/>
-            </a:schemeClr>
-          </a:lnRef>
-          <a:fillRef idx="1">
-            <a:schemeClr val="accent1"/>
-          </a:fillRef>
-          <a:effectRef idx="0">
-            <a:schemeClr val="accent1"/>
-          </a:effectRef>
-          <a:fontRef idx="minor">
-            <a:schemeClr val="lt1"/>
-          </a:fontRef>
-        </p:style>
-        <p:txBody>
-          <a:bodyPr rtlCol="0" anchor="ctr"/>
-          <a:lstStyle/>
-          <a:p>
-            <a:pPr algn="ctr"/>
-            <a:r>
-              <a:rPr lang="en-GB" dirty="0">
-                <a:ln>
-                  <a:solidFill>
-                    <a:sysClr val="windowText" lastClr="000000"/>
-                  </a:solidFill>
-                </a:ln>
-                <a:solidFill>
-                  <a:sysClr val="windowText" lastClr="000000"/>
-                </a:solidFill>
-              </a:rPr>
-              <a:t>Text about the shop/FOLSS</a:t>
-            </a:r>
-          </a:p>
-        </p:txBody>
-      </p:sp>
-      <p:sp>
-        <p:nvSpPr>
-          <p:cNvPr id="13" name="TextBox 12">
-            <a:extLst>
-              <a:ext uri="{FF2B5EF4-FFF2-40B4-BE49-F238E27FC236}">
-                <a16:creationId xmlns:a16="http://schemas.microsoft.com/office/drawing/2014/main" id="{049AE113-98B6-C25E-C9CF-7143406FB006}"/>
-              </a:ext>
-            </a:extLst>
-          </p:cNvPr>
-          <p:cNvSpPr txBox="1"/>
-          <p:nvPr/>
-        </p:nvSpPr>
-        <p:spPr>
-          <a:xfrm>
-            <a:off x="80405" y="6410058"/>
-            <a:ext cx="8412855" cy="338554"/>
-          </a:xfrm>
-          <a:prstGeom prst="rect">
-            <a:avLst/>
-          </a:prstGeom>
-          <a:noFill/>
-          <a:ln w="19050">
-            <a:solidFill>
-              <a:schemeClr val="tx1"/>
-            </a:solidFill>
-          </a:ln>
-        </p:spPr>
-        <p:txBody>
-          <a:bodyPr wrap="square" rtlCol="0">
-            <a:spAutoFit/>
-          </a:bodyPr>
-          <a:lstStyle/>
-          <a:p>
-            <a:r>
-              <a:rPr lang="en-GB" sz="1600" dirty="0"/>
-              <a:t>Privacy/returns policies</a:t>
-            </a:r>
-          </a:p>
-        </p:txBody>
-      </p:sp>
-      <p:sp>
-        <p:nvSpPr>
-          <p:cNvPr id="23" name="Rectangle 22">
-            <a:extLst>
-              <a:ext uri="{FF2B5EF4-FFF2-40B4-BE49-F238E27FC236}">
-                <a16:creationId xmlns:a16="http://schemas.microsoft.com/office/drawing/2014/main" id="{1B32BAE8-DF0E-3803-9078-0FC631252DD0}"/>
+              <a:t>Photo of shop in background</a:t>
+            </a:r>
+          </a:p>
+        </p:txBody>
+      </p:sp>
+      <p:sp>
+        <p:nvSpPr>
+          <p:cNvPr id="9" name="Rectangle 8">
+            <a:extLst>
+              <a:ext uri="{FF2B5EF4-FFF2-40B4-BE49-F238E27FC236}">
+                <a16:creationId xmlns:a16="http://schemas.microsoft.com/office/drawing/2014/main" id="{12857BDA-47D1-9DA2-138C-81432C8D5930}"/>
               </a:ext>
             </a:extLst>
           </p:cNvPr>
@@ -8734,10 +8592,10 @@
       </p:sp>
       <p:sp>
         <p:nvSpPr>
-          <p:cNvPr id="24" name="Rectangle 23">
-            <a:extLst>
-              <a:ext uri="{FF2B5EF4-FFF2-40B4-BE49-F238E27FC236}">
-                <a16:creationId xmlns:a16="http://schemas.microsoft.com/office/drawing/2014/main" id="{4F872A8E-6A82-0EB0-0E33-DECF5B2B4F15}"/>
+          <p:cNvPr id="12" name="Rectangle 11">
+            <a:extLst>
+              <a:ext uri="{FF2B5EF4-FFF2-40B4-BE49-F238E27FC236}">
+                <a16:creationId xmlns:a16="http://schemas.microsoft.com/office/drawing/2014/main" id="{0A4D8183-659B-FC5E-CC4B-A88D245CFFE1}"/>
               </a:ext>
             </a:extLst>
           </p:cNvPr>
@@ -8800,10 +8658,10 @@
       </p:sp>
       <p:sp>
         <p:nvSpPr>
-          <p:cNvPr id="25" name="Rectangle 24">
-            <a:extLst>
-              <a:ext uri="{FF2B5EF4-FFF2-40B4-BE49-F238E27FC236}">
-                <a16:creationId xmlns:a16="http://schemas.microsoft.com/office/drawing/2014/main" id="{1A17B72D-EC2C-9699-3AE2-5709649AADD1}"/>
+          <p:cNvPr id="13" name="Rectangle 12">
+            <a:extLst>
+              <a:ext uri="{FF2B5EF4-FFF2-40B4-BE49-F238E27FC236}">
+                <a16:creationId xmlns:a16="http://schemas.microsoft.com/office/drawing/2014/main" id="{ECFB57C8-B8F1-DBED-4BA0-FD4EB939A781}"/>
               </a:ext>
             </a:extLst>
           </p:cNvPr>
@@ -8866,10 +8724,10 @@
       </p:sp>
       <p:sp>
         <p:nvSpPr>
-          <p:cNvPr id="26" name="Rectangle 25">
-            <a:extLst>
-              <a:ext uri="{FF2B5EF4-FFF2-40B4-BE49-F238E27FC236}">
-                <a16:creationId xmlns:a16="http://schemas.microsoft.com/office/drawing/2014/main" id="{FB574E8B-F699-ABEB-9794-9C30DEB2251D}"/>
+          <p:cNvPr id="15" name="Rectangle 14">
+            <a:extLst>
+              <a:ext uri="{FF2B5EF4-FFF2-40B4-BE49-F238E27FC236}">
+                <a16:creationId xmlns:a16="http://schemas.microsoft.com/office/drawing/2014/main" id="{079B2B3C-C041-9186-9CE9-A7D16CCB2A4A}"/>
               </a:ext>
             </a:extLst>
           </p:cNvPr>
@@ -8932,10 +8790,10 @@
       </p:sp>
       <p:sp>
         <p:nvSpPr>
-          <p:cNvPr id="27" name="Rectangle 26">
-            <a:extLst>
-              <a:ext uri="{FF2B5EF4-FFF2-40B4-BE49-F238E27FC236}">
-                <a16:creationId xmlns:a16="http://schemas.microsoft.com/office/drawing/2014/main" id="{8EB46E95-6FA0-2DCF-DA14-C280DF39E6D1}"/>
+          <p:cNvPr id="20" name="Rectangle 19">
+            <a:extLst>
+              <a:ext uri="{FF2B5EF4-FFF2-40B4-BE49-F238E27FC236}">
+                <a16:creationId xmlns:a16="http://schemas.microsoft.com/office/drawing/2014/main" id="{68CCAFCC-7AF6-7A8D-7508-021E201ED08D}"/>
               </a:ext>
             </a:extLst>
           </p:cNvPr>
@@ -8998,10 +8856,10 @@
       </p:sp>
       <p:sp>
         <p:nvSpPr>
-          <p:cNvPr id="28" name="Rectangle 27">
-            <a:extLst>
-              <a:ext uri="{FF2B5EF4-FFF2-40B4-BE49-F238E27FC236}">
-                <a16:creationId xmlns:a16="http://schemas.microsoft.com/office/drawing/2014/main" id="{2BD270B0-3C25-2E48-E45B-D6E556B06FE1}"/>
+          <p:cNvPr id="23" name="Rectangle 22">
+            <a:extLst>
+              <a:ext uri="{FF2B5EF4-FFF2-40B4-BE49-F238E27FC236}">
+                <a16:creationId xmlns:a16="http://schemas.microsoft.com/office/drawing/2014/main" id="{57D17F97-0B76-F3E9-9A11-718516C560D2}"/>
               </a:ext>
             </a:extLst>
           </p:cNvPr>
@@ -9064,10 +8922,10 @@
       </p:sp>
       <p:sp>
         <p:nvSpPr>
-          <p:cNvPr id="29" name="Rectangle 28">
-            <a:extLst>
-              <a:ext uri="{FF2B5EF4-FFF2-40B4-BE49-F238E27FC236}">
-                <a16:creationId xmlns:a16="http://schemas.microsoft.com/office/drawing/2014/main" id="{CAFBEAD1-D3B6-1B1E-C357-A7881427C69F}"/>
+          <p:cNvPr id="28" name="Rectangle 27">
+            <a:extLst>
+              <a:ext uri="{FF2B5EF4-FFF2-40B4-BE49-F238E27FC236}">
+                <a16:creationId xmlns:a16="http://schemas.microsoft.com/office/drawing/2014/main" id="{B080945A-751C-D24A-277C-A57ACE014FCB}"/>
               </a:ext>
             </a:extLst>
           </p:cNvPr>
@@ -9131,7 +8989,7 @@
     </p:spTree>
     <p:extLst>
       <p:ext uri="{BB962C8B-B14F-4D97-AF65-F5344CB8AC3E}">
-        <p14:creationId xmlns:p14="http://schemas.microsoft.com/office/powerpoint/2010/main" val="2216582272"/>
+        <p14:creationId xmlns:p14="http://schemas.microsoft.com/office/powerpoint/2010/main" val="2055111104"/>
       </p:ext>
     </p:extLst>
   </p:cSld>
@@ -9181,7 +9039,7 @@
           <a:p>
             <a:r>
               <a:rPr lang="en-GB" dirty="0"/>
-              <a:t>Online Shop</a:t>
+              <a:t>About us</a:t>
             </a:r>
           </a:p>
         </p:txBody>
@@ -9189,7 +9047,7 @@
     </p:spTree>
     <p:extLst>
       <p:ext uri="{BB962C8B-B14F-4D97-AF65-F5344CB8AC3E}">
-        <p14:creationId xmlns:p14="http://schemas.microsoft.com/office/powerpoint/2010/main" val="3384611430"/>
+        <p14:creationId xmlns:p14="http://schemas.microsoft.com/office/powerpoint/2010/main" val="2570558528"/>
       </p:ext>
     </p:extLst>
   </p:cSld>
@@ -9218,28 +9076,861 @@
       </p:grpSpPr>
       <p:sp>
         <p:nvSpPr>
-          <p:cNvPr id="2" name="Title 1">
-            <a:extLst>
-              <a:ext uri="{FF2B5EF4-FFF2-40B4-BE49-F238E27FC236}">
-                <a16:creationId xmlns:a16="http://schemas.microsoft.com/office/drawing/2014/main" id="{587A13A3-98F1-A632-56E3-7D2561130BE8}"/>
-              </a:ext>
-            </a:extLst>
-          </p:cNvPr>
-          <p:cNvSpPr>
-            <a:spLocks noGrp="1"/>
-          </p:cNvSpPr>
-          <p:nvPr>
-            <p:ph type="title"/>
-          </p:nvPr>
-        </p:nvSpPr>
-        <p:spPr/>
-        <p:txBody>
-          <a:bodyPr/>
+          <p:cNvPr id="4" name="Rectangle 3">
+            <a:extLst>
+              <a:ext uri="{FF2B5EF4-FFF2-40B4-BE49-F238E27FC236}">
+                <a16:creationId xmlns:a16="http://schemas.microsoft.com/office/drawing/2014/main" id="{9DF92B7C-3248-8476-5639-82C1CDFBFA0C}"/>
+              </a:ext>
+            </a:extLst>
+          </p:cNvPr>
+          <p:cNvSpPr/>
+          <p:nvPr/>
+        </p:nvSpPr>
+        <p:spPr>
+          <a:xfrm>
+            <a:off x="0" y="0"/>
+            <a:ext cx="12192000" cy="1060255"/>
+          </a:xfrm>
+          <a:prstGeom prst="rect">
+            <a:avLst/>
+          </a:prstGeom>
+        </p:spPr>
+        <p:style>
+          <a:lnRef idx="2">
+            <a:schemeClr val="accent1">
+              <a:shade val="15000"/>
+            </a:schemeClr>
+          </a:lnRef>
+          <a:fillRef idx="1">
+            <a:schemeClr val="accent1"/>
+          </a:fillRef>
+          <a:effectRef idx="0">
+            <a:schemeClr val="accent1"/>
+          </a:effectRef>
+          <a:fontRef idx="minor">
+            <a:schemeClr val="lt1"/>
+          </a:fontRef>
+        </p:style>
+        <p:txBody>
+          <a:bodyPr rtlCol="0" anchor="ctr"/>
+          <a:lstStyle/>
+          <a:p>
+            <a:pPr algn="ctr"/>
+            <a:endParaRPr lang="en-GB"/>
+          </a:p>
+        </p:txBody>
+      </p:sp>
+      <p:sp>
+        <p:nvSpPr>
+          <p:cNvPr id="8" name="Rectangle 7">
+            <a:extLst>
+              <a:ext uri="{FF2B5EF4-FFF2-40B4-BE49-F238E27FC236}">
+                <a16:creationId xmlns:a16="http://schemas.microsoft.com/office/drawing/2014/main" id="{E1F92674-1E4F-BD6E-BCFA-515BC8899218}"/>
+              </a:ext>
+            </a:extLst>
+          </p:cNvPr>
+          <p:cNvSpPr/>
+          <p:nvPr/>
+        </p:nvSpPr>
+        <p:spPr>
+          <a:xfrm>
+            <a:off x="0" y="1060253"/>
+            <a:ext cx="12192000" cy="3001254"/>
+          </a:xfrm>
+          <a:prstGeom prst="rect">
+            <a:avLst/>
+          </a:prstGeom>
+          <a:solidFill>
+            <a:schemeClr val="bg1"/>
+          </a:solidFill>
+          <a:ln>
+            <a:solidFill>
+              <a:schemeClr val="tx2"/>
+            </a:solidFill>
+          </a:ln>
+        </p:spPr>
+        <p:style>
+          <a:lnRef idx="2">
+            <a:schemeClr val="accent1">
+              <a:shade val="15000"/>
+            </a:schemeClr>
+          </a:lnRef>
+          <a:fillRef idx="1">
+            <a:schemeClr val="accent1"/>
+          </a:fillRef>
+          <a:effectRef idx="0">
+            <a:schemeClr val="accent1"/>
+          </a:effectRef>
+          <a:fontRef idx="minor">
+            <a:schemeClr val="lt1"/>
+          </a:fontRef>
+        </p:style>
+        <p:txBody>
+          <a:bodyPr rtlCol="0" anchor="ctr"/>
+          <a:lstStyle/>
+          <a:p>
+            <a:pPr algn="ctr"/>
+            <a:r>
+              <a:rPr lang="en-GB" dirty="0">
+                <a:ln>
+                  <a:solidFill>
+                    <a:schemeClr val="tx1"/>
+                  </a:solidFill>
+                </a:ln>
+                <a:solidFill>
+                  <a:sysClr val="windowText" lastClr="000000"/>
+                </a:solidFill>
+              </a:rPr>
+              <a:t>Carousel of photos of the shop</a:t>
+            </a:r>
+          </a:p>
+        </p:txBody>
+      </p:sp>
+      <p:sp>
+        <p:nvSpPr>
+          <p:cNvPr id="12" name="Rectangle 11">
+            <a:extLst>
+              <a:ext uri="{FF2B5EF4-FFF2-40B4-BE49-F238E27FC236}">
+                <a16:creationId xmlns:a16="http://schemas.microsoft.com/office/drawing/2014/main" id="{4FC0F75B-D0F6-EB98-651C-83630B6F5E22}"/>
+              </a:ext>
+            </a:extLst>
+          </p:cNvPr>
+          <p:cNvSpPr/>
+          <p:nvPr/>
+        </p:nvSpPr>
+        <p:spPr>
+          <a:xfrm>
+            <a:off x="8650335" y="4207362"/>
+            <a:ext cx="3315401" cy="2521612"/>
+          </a:xfrm>
+          <a:prstGeom prst="rect">
+            <a:avLst/>
+          </a:prstGeom>
+          <a:solidFill>
+            <a:schemeClr val="bg1"/>
+          </a:solidFill>
+        </p:spPr>
+        <p:style>
+          <a:lnRef idx="2">
+            <a:schemeClr val="accent1">
+              <a:shade val="15000"/>
+            </a:schemeClr>
+          </a:lnRef>
+          <a:fillRef idx="1">
+            <a:schemeClr val="accent1"/>
+          </a:fillRef>
+          <a:effectRef idx="0">
+            <a:schemeClr val="accent1"/>
+          </a:effectRef>
+          <a:fontRef idx="minor">
+            <a:schemeClr val="lt1"/>
+          </a:fontRef>
+        </p:style>
+        <p:txBody>
+          <a:bodyPr rtlCol="0" anchor="ctr"/>
+          <a:lstStyle/>
+          <a:p>
+            <a:pPr algn="ctr"/>
+            <a:endParaRPr lang="en-GB"/>
+          </a:p>
+        </p:txBody>
+      </p:sp>
+      <p:sp>
+        <p:nvSpPr>
+          <p:cNvPr id="15" name="TextBox 14">
+            <a:extLst>
+              <a:ext uri="{FF2B5EF4-FFF2-40B4-BE49-F238E27FC236}">
+                <a16:creationId xmlns:a16="http://schemas.microsoft.com/office/drawing/2014/main" id="{8611A3C2-34EF-4BDF-C813-E020C88C1133}"/>
+              </a:ext>
+            </a:extLst>
+          </p:cNvPr>
+          <p:cNvSpPr txBox="1"/>
+          <p:nvPr/>
+        </p:nvSpPr>
+        <p:spPr>
+          <a:xfrm>
+            <a:off x="9648885" y="4297119"/>
+            <a:ext cx="2530027" cy="369332"/>
+          </a:xfrm>
+          <a:prstGeom prst="rect">
+            <a:avLst/>
+          </a:prstGeom>
+          <a:noFill/>
+        </p:spPr>
+        <p:txBody>
+          <a:bodyPr wrap="square" rtlCol="0">
+            <a:spAutoFit/>
+          </a:bodyPr>
           <a:lstStyle/>
           <a:p>
             <a:r>
               <a:rPr lang="en-GB" dirty="0"/>
-              <a:t>Add users</a:t>
+              <a:t>Sale dates</a:t>
+            </a:r>
+          </a:p>
+        </p:txBody>
+      </p:sp>
+      <p:sp>
+        <p:nvSpPr>
+          <p:cNvPr id="2" name="Rectangle 1">
+            <a:extLst>
+              <a:ext uri="{FF2B5EF4-FFF2-40B4-BE49-F238E27FC236}">
+                <a16:creationId xmlns:a16="http://schemas.microsoft.com/office/drawing/2014/main" id="{5354D9DD-2179-AD98-FA0F-5B1B59BD3C07}"/>
+              </a:ext>
+            </a:extLst>
+          </p:cNvPr>
+          <p:cNvSpPr/>
+          <p:nvPr/>
+        </p:nvSpPr>
+        <p:spPr>
+          <a:xfrm>
+            <a:off x="80404" y="5427313"/>
+            <a:ext cx="8412855" cy="866951"/>
+          </a:xfrm>
+          <a:prstGeom prst="rect">
+            <a:avLst/>
+          </a:prstGeom>
+          <a:solidFill>
+            <a:schemeClr val="bg1"/>
+          </a:solidFill>
+        </p:spPr>
+        <p:style>
+          <a:lnRef idx="2">
+            <a:schemeClr val="accent1">
+              <a:shade val="15000"/>
+            </a:schemeClr>
+          </a:lnRef>
+          <a:fillRef idx="1">
+            <a:schemeClr val="accent1"/>
+          </a:fillRef>
+          <a:effectRef idx="0">
+            <a:schemeClr val="accent1"/>
+          </a:effectRef>
+          <a:fontRef idx="minor">
+            <a:schemeClr val="lt1"/>
+          </a:fontRef>
+        </p:style>
+        <p:txBody>
+          <a:bodyPr rtlCol="0" anchor="ctr"/>
+          <a:lstStyle/>
+          <a:p>
+            <a:pPr algn="ctr"/>
+            <a:endParaRPr lang="en-GB" dirty="0">
+              <a:ln>
+                <a:solidFill>
+                  <a:sysClr val="windowText" lastClr="000000"/>
+                </a:solidFill>
+              </a:ln>
+              <a:solidFill>
+                <a:sysClr val="windowText" lastClr="000000"/>
+              </a:solidFill>
+            </a:endParaRPr>
+          </a:p>
+        </p:txBody>
+      </p:sp>
+      <p:sp>
+        <p:nvSpPr>
+          <p:cNvPr id="3" name="TextBox 2">
+            <a:extLst>
+              <a:ext uri="{FF2B5EF4-FFF2-40B4-BE49-F238E27FC236}">
+                <a16:creationId xmlns:a16="http://schemas.microsoft.com/office/drawing/2014/main" id="{F393F2CC-04CE-1DA4-0F83-0A961500573B}"/>
+              </a:ext>
+            </a:extLst>
+          </p:cNvPr>
+          <p:cNvSpPr txBox="1"/>
+          <p:nvPr/>
+        </p:nvSpPr>
+        <p:spPr>
+          <a:xfrm>
+            <a:off x="119675" y="5480044"/>
+            <a:ext cx="7318941" cy="754053"/>
+          </a:xfrm>
+          <a:prstGeom prst="rect">
+            <a:avLst/>
+          </a:prstGeom>
+          <a:noFill/>
+        </p:spPr>
+        <p:txBody>
+          <a:bodyPr wrap="square" rtlCol="0">
+            <a:spAutoFit/>
+          </a:bodyPr>
+          <a:lstStyle/>
+          <a:p>
+            <a:r>
+              <a:rPr lang="en-GB" dirty="0"/>
+              <a:t>Contact us</a:t>
+            </a:r>
+          </a:p>
+          <a:p>
+            <a:endParaRPr lang="en-GB" sz="1100" dirty="0"/>
+          </a:p>
+          <a:p>
+            <a:r>
+              <a:rPr lang="en-GB" sz="1400" dirty="0"/>
+              <a:t>Contact information</a:t>
+            </a:r>
+          </a:p>
+        </p:txBody>
+      </p:sp>
+      <p:sp>
+        <p:nvSpPr>
+          <p:cNvPr id="6" name="Rectangle 5">
+            <a:extLst>
+              <a:ext uri="{FF2B5EF4-FFF2-40B4-BE49-F238E27FC236}">
+                <a16:creationId xmlns:a16="http://schemas.microsoft.com/office/drawing/2014/main" id="{ABFEF8E5-DA72-EA90-9306-A618666F88DF}"/>
+              </a:ext>
+            </a:extLst>
+          </p:cNvPr>
+          <p:cNvSpPr/>
+          <p:nvPr/>
+        </p:nvSpPr>
+        <p:spPr>
+          <a:xfrm>
+            <a:off x="80406" y="4207363"/>
+            <a:ext cx="8412855" cy="1096720"/>
+          </a:xfrm>
+          <a:prstGeom prst="rect">
+            <a:avLst/>
+          </a:prstGeom>
+          <a:solidFill>
+            <a:schemeClr val="bg1"/>
+          </a:solidFill>
+        </p:spPr>
+        <p:style>
+          <a:lnRef idx="2">
+            <a:schemeClr val="accent1">
+              <a:shade val="15000"/>
+            </a:schemeClr>
+          </a:lnRef>
+          <a:fillRef idx="1">
+            <a:schemeClr val="accent1"/>
+          </a:fillRef>
+          <a:effectRef idx="0">
+            <a:schemeClr val="accent1"/>
+          </a:effectRef>
+          <a:fontRef idx="minor">
+            <a:schemeClr val="lt1"/>
+          </a:fontRef>
+        </p:style>
+        <p:txBody>
+          <a:bodyPr rtlCol="0" anchor="ctr"/>
+          <a:lstStyle/>
+          <a:p>
+            <a:pPr algn="ctr"/>
+            <a:r>
+              <a:rPr lang="en-GB" dirty="0">
+                <a:ln>
+                  <a:solidFill>
+                    <a:sysClr val="windowText" lastClr="000000"/>
+                  </a:solidFill>
+                </a:ln>
+                <a:solidFill>
+                  <a:sysClr val="windowText" lastClr="000000"/>
+                </a:solidFill>
+              </a:rPr>
+              <a:t>Text about the shop/FOLSS</a:t>
+            </a:r>
+          </a:p>
+        </p:txBody>
+      </p:sp>
+      <p:sp>
+        <p:nvSpPr>
+          <p:cNvPr id="13" name="TextBox 12">
+            <a:extLst>
+              <a:ext uri="{FF2B5EF4-FFF2-40B4-BE49-F238E27FC236}">
+                <a16:creationId xmlns:a16="http://schemas.microsoft.com/office/drawing/2014/main" id="{049AE113-98B6-C25E-C9CF-7143406FB006}"/>
+              </a:ext>
+            </a:extLst>
+          </p:cNvPr>
+          <p:cNvSpPr txBox="1"/>
+          <p:nvPr/>
+        </p:nvSpPr>
+        <p:spPr>
+          <a:xfrm>
+            <a:off x="80405" y="6410058"/>
+            <a:ext cx="8412855" cy="338554"/>
+          </a:xfrm>
+          <a:prstGeom prst="rect">
+            <a:avLst/>
+          </a:prstGeom>
+          <a:noFill/>
+          <a:ln w="19050">
+            <a:solidFill>
+              <a:schemeClr val="tx1"/>
+            </a:solidFill>
+          </a:ln>
+        </p:spPr>
+        <p:txBody>
+          <a:bodyPr wrap="square" rtlCol="0">
+            <a:spAutoFit/>
+          </a:bodyPr>
+          <a:lstStyle/>
+          <a:p>
+            <a:r>
+              <a:rPr lang="en-GB" sz="1600" dirty="0"/>
+              <a:t>Privacy/returns policies</a:t>
+            </a:r>
+          </a:p>
+        </p:txBody>
+      </p:sp>
+      <p:sp>
+        <p:nvSpPr>
+          <p:cNvPr id="23" name="Rectangle 22">
+            <a:extLst>
+              <a:ext uri="{FF2B5EF4-FFF2-40B4-BE49-F238E27FC236}">
+                <a16:creationId xmlns:a16="http://schemas.microsoft.com/office/drawing/2014/main" id="{1B32BAE8-DF0E-3803-9078-0FC631252DD0}"/>
+              </a:ext>
+            </a:extLst>
+          </p:cNvPr>
+          <p:cNvSpPr/>
+          <p:nvPr/>
+        </p:nvSpPr>
+        <p:spPr>
+          <a:xfrm>
+            <a:off x="10511394" y="126219"/>
+            <a:ext cx="1560931" cy="807813"/>
+          </a:xfrm>
+          <a:prstGeom prst="rect">
+            <a:avLst/>
+          </a:prstGeom>
+          <a:solidFill>
+            <a:schemeClr val="bg1"/>
+          </a:solidFill>
+          <a:ln>
+            <a:solidFill>
+              <a:schemeClr val="bg1"/>
+            </a:solidFill>
+          </a:ln>
+        </p:spPr>
+        <p:style>
+          <a:lnRef idx="2">
+            <a:schemeClr val="accent1">
+              <a:shade val="15000"/>
+            </a:schemeClr>
+          </a:lnRef>
+          <a:fillRef idx="1">
+            <a:schemeClr val="accent1"/>
+          </a:fillRef>
+          <a:effectRef idx="0">
+            <a:schemeClr val="accent1"/>
+          </a:effectRef>
+          <a:fontRef idx="minor">
+            <a:schemeClr val="lt1"/>
+          </a:fontRef>
+        </p:style>
+        <p:txBody>
+          <a:bodyPr rtlCol="0" anchor="ctr"/>
+          <a:lstStyle/>
+          <a:p>
+            <a:pPr algn="ctr"/>
+            <a:r>
+              <a:rPr lang="en-GB" dirty="0">
+                <a:ln>
+                  <a:solidFill>
+                    <a:schemeClr val="tx1"/>
+                  </a:solidFill>
+                </a:ln>
+                <a:solidFill>
+                  <a:sysClr val="windowText" lastClr="000000"/>
+                </a:solidFill>
+              </a:rPr>
+              <a:t>Login/sign up</a:t>
+            </a:r>
+          </a:p>
+        </p:txBody>
+      </p:sp>
+      <p:sp>
+        <p:nvSpPr>
+          <p:cNvPr id="24" name="Rectangle 23">
+            <a:extLst>
+              <a:ext uri="{FF2B5EF4-FFF2-40B4-BE49-F238E27FC236}">
+                <a16:creationId xmlns:a16="http://schemas.microsoft.com/office/drawing/2014/main" id="{4F872A8E-6A82-0EB0-0E33-DECF5B2B4F15}"/>
+              </a:ext>
+            </a:extLst>
+          </p:cNvPr>
+          <p:cNvSpPr/>
+          <p:nvPr/>
+        </p:nvSpPr>
+        <p:spPr>
+          <a:xfrm>
+            <a:off x="119675" y="126220"/>
+            <a:ext cx="1553923" cy="807813"/>
+          </a:xfrm>
+          <a:prstGeom prst="rect">
+            <a:avLst/>
+          </a:prstGeom>
+          <a:solidFill>
+            <a:schemeClr val="bg1"/>
+          </a:solidFill>
+          <a:ln>
+            <a:solidFill>
+              <a:schemeClr val="bg1"/>
+            </a:solidFill>
+          </a:ln>
+        </p:spPr>
+        <p:style>
+          <a:lnRef idx="2">
+            <a:schemeClr val="accent1">
+              <a:shade val="15000"/>
+            </a:schemeClr>
+          </a:lnRef>
+          <a:fillRef idx="1">
+            <a:schemeClr val="accent1"/>
+          </a:fillRef>
+          <a:effectRef idx="0">
+            <a:schemeClr val="accent1"/>
+          </a:effectRef>
+          <a:fontRef idx="minor">
+            <a:schemeClr val="lt1"/>
+          </a:fontRef>
+        </p:style>
+        <p:txBody>
+          <a:bodyPr rtlCol="0" anchor="ctr"/>
+          <a:lstStyle/>
+          <a:p>
+            <a:pPr algn="ctr"/>
+            <a:r>
+              <a:rPr lang="en-GB" dirty="0">
+                <a:ln>
+                  <a:solidFill>
+                    <a:schemeClr val="tx1"/>
+                  </a:solidFill>
+                </a:ln>
+                <a:solidFill>
+                  <a:sysClr val="windowText" lastClr="000000"/>
+                </a:solidFill>
+              </a:rPr>
+              <a:t>Home</a:t>
+            </a:r>
+          </a:p>
+        </p:txBody>
+      </p:sp>
+      <p:sp>
+        <p:nvSpPr>
+          <p:cNvPr id="25" name="Rectangle 24">
+            <a:extLst>
+              <a:ext uri="{FF2B5EF4-FFF2-40B4-BE49-F238E27FC236}">
+                <a16:creationId xmlns:a16="http://schemas.microsoft.com/office/drawing/2014/main" id="{1A17B72D-EC2C-9699-3AE2-5709649AADD1}"/>
+              </a:ext>
+            </a:extLst>
+          </p:cNvPr>
+          <p:cNvSpPr/>
+          <p:nvPr/>
+        </p:nvSpPr>
+        <p:spPr>
+          <a:xfrm>
+            <a:off x="1800281" y="121553"/>
+            <a:ext cx="1553923" cy="807813"/>
+          </a:xfrm>
+          <a:prstGeom prst="rect">
+            <a:avLst/>
+          </a:prstGeom>
+          <a:solidFill>
+            <a:schemeClr val="bg1"/>
+          </a:solidFill>
+          <a:ln>
+            <a:solidFill>
+              <a:schemeClr val="bg1"/>
+            </a:solidFill>
+          </a:ln>
+        </p:spPr>
+        <p:style>
+          <a:lnRef idx="2">
+            <a:schemeClr val="accent1">
+              <a:shade val="15000"/>
+            </a:schemeClr>
+          </a:lnRef>
+          <a:fillRef idx="1">
+            <a:schemeClr val="accent1"/>
+          </a:fillRef>
+          <a:effectRef idx="0">
+            <a:schemeClr val="accent1"/>
+          </a:effectRef>
+          <a:fontRef idx="minor">
+            <a:schemeClr val="lt1"/>
+          </a:fontRef>
+        </p:style>
+        <p:txBody>
+          <a:bodyPr rtlCol="0" anchor="ctr"/>
+          <a:lstStyle/>
+          <a:p>
+            <a:pPr algn="ctr"/>
+            <a:r>
+              <a:rPr lang="en-GB" dirty="0">
+                <a:ln>
+                  <a:solidFill>
+                    <a:schemeClr val="tx1"/>
+                  </a:solidFill>
+                </a:ln>
+                <a:solidFill>
+                  <a:sysClr val="windowText" lastClr="000000"/>
+                </a:solidFill>
+              </a:rPr>
+              <a:t>About us</a:t>
+            </a:r>
+          </a:p>
+        </p:txBody>
+      </p:sp>
+      <p:sp>
+        <p:nvSpPr>
+          <p:cNvPr id="26" name="Rectangle 25">
+            <a:extLst>
+              <a:ext uri="{FF2B5EF4-FFF2-40B4-BE49-F238E27FC236}">
+                <a16:creationId xmlns:a16="http://schemas.microsoft.com/office/drawing/2014/main" id="{FB574E8B-F699-ABEB-9794-9C30DEB2251D}"/>
+              </a:ext>
+            </a:extLst>
+          </p:cNvPr>
+          <p:cNvSpPr/>
+          <p:nvPr/>
+        </p:nvSpPr>
+        <p:spPr>
+          <a:xfrm>
+            <a:off x="3495388" y="122953"/>
+            <a:ext cx="1553923" cy="807813"/>
+          </a:xfrm>
+          <a:prstGeom prst="rect">
+            <a:avLst/>
+          </a:prstGeom>
+          <a:solidFill>
+            <a:schemeClr val="bg1"/>
+          </a:solidFill>
+          <a:ln>
+            <a:solidFill>
+              <a:schemeClr val="bg1"/>
+            </a:solidFill>
+          </a:ln>
+        </p:spPr>
+        <p:style>
+          <a:lnRef idx="2">
+            <a:schemeClr val="accent1">
+              <a:shade val="15000"/>
+            </a:schemeClr>
+          </a:lnRef>
+          <a:fillRef idx="1">
+            <a:schemeClr val="accent1"/>
+          </a:fillRef>
+          <a:effectRef idx="0">
+            <a:schemeClr val="accent1"/>
+          </a:effectRef>
+          <a:fontRef idx="minor">
+            <a:schemeClr val="lt1"/>
+          </a:fontRef>
+        </p:style>
+        <p:txBody>
+          <a:bodyPr rtlCol="0" anchor="ctr"/>
+          <a:lstStyle/>
+          <a:p>
+            <a:pPr algn="ctr"/>
+            <a:r>
+              <a:rPr lang="en-GB" dirty="0">
+                <a:ln>
+                  <a:solidFill>
+                    <a:schemeClr val="tx1"/>
+                  </a:solidFill>
+                </a:ln>
+                <a:solidFill>
+                  <a:sysClr val="windowText" lastClr="000000"/>
+                </a:solidFill>
+              </a:rPr>
+              <a:t>Shop</a:t>
+            </a:r>
+          </a:p>
+        </p:txBody>
+      </p:sp>
+      <p:sp>
+        <p:nvSpPr>
+          <p:cNvPr id="27" name="Rectangle 26">
+            <a:extLst>
+              <a:ext uri="{FF2B5EF4-FFF2-40B4-BE49-F238E27FC236}">
+                <a16:creationId xmlns:a16="http://schemas.microsoft.com/office/drawing/2014/main" id="{8EB46E95-6FA0-2DCF-DA14-C280DF39E6D1}"/>
+              </a:ext>
+            </a:extLst>
+          </p:cNvPr>
+          <p:cNvSpPr/>
+          <p:nvPr/>
+        </p:nvSpPr>
+        <p:spPr>
+          <a:xfrm>
+            <a:off x="5213160" y="118038"/>
+            <a:ext cx="1574947" cy="807813"/>
+          </a:xfrm>
+          <a:prstGeom prst="rect">
+            <a:avLst/>
+          </a:prstGeom>
+          <a:solidFill>
+            <a:schemeClr val="bg1"/>
+          </a:solidFill>
+          <a:ln>
+            <a:solidFill>
+              <a:schemeClr val="bg1"/>
+            </a:solidFill>
+          </a:ln>
+        </p:spPr>
+        <p:style>
+          <a:lnRef idx="2">
+            <a:schemeClr val="accent1">
+              <a:shade val="15000"/>
+            </a:schemeClr>
+          </a:lnRef>
+          <a:fillRef idx="1">
+            <a:schemeClr val="accent1"/>
+          </a:fillRef>
+          <a:effectRef idx="0">
+            <a:schemeClr val="accent1"/>
+          </a:effectRef>
+          <a:fontRef idx="minor">
+            <a:schemeClr val="lt1"/>
+          </a:fontRef>
+        </p:style>
+        <p:txBody>
+          <a:bodyPr rtlCol="0" anchor="ctr"/>
+          <a:lstStyle/>
+          <a:p>
+            <a:pPr algn="ctr"/>
+            <a:r>
+              <a:rPr lang="en-GB" dirty="0">
+                <a:ln>
+                  <a:solidFill>
+                    <a:schemeClr val="tx1"/>
+                  </a:solidFill>
+                </a:ln>
+                <a:solidFill>
+                  <a:sysClr val="windowText" lastClr="000000"/>
+                </a:solidFill>
+              </a:rPr>
+              <a:t>News</a:t>
+            </a:r>
+          </a:p>
+        </p:txBody>
+      </p:sp>
+      <p:sp>
+        <p:nvSpPr>
+          <p:cNvPr id="28" name="Rectangle 27">
+            <a:extLst>
+              <a:ext uri="{FF2B5EF4-FFF2-40B4-BE49-F238E27FC236}">
+                <a16:creationId xmlns:a16="http://schemas.microsoft.com/office/drawing/2014/main" id="{2BD270B0-3C25-2E48-E45B-D6E556B06FE1}"/>
+              </a:ext>
+            </a:extLst>
+          </p:cNvPr>
+          <p:cNvSpPr/>
+          <p:nvPr/>
+        </p:nvSpPr>
+        <p:spPr>
+          <a:xfrm>
+            <a:off x="8726071" y="118038"/>
+            <a:ext cx="1560931" cy="807813"/>
+          </a:xfrm>
+          <a:prstGeom prst="rect">
+            <a:avLst/>
+          </a:prstGeom>
+          <a:solidFill>
+            <a:schemeClr val="bg1"/>
+          </a:solidFill>
+          <a:ln>
+            <a:solidFill>
+              <a:schemeClr val="bg1"/>
+            </a:solidFill>
+          </a:ln>
+        </p:spPr>
+        <p:style>
+          <a:lnRef idx="2">
+            <a:schemeClr val="accent1">
+              <a:shade val="15000"/>
+            </a:schemeClr>
+          </a:lnRef>
+          <a:fillRef idx="1">
+            <a:schemeClr val="accent1"/>
+          </a:fillRef>
+          <a:effectRef idx="0">
+            <a:schemeClr val="accent1"/>
+          </a:effectRef>
+          <a:fontRef idx="minor">
+            <a:schemeClr val="lt1"/>
+          </a:fontRef>
+        </p:style>
+        <p:txBody>
+          <a:bodyPr rtlCol="0" anchor="ctr"/>
+          <a:lstStyle/>
+          <a:p>
+            <a:pPr algn="ctr"/>
+            <a:r>
+              <a:rPr lang="en-GB" dirty="0">
+                <a:ln>
+                  <a:solidFill>
+                    <a:schemeClr val="tx1"/>
+                  </a:solidFill>
+                </a:ln>
+                <a:solidFill>
+                  <a:sysClr val="windowText" lastClr="000000"/>
+                </a:solidFill>
+              </a:rPr>
+              <a:t>Uniform lists</a:t>
+            </a:r>
+          </a:p>
+        </p:txBody>
+      </p:sp>
+      <p:sp>
+        <p:nvSpPr>
+          <p:cNvPr id="29" name="Rectangle 28">
+            <a:extLst>
+              <a:ext uri="{FF2B5EF4-FFF2-40B4-BE49-F238E27FC236}">
+                <a16:creationId xmlns:a16="http://schemas.microsoft.com/office/drawing/2014/main" id="{CAFBEAD1-D3B6-1B1E-C357-A7881427C69F}"/>
+              </a:ext>
+            </a:extLst>
+          </p:cNvPr>
+          <p:cNvSpPr/>
+          <p:nvPr/>
+        </p:nvSpPr>
+        <p:spPr>
+          <a:xfrm>
+            <a:off x="6966457" y="118039"/>
+            <a:ext cx="1560931" cy="807813"/>
+          </a:xfrm>
+          <a:prstGeom prst="rect">
+            <a:avLst/>
+          </a:prstGeom>
+          <a:solidFill>
+            <a:schemeClr val="bg1"/>
+          </a:solidFill>
+          <a:ln>
+            <a:solidFill>
+              <a:schemeClr val="bg1"/>
+            </a:solidFill>
+          </a:ln>
+        </p:spPr>
+        <p:style>
+          <a:lnRef idx="2">
+            <a:schemeClr val="accent1">
+              <a:shade val="15000"/>
+            </a:schemeClr>
+          </a:lnRef>
+          <a:fillRef idx="1">
+            <a:schemeClr val="accent1"/>
+          </a:fillRef>
+          <a:effectRef idx="0">
+            <a:schemeClr val="accent1"/>
+          </a:effectRef>
+          <a:fontRef idx="minor">
+            <a:schemeClr val="lt1"/>
+          </a:fontRef>
+        </p:style>
+        <p:txBody>
+          <a:bodyPr rtlCol="0" anchor="ctr"/>
+          <a:lstStyle/>
+          <a:p>
+            <a:pPr algn="ctr"/>
+            <a:r>
+              <a:rPr lang="en-GB" dirty="0">
+                <a:ln>
+                  <a:solidFill>
+                    <a:schemeClr val="tx1"/>
+                  </a:solidFill>
+                </a:ln>
+                <a:solidFill>
+                  <a:sysClr val="windowText" lastClr="000000"/>
+                </a:solidFill>
+              </a:rPr>
+              <a:t>FAQs</a:t>
             </a:r>
           </a:p>
         </p:txBody>
@@ -9247,7 +9938,7 @@
     </p:spTree>
     <p:extLst>
       <p:ext uri="{BB962C8B-B14F-4D97-AF65-F5344CB8AC3E}">
-        <p14:creationId xmlns:p14="http://schemas.microsoft.com/office/powerpoint/2010/main" val="1398335402"/>
+        <p14:creationId xmlns:p14="http://schemas.microsoft.com/office/powerpoint/2010/main" val="2216582272"/>
       </p:ext>
     </p:extLst>
   </p:cSld>
@@ -9297,7 +9988,7 @@
           <a:p>
             <a:r>
               <a:rPr lang="en-GB" dirty="0"/>
-              <a:t>Checkout system</a:t>
+              <a:t>Online Shop</a:t>
             </a:r>
           </a:p>
         </p:txBody>
@@ -9305,7 +9996,7 @@
     </p:spTree>
     <p:extLst>
       <p:ext uri="{BB962C8B-B14F-4D97-AF65-F5344CB8AC3E}">
-        <p14:creationId xmlns:p14="http://schemas.microsoft.com/office/powerpoint/2010/main" val="560281624"/>
+        <p14:creationId xmlns:p14="http://schemas.microsoft.com/office/powerpoint/2010/main" val="3384611430"/>
       </p:ext>
     </p:extLst>
   </p:cSld>
@@ -10260,693 +10951,28 @@
       </p:grpSpPr>
       <p:sp>
         <p:nvSpPr>
-          <p:cNvPr id="4" name="Rectangle 3">
-            <a:extLst>
-              <a:ext uri="{FF2B5EF4-FFF2-40B4-BE49-F238E27FC236}">
-                <a16:creationId xmlns:a16="http://schemas.microsoft.com/office/drawing/2014/main" id="{9DF92B7C-3248-8476-5639-82C1CDFBFA0C}"/>
-              </a:ext>
-            </a:extLst>
-          </p:cNvPr>
-          <p:cNvSpPr/>
-          <p:nvPr/>
-        </p:nvSpPr>
-        <p:spPr>
-          <a:xfrm>
-            <a:off x="0" y="0"/>
-            <a:ext cx="12192000" cy="1060255"/>
-          </a:xfrm>
-          <a:prstGeom prst="rect">
-            <a:avLst/>
-          </a:prstGeom>
-        </p:spPr>
-        <p:style>
-          <a:lnRef idx="2">
-            <a:schemeClr val="accent1">
-              <a:shade val="15000"/>
-            </a:schemeClr>
-          </a:lnRef>
-          <a:fillRef idx="1">
-            <a:schemeClr val="accent1"/>
-          </a:fillRef>
-          <a:effectRef idx="0">
-            <a:schemeClr val="accent1"/>
-          </a:effectRef>
-          <a:fontRef idx="minor">
-            <a:schemeClr val="lt1"/>
-          </a:fontRef>
-        </p:style>
-        <p:txBody>
-          <a:bodyPr rtlCol="0" anchor="ctr"/>
-          <a:lstStyle/>
-          <a:p>
-            <a:pPr algn="ctr"/>
-            <a:endParaRPr lang="en-GB"/>
-          </a:p>
-        </p:txBody>
-      </p:sp>
-      <p:sp>
-        <p:nvSpPr>
-          <p:cNvPr id="5" name="Rectangle 4">
-            <a:extLst>
-              <a:ext uri="{FF2B5EF4-FFF2-40B4-BE49-F238E27FC236}">
-                <a16:creationId xmlns:a16="http://schemas.microsoft.com/office/drawing/2014/main" id="{CD2803DB-E044-51FC-403D-F08AE77A7E99}"/>
-              </a:ext>
-            </a:extLst>
-          </p:cNvPr>
-          <p:cNvSpPr/>
-          <p:nvPr/>
-        </p:nvSpPr>
-        <p:spPr>
-          <a:xfrm>
-            <a:off x="10210799" y="126219"/>
-            <a:ext cx="1851238" cy="807813"/>
-          </a:xfrm>
-          <a:prstGeom prst="rect">
-            <a:avLst/>
-          </a:prstGeom>
-          <a:solidFill>
-            <a:schemeClr val="bg1"/>
-          </a:solidFill>
-          <a:ln>
-            <a:solidFill>
-              <a:schemeClr val="bg1"/>
-            </a:solidFill>
-          </a:ln>
-        </p:spPr>
-        <p:style>
-          <a:lnRef idx="2">
-            <a:schemeClr val="accent1">
-              <a:shade val="15000"/>
-            </a:schemeClr>
-          </a:lnRef>
-          <a:fillRef idx="1">
-            <a:schemeClr val="accent1"/>
-          </a:fillRef>
-          <a:effectRef idx="0">
-            <a:schemeClr val="accent1"/>
-          </a:effectRef>
-          <a:fontRef idx="minor">
-            <a:schemeClr val="lt1"/>
-          </a:fontRef>
-        </p:style>
-        <p:txBody>
-          <a:bodyPr rtlCol="0" anchor="ctr"/>
-          <a:lstStyle/>
-          <a:p>
-            <a:pPr algn="ctr"/>
-            <a:r>
-              <a:rPr lang="en-GB" dirty="0">
-                <a:ln>
-                  <a:solidFill>
-                    <a:schemeClr val="tx1"/>
-                  </a:solidFill>
-                </a:ln>
-                <a:solidFill>
-                  <a:sysClr val="windowText" lastClr="000000"/>
-                </a:solidFill>
-              </a:rPr>
-              <a:t>My account</a:t>
-            </a:r>
-          </a:p>
-        </p:txBody>
-      </p:sp>
-      <p:sp>
-        <p:nvSpPr>
-          <p:cNvPr id="7" name="Rectangle 6">
-            <a:extLst>
-              <a:ext uri="{FF2B5EF4-FFF2-40B4-BE49-F238E27FC236}">
-                <a16:creationId xmlns:a16="http://schemas.microsoft.com/office/drawing/2014/main" id="{1B235E0F-009B-1013-6831-46A3F03BD58E}"/>
-              </a:ext>
-            </a:extLst>
-          </p:cNvPr>
-          <p:cNvSpPr/>
-          <p:nvPr/>
-        </p:nvSpPr>
-        <p:spPr>
-          <a:xfrm>
-            <a:off x="2163516" y="126216"/>
-            <a:ext cx="1684816" cy="807813"/>
-          </a:xfrm>
-          <a:prstGeom prst="rect">
-            <a:avLst/>
-          </a:prstGeom>
-          <a:solidFill>
-            <a:schemeClr val="bg1"/>
-          </a:solidFill>
-          <a:ln>
-            <a:solidFill>
-              <a:schemeClr val="bg1"/>
-            </a:solidFill>
-          </a:ln>
-        </p:spPr>
-        <p:style>
-          <a:lnRef idx="2">
-            <a:schemeClr val="accent1">
-              <a:shade val="15000"/>
-            </a:schemeClr>
-          </a:lnRef>
-          <a:fillRef idx="1">
-            <a:schemeClr val="accent1"/>
-          </a:fillRef>
-          <a:effectRef idx="0">
-            <a:schemeClr val="accent1"/>
-          </a:effectRef>
-          <a:fontRef idx="minor">
-            <a:schemeClr val="lt1"/>
-          </a:fontRef>
-        </p:style>
-        <p:txBody>
-          <a:bodyPr rtlCol="0" anchor="ctr"/>
-          <a:lstStyle/>
-          <a:p>
-            <a:pPr algn="ctr"/>
-            <a:r>
-              <a:rPr lang="en-GB" dirty="0">
-                <a:ln>
-                  <a:solidFill>
-                    <a:schemeClr val="tx1"/>
-                  </a:solidFill>
-                </a:ln>
-                <a:solidFill>
-                  <a:sysClr val="windowText" lastClr="000000"/>
-                </a:solidFill>
-              </a:rPr>
-              <a:t>Add stock</a:t>
-            </a:r>
-          </a:p>
-        </p:txBody>
-      </p:sp>
-      <p:sp>
-        <p:nvSpPr>
-          <p:cNvPr id="10" name="Rectangle 9">
-            <a:extLst>
-              <a:ext uri="{FF2B5EF4-FFF2-40B4-BE49-F238E27FC236}">
-                <a16:creationId xmlns:a16="http://schemas.microsoft.com/office/drawing/2014/main" id="{F1057B64-A798-249A-5611-A65D107D054E}"/>
-              </a:ext>
-            </a:extLst>
-          </p:cNvPr>
-          <p:cNvSpPr/>
-          <p:nvPr/>
-        </p:nvSpPr>
-        <p:spPr>
-          <a:xfrm>
-            <a:off x="4226530" y="126217"/>
-            <a:ext cx="1742314" cy="807813"/>
-          </a:xfrm>
-          <a:prstGeom prst="rect">
-            <a:avLst/>
-          </a:prstGeom>
-          <a:solidFill>
-            <a:schemeClr val="bg1"/>
-          </a:solidFill>
-          <a:ln>
-            <a:solidFill>
-              <a:schemeClr val="bg1"/>
-            </a:solidFill>
-          </a:ln>
-        </p:spPr>
-        <p:style>
-          <a:lnRef idx="2">
-            <a:schemeClr val="accent1">
-              <a:shade val="15000"/>
-            </a:schemeClr>
-          </a:lnRef>
-          <a:fillRef idx="1">
-            <a:schemeClr val="accent1"/>
-          </a:fillRef>
-          <a:effectRef idx="0">
-            <a:schemeClr val="accent1"/>
-          </a:effectRef>
-          <a:fontRef idx="minor">
-            <a:schemeClr val="lt1"/>
-          </a:fontRef>
-        </p:style>
-        <p:txBody>
-          <a:bodyPr rtlCol="0" anchor="ctr"/>
-          <a:lstStyle/>
-          <a:p>
-            <a:pPr algn="ctr"/>
-            <a:r>
-              <a:rPr lang="en-GB" dirty="0">
-                <a:ln>
-                  <a:solidFill>
-                    <a:schemeClr val="tx1"/>
-                  </a:solidFill>
-                </a:ln>
-                <a:solidFill>
-                  <a:sysClr val="windowText" lastClr="000000"/>
-                </a:solidFill>
-              </a:rPr>
-              <a:t>Generate barcodes</a:t>
-            </a:r>
-          </a:p>
-        </p:txBody>
-      </p:sp>
-      <p:sp>
-        <p:nvSpPr>
-          <p:cNvPr id="11" name="Rectangle 10">
-            <a:extLst>
-              <a:ext uri="{FF2B5EF4-FFF2-40B4-BE49-F238E27FC236}">
-                <a16:creationId xmlns:a16="http://schemas.microsoft.com/office/drawing/2014/main" id="{ADDEAA7B-FEE5-32EE-3E35-D027BA8F5919}"/>
-              </a:ext>
-            </a:extLst>
-          </p:cNvPr>
-          <p:cNvSpPr/>
-          <p:nvPr/>
-        </p:nvSpPr>
-        <p:spPr>
-          <a:xfrm>
-            <a:off x="6287670" y="126218"/>
-            <a:ext cx="1594122" cy="807813"/>
-          </a:xfrm>
-          <a:prstGeom prst="rect">
-            <a:avLst/>
-          </a:prstGeom>
-          <a:solidFill>
-            <a:schemeClr val="bg1"/>
-          </a:solidFill>
-          <a:ln>
-            <a:solidFill>
-              <a:schemeClr val="bg1"/>
-            </a:solidFill>
-          </a:ln>
-        </p:spPr>
-        <p:style>
-          <a:lnRef idx="2">
-            <a:schemeClr val="accent1">
-              <a:shade val="15000"/>
-            </a:schemeClr>
-          </a:lnRef>
-          <a:fillRef idx="1">
-            <a:schemeClr val="accent1"/>
-          </a:fillRef>
-          <a:effectRef idx="0">
-            <a:schemeClr val="accent1"/>
-          </a:effectRef>
-          <a:fontRef idx="minor">
-            <a:schemeClr val="lt1"/>
-          </a:fontRef>
-        </p:style>
-        <p:txBody>
-          <a:bodyPr rtlCol="0" anchor="ctr"/>
-          <a:lstStyle/>
-          <a:p>
-            <a:pPr algn="ctr"/>
-            <a:r>
-              <a:rPr lang="en-GB" dirty="0">
-                <a:ln>
-                  <a:solidFill>
-                    <a:schemeClr val="tx1"/>
-                  </a:solidFill>
-                </a:ln>
-                <a:solidFill>
-                  <a:sysClr val="windowText" lastClr="000000"/>
-                </a:solidFill>
-              </a:rPr>
-              <a:t>Checkout system</a:t>
-            </a:r>
-          </a:p>
-        </p:txBody>
-      </p:sp>
-      <p:sp>
-        <p:nvSpPr>
-          <p:cNvPr id="14" name="Rectangle 13">
-            <a:extLst>
-              <a:ext uri="{FF2B5EF4-FFF2-40B4-BE49-F238E27FC236}">
-                <a16:creationId xmlns:a16="http://schemas.microsoft.com/office/drawing/2014/main" id="{97F62398-4A97-5D3B-8996-A9D3A1BDEE7B}"/>
-              </a:ext>
-            </a:extLst>
-          </p:cNvPr>
-          <p:cNvSpPr/>
-          <p:nvPr/>
-        </p:nvSpPr>
-        <p:spPr>
-          <a:xfrm>
-            <a:off x="8258584" y="126219"/>
-            <a:ext cx="1676400" cy="807813"/>
-          </a:xfrm>
-          <a:prstGeom prst="rect">
-            <a:avLst/>
-          </a:prstGeom>
-          <a:solidFill>
-            <a:schemeClr val="bg1"/>
-          </a:solidFill>
-          <a:ln>
-            <a:solidFill>
-              <a:schemeClr val="bg1"/>
-            </a:solidFill>
-          </a:ln>
-        </p:spPr>
-        <p:style>
-          <a:lnRef idx="2">
-            <a:schemeClr val="accent1">
-              <a:shade val="15000"/>
-            </a:schemeClr>
-          </a:lnRef>
-          <a:fillRef idx="1">
-            <a:schemeClr val="accent1"/>
-          </a:fillRef>
-          <a:effectRef idx="0">
-            <a:schemeClr val="accent1"/>
-          </a:effectRef>
-          <a:fontRef idx="minor">
-            <a:schemeClr val="lt1"/>
-          </a:fontRef>
-        </p:style>
-        <p:txBody>
-          <a:bodyPr rtlCol="0" anchor="ctr"/>
-          <a:lstStyle/>
-          <a:p>
-            <a:pPr algn="ctr"/>
-            <a:r>
-              <a:rPr lang="en-GB" dirty="0">
-                <a:ln>
-                  <a:solidFill>
-                    <a:schemeClr val="tx1"/>
-                  </a:solidFill>
-                </a:ln>
-                <a:solidFill>
-                  <a:sysClr val="windowText" lastClr="000000"/>
-                </a:solidFill>
-              </a:rPr>
-              <a:t>View orders</a:t>
-            </a:r>
-          </a:p>
-        </p:txBody>
-      </p:sp>
-      <p:sp>
-        <p:nvSpPr>
-          <p:cNvPr id="16" name="Rectangle 15">
-            <a:extLst>
-              <a:ext uri="{FF2B5EF4-FFF2-40B4-BE49-F238E27FC236}">
-                <a16:creationId xmlns:a16="http://schemas.microsoft.com/office/drawing/2014/main" id="{BB745BDA-0EA4-B1EE-2C07-92B3FA6BD789}"/>
-              </a:ext>
-            </a:extLst>
-          </p:cNvPr>
-          <p:cNvSpPr/>
-          <p:nvPr/>
-        </p:nvSpPr>
-        <p:spPr>
-          <a:xfrm>
-            <a:off x="159874" y="126215"/>
-            <a:ext cx="1684816" cy="807813"/>
-          </a:xfrm>
-          <a:prstGeom prst="rect">
-            <a:avLst/>
-          </a:prstGeom>
-          <a:solidFill>
-            <a:schemeClr val="bg1"/>
-          </a:solidFill>
-          <a:ln>
-            <a:solidFill>
-              <a:schemeClr val="bg1"/>
-            </a:solidFill>
-          </a:ln>
-        </p:spPr>
-        <p:style>
-          <a:lnRef idx="2">
-            <a:schemeClr val="accent1">
-              <a:shade val="15000"/>
-            </a:schemeClr>
-          </a:lnRef>
-          <a:fillRef idx="1">
-            <a:schemeClr val="accent1"/>
-          </a:fillRef>
-          <a:effectRef idx="0">
-            <a:schemeClr val="accent1"/>
-          </a:effectRef>
-          <a:fontRef idx="minor">
-            <a:schemeClr val="lt1"/>
-          </a:fontRef>
-        </p:style>
-        <p:txBody>
-          <a:bodyPr rtlCol="0" anchor="ctr"/>
-          <a:lstStyle/>
-          <a:p>
-            <a:pPr algn="ctr"/>
-            <a:r>
-              <a:rPr lang="en-GB" dirty="0">
-                <a:ln>
-                  <a:solidFill>
-                    <a:schemeClr val="tx1"/>
-                  </a:solidFill>
-                </a:ln>
-                <a:solidFill>
-                  <a:sysClr val="windowText" lastClr="000000"/>
-                </a:solidFill>
-              </a:rPr>
-              <a:t>Home</a:t>
-            </a:r>
-          </a:p>
-        </p:txBody>
-      </p:sp>
-      <p:sp>
-        <p:nvSpPr>
-          <p:cNvPr id="2" name="TextBox 1">
-            <a:extLst>
-              <a:ext uri="{FF2B5EF4-FFF2-40B4-BE49-F238E27FC236}">
-                <a16:creationId xmlns:a16="http://schemas.microsoft.com/office/drawing/2014/main" id="{82D2EE23-0245-02D2-692A-541BFCB47CB5}"/>
-              </a:ext>
-            </a:extLst>
-          </p:cNvPr>
-          <p:cNvSpPr txBox="1"/>
-          <p:nvPr/>
-        </p:nvSpPr>
-        <p:spPr>
-          <a:xfrm>
-            <a:off x="1157401" y="2228717"/>
-            <a:ext cx="1632456" cy="369332"/>
-          </a:xfrm>
-          <a:prstGeom prst="rect">
-            <a:avLst/>
-          </a:prstGeom>
-          <a:noFill/>
-        </p:spPr>
-        <p:txBody>
-          <a:bodyPr wrap="square" rtlCol="0">
-            <a:spAutoFit/>
-          </a:bodyPr>
+          <p:cNvPr id="2" name="Title 1">
+            <a:extLst>
+              <a:ext uri="{FF2B5EF4-FFF2-40B4-BE49-F238E27FC236}">
+                <a16:creationId xmlns:a16="http://schemas.microsoft.com/office/drawing/2014/main" id="{587A13A3-98F1-A632-56E3-7D2561130BE8}"/>
+              </a:ext>
+            </a:extLst>
+          </p:cNvPr>
+          <p:cNvSpPr>
+            <a:spLocks noGrp="1"/>
+          </p:cNvSpPr>
+          <p:nvPr>
+            <p:ph type="title"/>
+          </p:nvPr>
+        </p:nvSpPr>
+        <p:spPr/>
+        <p:txBody>
+          <a:bodyPr/>
           <a:lstStyle/>
           <a:p>
             <a:r>
               <a:rPr lang="en-GB" dirty="0"/>
-              <a:t>Scan barcode:</a:t>
-            </a:r>
-          </a:p>
-        </p:txBody>
-      </p:sp>
-      <p:sp>
-        <p:nvSpPr>
-          <p:cNvPr id="3" name="TextBox 2">
-            <a:extLst>
-              <a:ext uri="{FF2B5EF4-FFF2-40B4-BE49-F238E27FC236}">
-                <a16:creationId xmlns:a16="http://schemas.microsoft.com/office/drawing/2014/main" id="{62EF5EF7-39DB-8388-BFAA-4FFC0FA573D9}"/>
-              </a:ext>
-            </a:extLst>
-          </p:cNvPr>
-          <p:cNvSpPr txBox="1"/>
-          <p:nvPr/>
-        </p:nvSpPr>
-        <p:spPr>
-          <a:xfrm>
-            <a:off x="8156979" y="1951672"/>
-            <a:ext cx="3253693" cy="2031325"/>
-          </a:xfrm>
-          <a:prstGeom prst="rect">
-            <a:avLst/>
-          </a:prstGeom>
-          <a:noFill/>
-        </p:spPr>
-        <p:txBody>
-          <a:bodyPr wrap="square" rtlCol="0">
-            <a:spAutoFit/>
-          </a:bodyPr>
-          <a:lstStyle/>
-          <a:p>
-            <a:r>
-              <a:rPr lang="en-GB" dirty="0"/>
-              <a:t>Basket:</a:t>
-            </a:r>
-          </a:p>
-          <a:p>
-            <a:endParaRPr lang="en-GB" dirty="0"/>
-          </a:p>
-          <a:p>
-            <a:endParaRPr lang="en-GB" dirty="0"/>
-          </a:p>
-          <a:p>
-            <a:endParaRPr lang="en-GB" dirty="0"/>
-          </a:p>
-          <a:p>
-            <a:r>
-              <a:rPr lang="en-GB" dirty="0"/>
-              <a:t>Basket items</a:t>
-            </a:r>
-          </a:p>
-          <a:p>
-            <a:endParaRPr lang="en-GB" dirty="0"/>
-          </a:p>
-          <a:p>
-            <a:r>
-              <a:rPr lang="en-GB" dirty="0"/>
-              <a:t>Total:</a:t>
-            </a:r>
-          </a:p>
-        </p:txBody>
-      </p:sp>
-      <p:sp>
-        <p:nvSpPr>
-          <p:cNvPr id="6" name="TextBox 5">
-            <a:extLst>
-              <a:ext uri="{FF2B5EF4-FFF2-40B4-BE49-F238E27FC236}">
-                <a16:creationId xmlns:a16="http://schemas.microsoft.com/office/drawing/2014/main" id="{04754E8D-4641-913F-D2F9-62BFF7410B44}"/>
-              </a:ext>
-            </a:extLst>
-          </p:cNvPr>
-          <p:cNvSpPr txBox="1"/>
-          <p:nvPr/>
-        </p:nvSpPr>
-        <p:spPr>
-          <a:xfrm>
-            <a:off x="2212606" y="4181122"/>
-            <a:ext cx="2013924" cy="369332"/>
-          </a:xfrm>
-          <a:prstGeom prst="rect">
-            <a:avLst/>
-          </a:prstGeom>
-          <a:noFill/>
-          <a:ln>
-            <a:solidFill>
-              <a:schemeClr val="tx1"/>
-            </a:solidFill>
-          </a:ln>
-        </p:spPr>
-        <p:txBody>
-          <a:bodyPr wrap="square" rtlCol="0">
-            <a:spAutoFit/>
-          </a:bodyPr>
-          <a:lstStyle/>
-          <a:p>
-            <a:r>
-              <a:rPr lang="en-GB" dirty="0"/>
-              <a:t>Or input manually</a:t>
-            </a:r>
-          </a:p>
-        </p:txBody>
-      </p:sp>
-      <p:sp>
-        <p:nvSpPr>
-          <p:cNvPr id="9" name="TextBox 8">
-            <a:extLst>
-              <a:ext uri="{FF2B5EF4-FFF2-40B4-BE49-F238E27FC236}">
-                <a16:creationId xmlns:a16="http://schemas.microsoft.com/office/drawing/2014/main" id="{F48FE565-16D5-D9B7-51C1-0A8C47774451}"/>
-              </a:ext>
-            </a:extLst>
-          </p:cNvPr>
-          <p:cNvSpPr txBox="1"/>
-          <p:nvPr/>
-        </p:nvSpPr>
-        <p:spPr>
-          <a:xfrm>
-            <a:off x="2789857" y="2228717"/>
-            <a:ext cx="1852179" cy="369332"/>
-          </a:xfrm>
-          <a:prstGeom prst="rect">
-            <a:avLst/>
-          </a:prstGeom>
-          <a:noFill/>
-          <a:ln>
-            <a:solidFill>
-              <a:schemeClr val="tx1"/>
-            </a:solidFill>
-          </a:ln>
-        </p:spPr>
-        <p:txBody>
-          <a:bodyPr wrap="square" rtlCol="0">
-            <a:spAutoFit/>
-          </a:bodyPr>
-          <a:lstStyle/>
-          <a:p>
-            <a:endParaRPr lang="en-GB" dirty="0"/>
-          </a:p>
-        </p:txBody>
-      </p:sp>
-      <p:sp>
-        <p:nvSpPr>
-          <p:cNvPr id="8" name="TextBox 7">
-            <a:extLst>
-              <a:ext uri="{FF2B5EF4-FFF2-40B4-BE49-F238E27FC236}">
-                <a16:creationId xmlns:a16="http://schemas.microsoft.com/office/drawing/2014/main" id="{99624F69-1760-CB19-EACC-85B2BFCE50DD}"/>
-              </a:ext>
-            </a:extLst>
-          </p:cNvPr>
-          <p:cNvSpPr txBox="1"/>
-          <p:nvPr/>
-        </p:nvSpPr>
-        <p:spPr>
-          <a:xfrm>
-            <a:off x="2402566" y="3390206"/>
-            <a:ext cx="1632456" cy="369332"/>
-          </a:xfrm>
-          <a:prstGeom prst="rect">
-            <a:avLst/>
-          </a:prstGeom>
-          <a:noFill/>
-          <a:ln>
-            <a:solidFill>
-              <a:schemeClr val="tx1"/>
-            </a:solidFill>
-          </a:ln>
-        </p:spPr>
-        <p:txBody>
-          <a:bodyPr wrap="square" rtlCol="0">
-            <a:spAutoFit/>
-          </a:bodyPr>
-          <a:lstStyle/>
-          <a:p>
-            <a:r>
-              <a:rPr lang="en-GB" dirty="0"/>
-              <a:t>Add to basket</a:t>
-            </a:r>
-          </a:p>
-        </p:txBody>
-      </p:sp>
-      <p:sp>
-        <p:nvSpPr>
-          <p:cNvPr id="13" name="TextBox 12">
-            <a:extLst>
-              <a:ext uri="{FF2B5EF4-FFF2-40B4-BE49-F238E27FC236}">
-                <a16:creationId xmlns:a16="http://schemas.microsoft.com/office/drawing/2014/main" id="{DF7A66E9-9C9D-A36B-C703-554723CE452A}"/>
-              </a:ext>
-            </a:extLst>
-          </p:cNvPr>
-          <p:cNvSpPr txBox="1"/>
-          <p:nvPr/>
-        </p:nvSpPr>
-        <p:spPr>
-          <a:xfrm>
-            <a:off x="9241584" y="4449191"/>
-            <a:ext cx="1386799" cy="646331"/>
-          </a:xfrm>
-          <a:prstGeom prst="rect">
-            <a:avLst/>
-          </a:prstGeom>
-          <a:noFill/>
-          <a:ln>
-            <a:solidFill>
-              <a:schemeClr val="tx1"/>
-            </a:solidFill>
-          </a:ln>
-        </p:spPr>
-        <p:txBody>
-          <a:bodyPr wrap="square" rtlCol="0">
-            <a:spAutoFit/>
-          </a:bodyPr>
-          <a:lstStyle/>
-          <a:p>
-            <a:r>
-              <a:rPr lang="en-GB" dirty="0"/>
-              <a:t>Complete transaction</a:t>
+              <a:t>Add users</a:t>
             </a:r>
           </a:p>
         </p:txBody>
@@ -10954,7 +10980,7 @@
     </p:spTree>
     <p:extLst>
       <p:ext uri="{BB962C8B-B14F-4D97-AF65-F5344CB8AC3E}">
-        <p14:creationId xmlns:p14="http://schemas.microsoft.com/office/powerpoint/2010/main" val="1154686776"/>
+        <p14:creationId xmlns:p14="http://schemas.microsoft.com/office/powerpoint/2010/main" val="1398335402"/>
       </p:ext>
     </p:extLst>
   </p:cSld>
@@ -11004,6 +11030,787 @@
           <a:p>
             <a:r>
               <a:rPr lang="en-GB" dirty="0"/>
+              <a:t>Checkout system</a:t>
+            </a:r>
+          </a:p>
+        </p:txBody>
+      </p:sp>
+    </p:spTree>
+    <p:extLst>
+      <p:ext uri="{BB962C8B-B14F-4D97-AF65-F5344CB8AC3E}">
+        <p14:creationId xmlns:p14="http://schemas.microsoft.com/office/powerpoint/2010/main" val="560281624"/>
+      </p:ext>
+    </p:extLst>
+  </p:cSld>
+  <p:clrMapOvr>
+    <a:masterClrMapping/>
+  </p:clrMapOvr>
+</p:sld>
+</file>
+
+<file path=ppt/slides/slide22.xml><?xml version="1.0" encoding="utf-8"?>
+<p:sld xmlns:a="http://schemas.openxmlformats.org/drawingml/2006/main" xmlns:r="http://schemas.openxmlformats.org/officeDocument/2006/relationships" xmlns:p="http://schemas.openxmlformats.org/presentationml/2006/main">
+  <p:cSld>
+    <p:spTree>
+      <p:nvGrpSpPr>
+        <p:cNvPr id="1" name=""/>
+        <p:cNvGrpSpPr/>
+        <p:nvPr/>
+      </p:nvGrpSpPr>
+      <p:grpSpPr>
+        <a:xfrm>
+          <a:off x="0" y="0"/>
+          <a:ext cx="0" cy="0"/>
+          <a:chOff x="0" y="0"/>
+          <a:chExt cx="0" cy="0"/>
+        </a:xfrm>
+      </p:grpSpPr>
+      <p:sp>
+        <p:nvSpPr>
+          <p:cNvPr id="4" name="Rectangle 3">
+            <a:extLst>
+              <a:ext uri="{FF2B5EF4-FFF2-40B4-BE49-F238E27FC236}">
+                <a16:creationId xmlns:a16="http://schemas.microsoft.com/office/drawing/2014/main" id="{9DF92B7C-3248-8476-5639-82C1CDFBFA0C}"/>
+              </a:ext>
+            </a:extLst>
+          </p:cNvPr>
+          <p:cNvSpPr/>
+          <p:nvPr/>
+        </p:nvSpPr>
+        <p:spPr>
+          <a:xfrm>
+            <a:off x="0" y="0"/>
+            <a:ext cx="12192000" cy="1060255"/>
+          </a:xfrm>
+          <a:prstGeom prst="rect">
+            <a:avLst/>
+          </a:prstGeom>
+        </p:spPr>
+        <p:style>
+          <a:lnRef idx="2">
+            <a:schemeClr val="accent1">
+              <a:shade val="15000"/>
+            </a:schemeClr>
+          </a:lnRef>
+          <a:fillRef idx="1">
+            <a:schemeClr val="accent1"/>
+          </a:fillRef>
+          <a:effectRef idx="0">
+            <a:schemeClr val="accent1"/>
+          </a:effectRef>
+          <a:fontRef idx="minor">
+            <a:schemeClr val="lt1"/>
+          </a:fontRef>
+        </p:style>
+        <p:txBody>
+          <a:bodyPr rtlCol="0" anchor="ctr"/>
+          <a:lstStyle/>
+          <a:p>
+            <a:pPr algn="ctr"/>
+            <a:endParaRPr lang="en-GB"/>
+          </a:p>
+        </p:txBody>
+      </p:sp>
+      <p:sp>
+        <p:nvSpPr>
+          <p:cNvPr id="5" name="Rectangle 4">
+            <a:extLst>
+              <a:ext uri="{FF2B5EF4-FFF2-40B4-BE49-F238E27FC236}">
+                <a16:creationId xmlns:a16="http://schemas.microsoft.com/office/drawing/2014/main" id="{CD2803DB-E044-51FC-403D-F08AE77A7E99}"/>
+              </a:ext>
+            </a:extLst>
+          </p:cNvPr>
+          <p:cNvSpPr/>
+          <p:nvPr/>
+        </p:nvSpPr>
+        <p:spPr>
+          <a:xfrm>
+            <a:off x="10210799" y="126219"/>
+            <a:ext cx="1851238" cy="807813"/>
+          </a:xfrm>
+          <a:prstGeom prst="rect">
+            <a:avLst/>
+          </a:prstGeom>
+          <a:solidFill>
+            <a:schemeClr val="bg1"/>
+          </a:solidFill>
+          <a:ln>
+            <a:solidFill>
+              <a:schemeClr val="bg1"/>
+            </a:solidFill>
+          </a:ln>
+        </p:spPr>
+        <p:style>
+          <a:lnRef idx="2">
+            <a:schemeClr val="accent1">
+              <a:shade val="15000"/>
+            </a:schemeClr>
+          </a:lnRef>
+          <a:fillRef idx="1">
+            <a:schemeClr val="accent1"/>
+          </a:fillRef>
+          <a:effectRef idx="0">
+            <a:schemeClr val="accent1"/>
+          </a:effectRef>
+          <a:fontRef idx="minor">
+            <a:schemeClr val="lt1"/>
+          </a:fontRef>
+        </p:style>
+        <p:txBody>
+          <a:bodyPr rtlCol="0" anchor="ctr"/>
+          <a:lstStyle/>
+          <a:p>
+            <a:pPr algn="ctr"/>
+            <a:r>
+              <a:rPr lang="en-GB" dirty="0">
+                <a:ln>
+                  <a:solidFill>
+                    <a:schemeClr val="tx1"/>
+                  </a:solidFill>
+                </a:ln>
+                <a:solidFill>
+                  <a:sysClr val="windowText" lastClr="000000"/>
+                </a:solidFill>
+              </a:rPr>
+              <a:t>My account</a:t>
+            </a:r>
+          </a:p>
+        </p:txBody>
+      </p:sp>
+      <p:sp>
+        <p:nvSpPr>
+          <p:cNvPr id="7" name="Rectangle 6">
+            <a:extLst>
+              <a:ext uri="{FF2B5EF4-FFF2-40B4-BE49-F238E27FC236}">
+                <a16:creationId xmlns:a16="http://schemas.microsoft.com/office/drawing/2014/main" id="{1B235E0F-009B-1013-6831-46A3F03BD58E}"/>
+              </a:ext>
+            </a:extLst>
+          </p:cNvPr>
+          <p:cNvSpPr/>
+          <p:nvPr/>
+        </p:nvSpPr>
+        <p:spPr>
+          <a:xfrm>
+            <a:off x="2163516" y="126216"/>
+            <a:ext cx="1684816" cy="807813"/>
+          </a:xfrm>
+          <a:prstGeom prst="rect">
+            <a:avLst/>
+          </a:prstGeom>
+          <a:solidFill>
+            <a:schemeClr val="bg1"/>
+          </a:solidFill>
+          <a:ln>
+            <a:solidFill>
+              <a:schemeClr val="bg1"/>
+            </a:solidFill>
+          </a:ln>
+        </p:spPr>
+        <p:style>
+          <a:lnRef idx="2">
+            <a:schemeClr val="accent1">
+              <a:shade val="15000"/>
+            </a:schemeClr>
+          </a:lnRef>
+          <a:fillRef idx="1">
+            <a:schemeClr val="accent1"/>
+          </a:fillRef>
+          <a:effectRef idx="0">
+            <a:schemeClr val="accent1"/>
+          </a:effectRef>
+          <a:fontRef idx="minor">
+            <a:schemeClr val="lt1"/>
+          </a:fontRef>
+        </p:style>
+        <p:txBody>
+          <a:bodyPr rtlCol="0" anchor="ctr"/>
+          <a:lstStyle/>
+          <a:p>
+            <a:pPr algn="ctr"/>
+            <a:r>
+              <a:rPr lang="en-GB" dirty="0">
+                <a:ln>
+                  <a:solidFill>
+                    <a:schemeClr val="tx1"/>
+                  </a:solidFill>
+                </a:ln>
+                <a:solidFill>
+                  <a:sysClr val="windowText" lastClr="000000"/>
+                </a:solidFill>
+              </a:rPr>
+              <a:t>Add stock</a:t>
+            </a:r>
+          </a:p>
+        </p:txBody>
+      </p:sp>
+      <p:sp>
+        <p:nvSpPr>
+          <p:cNvPr id="10" name="Rectangle 9">
+            <a:extLst>
+              <a:ext uri="{FF2B5EF4-FFF2-40B4-BE49-F238E27FC236}">
+                <a16:creationId xmlns:a16="http://schemas.microsoft.com/office/drawing/2014/main" id="{F1057B64-A798-249A-5611-A65D107D054E}"/>
+              </a:ext>
+            </a:extLst>
+          </p:cNvPr>
+          <p:cNvSpPr/>
+          <p:nvPr/>
+        </p:nvSpPr>
+        <p:spPr>
+          <a:xfrm>
+            <a:off x="4226530" y="126217"/>
+            <a:ext cx="1742314" cy="807813"/>
+          </a:xfrm>
+          <a:prstGeom prst="rect">
+            <a:avLst/>
+          </a:prstGeom>
+          <a:solidFill>
+            <a:schemeClr val="bg1"/>
+          </a:solidFill>
+          <a:ln>
+            <a:solidFill>
+              <a:schemeClr val="bg1"/>
+            </a:solidFill>
+          </a:ln>
+        </p:spPr>
+        <p:style>
+          <a:lnRef idx="2">
+            <a:schemeClr val="accent1">
+              <a:shade val="15000"/>
+            </a:schemeClr>
+          </a:lnRef>
+          <a:fillRef idx="1">
+            <a:schemeClr val="accent1"/>
+          </a:fillRef>
+          <a:effectRef idx="0">
+            <a:schemeClr val="accent1"/>
+          </a:effectRef>
+          <a:fontRef idx="minor">
+            <a:schemeClr val="lt1"/>
+          </a:fontRef>
+        </p:style>
+        <p:txBody>
+          <a:bodyPr rtlCol="0" anchor="ctr"/>
+          <a:lstStyle/>
+          <a:p>
+            <a:pPr algn="ctr"/>
+            <a:r>
+              <a:rPr lang="en-GB" dirty="0">
+                <a:ln>
+                  <a:solidFill>
+                    <a:schemeClr val="tx1"/>
+                  </a:solidFill>
+                </a:ln>
+                <a:solidFill>
+                  <a:sysClr val="windowText" lastClr="000000"/>
+                </a:solidFill>
+              </a:rPr>
+              <a:t>Generate barcodes</a:t>
+            </a:r>
+          </a:p>
+        </p:txBody>
+      </p:sp>
+      <p:sp>
+        <p:nvSpPr>
+          <p:cNvPr id="11" name="Rectangle 10">
+            <a:extLst>
+              <a:ext uri="{FF2B5EF4-FFF2-40B4-BE49-F238E27FC236}">
+                <a16:creationId xmlns:a16="http://schemas.microsoft.com/office/drawing/2014/main" id="{ADDEAA7B-FEE5-32EE-3E35-D027BA8F5919}"/>
+              </a:ext>
+            </a:extLst>
+          </p:cNvPr>
+          <p:cNvSpPr/>
+          <p:nvPr/>
+        </p:nvSpPr>
+        <p:spPr>
+          <a:xfrm>
+            <a:off x="6287670" y="126218"/>
+            <a:ext cx="1594122" cy="807813"/>
+          </a:xfrm>
+          <a:prstGeom prst="rect">
+            <a:avLst/>
+          </a:prstGeom>
+          <a:solidFill>
+            <a:schemeClr val="bg1"/>
+          </a:solidFill>
+          <a:ln>
+            <a:solidFill>
+              <a:schemeClr val="bg1"/>
+            </a:solidFill>
+          </a:ln>
+        </p:spPr>
+        <p:style>
+          <a:lnRef idx="2">
+            <a:schemeClr val="accent1">
+              <a:shade val="15000"/>
+            </a:schemeClr>
+          </a:lnRef>
+          <a:fillRef idx="1">
+            <a:schemeClr val="accent1"/>
+          </a:fillRef>
+          <a:effectRef idx="0">
+            <a:schemeClr val="accent1"/>
+          </a:effectRef>
+          <a:fontRef idx="minor">
+            <a:schemeClr val="lt1"/>
+          </a:fontRef>
+        </p:style>
+        <p:txBody>
+          <a:bodyPr rtlCol="0" anchor="ctr"/>
+          <a:lstStyle/>
+          <a:p>
+            <a:pPr algn="ctr"/>
+            <a:r>
+              <a:rPr lang="en-GB" dirty="0">
+                <a:ln>
+                  <a:solidFill>
+                    <a:schemeClr val="tx1"/>
+                  </a:solidFill>
+                </a:ln>
+                <a:solidFill>
+                  <a:sysClr val="windowText" lastClr="000000"/>
+                </a:solidFill>
+              </a:rPr>
+              <a:t>Checkout system</a:t>
+            </a:r>
+          </a:p>
+        </p:txBody>
+      </p:sp>
+      <p:sp>
+        <p:nvSpPr>
+          <p:cNvPr id="14" name="Rectangle 13">
+            <a:extLst>
+              <a:ext uri="{FF2B5EF4-FFF2-40B4-BE49-F238E27FC236}">
+                <a16:creationId xmlns:a16="http://schemas.microsoft.com/office/drawing/2014/main" id="{97F62398-4A97-5D3B-8996-A9D3A1BDEE7B}"/>
+              </a:ext>
+            </a:extLst>
+          </p:cNvPr>
+          <p:cNvSpPr/>
+          <p:nvPr/>
+        </p:nvSpPr>
+        <p:spPr>
+          <a:xfrm>
+            <a:off x="8258584" y="126219"/>
+            <a:ext cx="1676400" cy="807813"/>
+          </a:xfrm>
+          <a:prstGeom prst="rect">
+            <a:avLst/>
+          </a:prstGeom>
+          <a:solidFill>
+            <a:schemeClr val="bg1"/>
+          </a:solidFill>
+          <a:ln>
+            <a:solidFill>
+              <a:schemeClr val="bg1"/>
+            </a:solidFill>
+          </a:ln>
+        </p:spPr>
+        <p:style>
+          <a:lnRef idx="2">
+            <a:schemeClr val="accent1">
+              <a:shade val="15000"/>
+            </a:schemeClr>
+          </a:lnRef>
+          <a:fillRef idx="1">
+            <a:schemeClr val="accent1"/>
+          </a:fillRef>
+          <a:effectRef idx="0">
+            <a:schemeClr val="accent1"/>
+          </a:effectRef>
+          <a:fontRef idx="minor">
+            <a:schemeClr val="lt1"/>
+          </a:fontRef>
+        </p:style>
+        <p:txBody>
+          <a:bodyPr rtlCol="0" anchor="ctr"/>
+          <a:lstStyle/>
+          <a:p>
+            <a:pPr algn="ctr"/>
+            <a:r>
+              <a:rPr lang="en-GB" dirty="0">
+                <a:ln>
+                  <a:solidFill>
+                    <a:schemeClr val="tx1"/>
+                  </a:solidFill>
+                </a:ln>
+                <a:solidFill>
+                  <a:sysClr val="windowText" lastClr="000000"/>
+                </a:solidFill>
+              </a:rPr>
+              <a:t>View orders</a:t>
+            </a:r>
+          </a:p>
+        </p:txBody>
+      </p:sp>
+      <p:sp>
+        <p:nvSpPr>
+          <p:cNvPr id="16" name="Rectangle 15">
+            <a:extLst>
+              <a:ext uri="{FF2B5EF4-FFF2-40B4-BE49-F238E27FC236}">
+                <a16:creationId xmlns:a16="http://schemas.microsoft.com/office/drawing/2014/main" id="{BB745BDA-0EA4-B1EE-2C07-92B3FA6BD789}"/>
+              </a:ext>
+            </a:extLst>
+          </p:cNvPr>
+          <p:cNvSpPr/>
+          <p:nvPr/>
+        </p:nvSpPr>
+        <p:spPr>
+          <a:xfrm>
+            <a:off x="159874" y="126215"/>
+            <a:ext cx="1684816" cy="807813"/>
+          </a:xfrm>
+          <a:prstGeom prst="rect">
+            <a:avLst/>
+          </a:prstGeom>
+          <a:solidFill>
+            <a:schemeClr val="bg1"/>
+          </a:solidFill>
+          <a:ln>
+            <a:solidFill>
+              <a:schemeClr val="bg1"/>
+            </a:solidFill>
+          </a:ln>
+        </p:spPr>
+        <p:style>
+          <a:lnRef idx="2">
+            <a:schemeClr val="accent1">
+              <a:shade val="15000"/>
+            </a:schemeClr>
+          </a:lnRef>
+          <a:fillRef idx="1">
+            <a:schemeClr val="accent1"/>
+          </a:fillRef>
+          <a:effectRef idx="0">
+            <a:schemeClr val="accent1"/>
+          </a:effectRef>
+          <a:fontRef idx="minor">
+            <a:schemeClr val="lt1"/>
+          </a:fontRef>
+        </p:style>
+        <p:txBody>
+          <a:bodyPr rtlCol="0" anchor="ctr"/>
+          <a:lstStyle/>
+          <a:p>
+            <a:pPr algn="ctr"/>
+            <a:r>
+              <a:rPr lang="en-GB" dirty="0">
+                <a:ln>
+                  <a:solidFill>
+                    <a:schemeClr val="tx1"/>
+                  </a:solidFill>
+                </a:ln>
+                <a:solidFill>
+                  <a:sysClr val="windowText" lastClr="000000"/>
+                </a:solidFill>
+              </a:rPr>
+              <a:t>Home</a:t>
+            </a:r>
+          </a:p>
+        </p:txBody>
+      </p:sp>
+      <p:sp>
+        <p:nvSpPr>
+          <p:cNvPr id="2" name="TextBox 1">
+            <a:extLst>
+              <a:ext uri="{FF2B5EF4-FFF2-40B4-BE49-F238E27FC236}">
+                <a16:creationId xmlns:a16="http://schemas.microsoft.com/office/drawing/2014/main" id="{82D2EE23-0245-02D2-692A-541BFCB47CB5}"/>
+              </a:ext>
+            </a:extLst>
+          </p:cNvPr>
+          <p:cNvSpPr txBox="1"/>
+          <p:nvPr/>
+        </p:nvSpPr>
+        <p:spPr>
+          <a:xfrm>
+            <a:off x="1157401" y="2228717"/>
+            <a:ext cx="1632456" cy="369332"/>
+          </a:xfrm>
+          <a:prstGeom prst="rect">
+            <a:avLst/>
+          </a:prstGeom>
+          <a:noFill/>
+        </p:spPr>
+        <p:txBody>
+          <a:bodyPr wrap="square" rtlCol="0">
+            <a:spAutoFit/>
+          </a:bodyPr>
+          <a:lstStyle/>
+          <a:p>
+            <a:r>
+              <a:rPr lang="en-GB" dirty="0"/>
+              <a:t>Scan barcode:</a:t>
+            </a:r>
+          </a:p>
+        </p:txBody>
+      </p:sp>
+      <p:sp>
+        <p:nvSpPr>
+          <p:cNvPr id="3" name="TextBox 2">
+            <a:extLst>
+              <a:ext uri="{FF2B5EF4-FFF2-40B4-BE49-F238E27FC236}">
+                <a16:creationId xmlns:a16="http://schemas.microsoft.com/office/drawing/2014/main" id="{62EF5EF7-39DB-8388-BFAA-4FFC0FA573D9}"/>
+              </a:ext>
+            </a:extLst>
+          </p:cNvPr>
+          <p:cNvSpPr txBox="1"/>
+          <p:nvPr/>
+        </p:nvSpPr>
+        <p:spPr>
+          <a:xfrm>
+            <a:off x="8156979" y="1951672"/>
+            <a:ext cx="3253693" cy="2031325"/>
+          </a:xfrm>
+          <a:prstGeom prst="rect">
+            <a:avLst/>
+          </a:prstGeom>
+          <a:noFill/>
+        </p:spPr>
+        <p:txBody>
+          <a:bodyPr wrap="square" rtlCol="0">
+            <a:spAutoFit/>
+          </a:bodyPr>
+          <a:lstStyle/>
+          <a:p>
+            <a:r>
+              <a:rPr lang="en-GB" dirty="0"/>
+              <a:t>Basket:</a:t>
+            </a:r>
+          </a:p>
+          <a:p>
+            <a:endParaRPr lang="en-GB" dirty="0"/>
+          </a:p>
+          <a:p>
+            <a:endParaRPr lang="en-GB" dirty="0"/>
+          </a:p>
+          <a:p>
+            <a:endParaRPr lang="en-GB" dirty="0"/>
+          </a:p>
+          <a:p>
+            <a:r>
+              <a:rPr lang="en-GB" dirty="0"/>
+              <a:t>Basket items</a:t>
+            </a:r>
+          </a:p>
+          <a:p>
+            <a:endParaRPr lang="en-GB" dirty="0"/>
+          </a:p>
+          <a:p>
+            <a:r>
+              <a:rPr lang="en-GB" dirty="0"/>
+              <a:t>Total:</a:t>
+            </a:r>
+          </a:p>
+        </p:txBody>
+      </p:sp>
+      <p:sp>
+        <p:nvSpPr>
+          <p:cNvPr id="6" name="TextBox 5">
+            <a:extLst>
+              <a:ext uri="{FF2B5EF4-FFF2-40B4-BE49-F238E27FC236}">
+                <a16:creationId xmlns:a16="http://schemas.microsoft.com/office/drawing/2014/main" id="{04754E8D-4641-913F-D2F9-62BFF7410B44}"/>
+              </a:ext>
+            </a:extLst>
+          </p:cNvPr>
+          <p:cNvSpPr txBox="1"/>
+          <p:nvPr/>
+        </p:nvSpPr>
+        <p:spPr>
+          <a:xfrm>
+            <a:off x="2212606" y="4181122"/>
+            <a:ext cx="2013924" cy="369332"/>
+          </a:xfrm>
+          <a:prstGeom prst="rect">
+            <a:avLst/>
+          </a:prstGeom>
+          <a:noFill/>
+          <a:ln>
+            <a:solidFill>
+              <a:schemeClr val="tx1"/>
+            </a:solidFill>
+          </a:ln>
+        </p:spPr>
+        <p:txBody>
+          <a:bodyPr wrap="square" rtlCol="0">
+            <a:spAutoFit/>
+          </a:bodyPr>
+          <a:lstStyle/>
+          <a:p>
+            <a:r>
+              <a:rPr lang="en-GB" dirty="0"/>
+              <a:t>Or input manually</a:t>
+            </a:r>
+          </a:p>
+        </p:txBody>
+      </p:sp>
+      <p:sp>
+        <p:nvSpPr>
+          <p:cNvPr id="9" name="TextBox 8">
+            <a:extLst>
+              <a:ext uri="{FF2B5EF4-FFF2-40B4-BE49-F238E27FC236}">
+                <a16:creationId xmlns:a16="http://schemas.microsoft.com/office/drawing/2014/main" id="{F48FE565-16D5-D9B7-51C1-0A8C47774451}"/>
+              </a:ext>
+            </a:extLst>
+          </p:cNvPr>
+          <p:cNvSpPr txBox="1"/>
+          <p:nvPr/>
+        </p:nvSpPr>
+        <p:spPr>
+          <a:xfrm>
+            <a:off x="2789857" y="2228717"/>
+            <a:ext cx="1852179" cy="369332"/>
+          </a:xfrm>
+          <a:prstGeom prst="rect">
+            <a:avLst/>
+          </a:prstGeom>
+          <a:noFill/>
+          <a:ln>
+            <a:solidFill>
+              <a:schemeClr val="tx1"/>
+            </a:solidFill>
+          </a:ln>
+        </p:spPr>
+        <p:txBody>
+          <a:bodyPr wrap="square" rtlCol="0">
+            <a:spAutoFit/>
+          </a:bodyPr>
+          <a:lstStyle/>
+          <a:p>
+            <a:endParaRPr lang="en-GB" dirty="0"/>
+          </a:p>
+        </p:txBody>
+      </p:sp>
+      <p:sp>
+        <p:nvSpPr>
+          <p:cNvPr id="8" name="TextBox 7">
+            <a:extLst>
+              <a:ext uri="{FF2B5EF4-FFF2-40B4-BE49-F238E27FC236}">
+                <a16:creationId xmlns:a16="http://schemas.microsoft.com/office/drawing/2014/main" id="{99624F69-1760-CB19-EACC-85B2BFCE50DD}"/>
+              </a:ext>
+            </a:extLst>
+          </p:cNvPr>
+          <p:cNvSpPr txBox="1"/>
+          <p:nvPr/>
+        </p:nvSpPr>
+        <p:spPr>
+          <a:xfrm>
+            <a:off x="2402566" y="3390206"/>
+            <a:ext cx="1632456" cy="369332"/>
+          </a:xfrm>
+          <a:prstGeom prst="rect">
+            <a:avLst/>
+          </a:prstGeom>
+          <a:noFill/>
+          <a:ln>
+            <a:solidFill>
+              <a:schemeClr val="tx1"/>
+            </a:solidFill>
+          </a:ln>
+        </p:spPr>
+        <p:txBody>
+          <a:bodyPr wrap="square" rtlCol="0">
+            <a:spAutoFit/>
+          </a:bodyPr>
+          <a:lstStyle/>
+          <a:p>
+            <a:r>
+              <a:rPr lang="en-GB" dirty="0"/>
+              <a:t>Add to basket</a:t>
+            </a:r>
+          </a:p>
+        </p:txBody>
+      </p:sp>
+      <p:sp>
+        <p:nvSpPr>
+          <p:cNvPr id="13" name="TextBox 12">
+            <a:extLst>
+              <a:ext uri="{FF2B5EF4-FFF2-40B4-BE49-F238E27FC236}">
+                <a16:creationId xmlns:a16="http://schemas.microsoft.com/office/drawing/2014/main" id="{DF7A66E9-9C9D-A36B-C703-554723CE452A}"/>
+              </a:ext>
+            </a:extLst>
+          </p:cNvPr>
+          <p:cNvSpPr txBox="1"/>
+          <p:nvPr/>
+        </p:nvSpPr>
+        <p:spPr>
+          <a:xfrm>
+            <a:off x="9241584" y="4449191"/>
+            <a:ext cx="1386799" cy="646331"/>
+          </a:xfrm>
+          <a:prstGeom prst="rect">
+            <a:avLst/>
+          </a:prstGeom>
+          <a:noFill/>
+          <a:ln>
+            <a:solidFill>
+              <a:schemeClr val="tx1"/>
+            </a:solidFill>
+          </a:ln>
+        </p:spPr>
+        <p:txBody>
+          <a:bodyPr wrap="square" rtlCol="0">
+            <a:spAutoFit/>
+          </a:bodyPr>
+          <a:lstStyle/>
+          <a:p>
+            <a:r>
+              <a:rPr lang="en-GB" dirty="0"/>
+              <a:t>Complete transaction</a:t>
+            </a:r>
+          </a:p>
+        </p:txBody>
+      </p:sp>
+    </p:spTree>
+    <p:extLst>
+      <p:ext uri="{BB962C8B-B14F-4D97-AF65-F5344CB8AC3E}">
+        <p14:creationId xmlns:p14="http://schemas.microsoft.com/office/powerpoint/2010/main" val="1154686776"/>
+      </p:ext>
+    </p:extLst>
+  </p:cSld>
+  <p:clrMapOvr>
+    <a:masterClrMapping/>
+  </p:clrMapOvr>
+</p:sld>
+</file>
+
+<file path=ppt/slides/slide23.xml><?xml version="1.0" encoding="utf-8"?>
+<p:sld xmlns:a="http://schemas.openxmlformats.org/drawingml/2006/main" xmlns:r="http://schemas.openxmlformats.org/officeDocument/2006/relationships" xmlns:p="http://schemas.openxmlformats.org/presentationml/2006/main">
+  <p:cSld>
+    <p:spTree>
+      <p:nvGrpSpPr>
+        <p:cNvPr id="1" name=""/>
+        <p:cNvGrpSpPr/>
+        <p:nvPr/>
+      </p:nvGrpSpPr>
+      <p:grpSpPr>
+        <a:xfrm>
+          <a:off x="0" y="0"/>
+          <a:ext cx="0" cy="0"/>
+          <a:chOff x="0" y="0"/>
+          <a:chExt cx="0" cy="0"/>
+        </a:xfrm>
+      </p:grpSpPr>
+      <p:sp>
+        <p:nvSpPr>
+          <p:cNvPr id="2" name="Title 1">
+            <a:extLst>
+              <a:ext uri="{FF2B5EF4-FFF2-40B4-BE49-F238E27FC236}">
+                <a16:creationId xmlns:a16="http://schemas.microsoft.com/office/drawing/2014/main" id="{587A13A3-98F1-A632-56E3-7D2561130BE8}"/>
+              </a:ext>
+            </a:extLst>
+          </p:cNvPr>
+          <p:cNvSpPr>
+            <a:spLocks noGrp="1"/>
+          </p:cNvSpPr>
+          <p:nvPr>
+            <p:ph type="title"/>
+          </p:nvPr>
+        </p:nvSpPr>
+        <p:spPr/>
+        <p:txBody>
+          <a:bodyPr/>
+          <a:lstStyle/>
+          <a:p>
+            <a:r>
+              <a:rPr lang="en-GB" dirty="0"/>
               <a:t>Checkout system (when enter manually button pressed)</a:t>
             </a:r>
           </a:p>
@@ -11022,7 +11829,7 @@
 </p:sld>
 </file>
 
-<file path=ppt/slides/slide22.xml><?xml version="1.0" encoding="utf-8"?>
+<file path=ppt/slides/slide24.xml><?xml version="1.0" encoding="utf-8"?>
 <p:sld xmlns:a="http://schemas.openxmlformats.org/drawingml/2006/main" xmlns:r="http://schemas.openxmlformats.org/officeDocument/2006/relationships" xmlns:p="http://schemas.openxmlformats.org/presentationml/2006/main">
   <p:cSld>
     <p:spTree>

</xml_diff>

<commit_message>
shop pages and page designs
</commit_message>
<xml_diff>
--- a/Writeup/Page designs.pptx
+++ b/Writeup/Page designs.pptx
@@ -5,7 +5,7 @@
     <p:sldMasterId id="2147483648" r:id="rId1"/>
   </p:sldMasterIdLst>
   <p:notesMasterIdLst>
-    <p:notesMasterId r:id="rId27"/>
+    <p:notesMasterId r:id="rId28"/>
   </p:notesMasterIdLst>
   <p:sldIdLst>
     <p:sldId id="257" r:id="rId2"/>
@@ -27,12 +27,13 @@
     <p:sldId id="264" r:id="rId18"/>
     <p:sldId id="276" r:id="rId19"/>
     <p:sldId id="265" r:id="rId20"/>
-    <p:sldId id="281" r:id="rId21"/>
-    <p:sldId id="266" r:id="rId22"/>
-    <p:sldId id="270" r:id="rId23"/>
-    <p:sldId id="272" r:id="rId24"/>
-    <p:sldId id="278" r:id="rId25"/>
-    <p:sldId id="277" r:id="rId26"/>
+    <p:sldId id="282" r:id="rId21"/>
+    <p:sldId id="281" r:id="rId22"/>
+    <p:sldId id="266" r:id="rId23"/>
+    <p:sldId id="270" r:id="rId24"/>
+    <p:sldId id="272" r:id="rId25"/>
+    <p:sldId id="278" r:id="rId26"/>
+    <p:sldId id="277" r:id="rId27"/>
   </p:sldIdLst>
   <p:sldSz cx="12192000" cy="6858000"/>
   <p:notesSz cx="6858000" cy="9144000"/>
@@ -638,7 +639,7 @@
           <a:p>
             <a:fld id="{C74020FE-8C96-4489-AA9C-8781786544CA}" type="slidenum">
               <a:rPr lang="en-GB" smtClean="0"/>
-              <a:t>23</a:t>
+              <a:t>20</a:t>
             </a:fld>
             <a:endParaRPr lang="en-GB"/>
           </a:p>
@@ -647,7 +648,7 @@
     </p:spTree>
     <p:extLst>
       <p:ext uri="{BB962C8B-B14F-4D97-AF65-F5344CB8AC3E}">
-        <p14:creationId xmlns:p14="http://schemas.microsoft.com/office/powerpoint/2010/main" val="3526703631"/>
+        <p14:creationId xmlns:p14="http://schemas.microsoft.com/office/powerpoint/2010/main" val="660848092"/>
       </p:ext>
     </p:extLst>
   </p:cSld>
@@ -722,7 +723,91 @@
           <a:p>
             <a:fld id="{C74020FE-8C96-4489-AA9C-8781786544CA}" type="slidenum">
               <a:rPr lang="en-GB" smtClean="0"/>
-              <a:t>25</a:t>
+              <a:t>24</a:t>
+            </a:fld>
+            <a:endParaRPr lang="en-GB"/>
+          </a:p>
+        </p:txBody>
+      </p:sp>
+    </p:spTree>
+    <p:extLst>
+      <p:ext uri="{BB962C8B-B14F-4D97-AF65-F5344CB8AC3E}">
+        <p14:creationId xmlns:p14="http://schemas.microsoft.com/office/powerpoint/2010/main" val="3526703631"/>
+      </p:ext>
+    </p:extLst>
+  </p:cSld>
+  <p:clrMapOvr>
+    <a:masterClrMapping/>
+  </p:clrMapOvr>
+</p:notes>
+</file>
+
+<file path=ppt/notesSlides/notesSlide12.xml><?xml version="1.0" encoding="utf-8"?>
+<p:notes xmlns:a="http://schemas.openxmlformats.org/drawingml/2006/main" xmlns:r="http://schemas.openxmlformats.org/officeDocument/2006/relationships" xmlns:p="http://schemas.openxmlformats.org/presentationml/2006/main">
+  <p:cSld>
+    <p:spTree>
+      <p:nvGrpSpPr>
+        <p:cNvPr id="1" name=""/>
+        <p:cNvGrpSpPr/>
+        <p:nvPr/>
+      </p:nvGrpSpPr>
+      <p:grpSpPr>
+        <a:xfrm>
+          <a:off x="0" y="0"/>
+          <a:ext cx="0" cy="0"/>
+          <a:chOff x="0" y="0"/>
+          <a:chExt cx="0" cy="0"/>
+        </a:xfrm>
+      </p:grpSpPr>
+      <p:sp>
+        <p:nvSpPr>
+          <p:cNvPr id="2" name="Slide Image Placeholder 1"/>
+          <p:cNvSpPr>
+            <a:spLocks noGrp="1" noRot="1" noChangeAspect="1"/>
+          </p:cNvSpPr>
+          <p:nvPr>
+            <p:ph type="sldImg"/>
+          </p:nvPr>
+        </p:nvSpPr>
+        <p:spPr/>
+      </p:sp>
+      <p:sp>
+        <p:nvSpPr>
+          <p:cNvPr id="3" name="Notes Placeholder 2"/>
+          <p:cNvSpPr>
+            <a:spLocks noGrp="1"/>
+          </p:cNvSpPr>
+          <p:nvPr>
+            <p:ph type="body" idx="1"/>
+          </p:nvPr>
+        </p:nvSpPr>
+        <p:spPr/>
+        <p:txBody>
+          <a:bodyPr/>
+          <a:lstStyle/>
+          <a:p>
+            <a:endParaRPr lang="en-GB" dirty="0"/>
+          </a:p>
+        </p:txBody>
+      </p:sp>
+      <p:sp>
+        <p:nvSpPr>
+          <p:cNvPr id="4" name="Slide Number Placeholder 3"/>
+          <p:cNvSpPr>
+            <a:spLocks noGrp="1"/>
+          </p:cNvSpPr>
+          <p:nvPr>
+            <p:ph type="sldNum" sz="quarter" idx="5"/>
+          </p:nvPr>
+        </p:nvSpPr>
+        <p:spPr/>
+        <p:txBody>
+          <a:bodyPr/>
+          <a:lstStyle/>
+          <a:p>
+            <a:fld id="{C74020FE-8C96-4489-AA9C-8781786544CA}" type="slidenum">
+              <a:rPr lang="en-GB" smtClean="0"/>
+              <a:t>26</a:t>
             </a:fld>
             <a:endParaRPr lang="en-GB"/>
           </a:p>
@@ -10952,36 +11037,2672 @@
       </p:grpSpPr>
       <p:sp>
         <p:nvSpPr>
-          <p:cNvPr id="2" name="Title 1">
-            <a:extLst>
-              <a:ext uri="{FF2B5EF4-FFF2-40B4-BE49-F238E27FC236}">
-                <a16:creationId xmlns:a16="http://schemas.microsoft.com/office/drawing/2014/main" id="{587A13A3-98F1-A632-56E3-7D2561130BE8}"/>
-              </a:ext>
-            </a:extLst>
-          </p:cNvPr>
-          <p:cNvSpPr>
-            <a:spLocks noGrp="1"/>
-          </p:cNvSpPr>
-          <p:nvPr>
-            <p:ph type="title"/>
-          </p:nvPr>
-        </p:nvSpPr>
-        <p:spPr/>
-        <p:txBody>
-          <a:bodyPr/>
+          <p:cNvPr id="4" name="Rectangle 3">
+            <a:extLst>
+              <a:ext uri="{FF2B5EF4-FFF2-40B4-BE49-F238E27FC236}">
+                <a16:creationId xmlns:a16="http://schemas.microsoft.com/office/drawing/2014/main" id="{9DF92B7C-3248-8476-5639-82C1CDFBFA0C}"/>
+              </a:ext>
+            </a:extLst>
+          </p:cNvPr>
+          <p:cNvSpPr/>
+          <p:nvPr/>
+        </p:nvSpPr>
+        <p:spPr>
+          <a:xfrm>
+            <a:off x="0" y="0"/>
+            <a:ext cx="12192000" cy="1060255"/>
+          </a:xfrm>
+          <a:prstGeom prst="rect">
+            <a:avLst/>
+          </a:prstGeom>
+        </p:spPr>
+        <p:style>
+          <a:lnRef idx="2">
+            <a:schemeClr val="accent1">
+              <a:shade val="15000"/>
+            </a:schemeClr>
+          </a:lnRef>
+          <a:fillRef idx="1">
+            <a:schemeClr val="accent1"/>
+          </a:fillRef>
+          <a:effectRef idx="0">
+            <a:schemeClr val="accent1"/>
+          </a:effectRef>
+          <a:fontRef idx="minor">
+            <a:schemeClr val="lt1"/>
+          </a:fontRef>
+        </p:style>
+        <p:txBody>
+          <a:bodyPr rtlCol="0" anchor="ctr"/>
+          <a:lstStyle/>
+          <a:p>
+            <a:pPr algn="ctr"/>
+            <a:endParaRPr lang="en-GB"/>
+          </a:p>
+        </p:txBody>
+      </p:sp>
+      <p:sp>
+        <p:nvSpPr>
+          <p:cNvPr id="23" name="Rectangle 22">
+            <a:extLst>
+              <a:ext uri="{FF2B5EF4-FFF2-40B4-BE49-F238E27FC236}">
+                <a16:creationId xmlns:a16="http://schemas.microsoft.com/office/drawing/2014/main" id="{1B32BAE8-DF0E-3803-9078-0FC631252DD0}"/>
+              </a:ext>
+            </a:extLst>
+          </p:cNvPr>
+          <p:cNvSpPr/>
+          <p:nvPr/>
+        </p:nvSpPr>
+        <p:spPr>
+          <a:xfrm>
+            <a:off x="10511394" y="126219"/>
+            <a:ext cx="1560931" cy="807813"/>
+          </a:xfrm>
+          <a:prstGeom prst="rect">
+            <a:avLst/>
+          </a:prstGeom>
+          <a:solidFill>
+            <a:schemeClr val="bg1"/>
+          </a:solidFill>
+          <a:ln>
+            <a:solidFill>
+              <a:schemeClr val="bg1"/>
+            </a:solidFill>
+          </a:ln>
+        </p:spPr>
+        <p:style>
+          <a:lnRef idx="2">
+            <a:schemeClr val="accent1">
+              <a:shade val="15000"/>
+            </a:schemeClr>
+          </a:lnRef>
+          <a:fillRef idx="1">
+            <a:schemeClr val="accent1"/>
+          </a:fillRef>
+          <a:effectRef idx="0">
+            <a:schemeClr val="accent1"/>
+          </a:effectRef>
+          <a:fontRef idx="minor">
+            <a:schemeClr val="lt1"/>
+          </a:fontRef>
+        </p:style>
+        <p:txBody>
+          <a:bodyPr rtlCol="0" anchor="ctr"/>
+          <a:lstStyle/>
+          <a:p>
+            <a:pPr algn="ctr"/>
+            <a:r>
+              <a:rPr lang="en-GB" dirty="0">
+                <a:ln>
+                  <a:solidFill>
+                    <a:schemeClr val="tx1"/>
+                  </a:solidFill>
+                </a:ln>
+                <a:solidFill>
+                  <a:sysClr val="windowText" lastClr="000000"/>
+                </a:solidFill>
+              </a:rPr>
+              <a:t>Login/sign up</a:t>
+            </a:r>
+          </a:p>
+        </p:txBody>
+      </p:sp>
+      <p:sp>
+        <p:nvSpPr>
+          <p:cNvPr id="24" name="Rectangle 23">
+            <a:extLst>
+              <a:ext uri="{FF2B5EF4-FFF2-40B4-BE49-F238E27FC236}">
+                <a16:creationId xmlns:a16="http://schemas.microsoft.com/office/drawing/2014/main" id="{4F872A8E-6A82-0EB0-0E33-DECF5B2B4F15}"/>
+              </a:ext>
+            </a:extLst>
+          </p:cNvPr>
+          <p:cNvSpPr/>
+          <p:nvPr/>
+        </p:nvSpPr>
+        <p:spPr>
+          <a:xfrm>
+            <a:off x="119675" y="126220"/>
+            <a:ext cx="1553923" cy="807813"/>
+          </a:xfrm>
+          <a:prstGeom prst="rect">
+            <a:avLst/>
+          </a:prstGeom>
+          <a:solidFill>
+            <a:schemeClr val="bg1"/>
+          </a:solidFill>
+          <a:ln>
+            <a:solidFill>
+              <a:schemeClr val="bg1"/>
+            </a:solidFill>
+          </a:ln>
+        </p:spPr>
+        <p:style>
+          <a:lnRef idx="2">
+            <a:schemeClr val="accent1">
+              <a:shade val="15000"/>
+            </a:schemeClr>
+          </a:lnRef>
+          <a:fillRef idx="1">
+            <a:schemeClr val="accent1"/>
+          </a:fillRef>
+          <a:effectRef idx="0">
+            <a:schemeClr val="accent1"/>
+          </a:effectRef>
+          <a:fontRef idx="minor">
+            <a:schemeClr val="lt1"/>
+          </a:fontRef>
+        </p:style>
+        <p:txBody>
+          <a:bodyPr rtlCol="0" anchor="ctr"/>
+          <a:lstStyle/>
+          <a:p>
+            <a:pPr algn="ctr"/>
+            <a:r>
+              <a:rPr lang="en-GB" dirty="0">
+                <a:ln>
+                  <a:solidFill>
+                    <a:schemeClr val="tx1"/>
+                  </a:solidFill>
+                </a:ln>
+                <a:solidFill>
+                  <a:sysClr val="windowText" lastClr="000000"/>
+                </a:solidFill>
+              </a:rPr>
+              <a:t>Home</a:t>
+            </a:r>
+          </a:p>
+        </p:txBody>
+      </p:sp>
+      <p:sp>
+        <p:nvSpPr>
+          <p:cNvPr id="25" name="Rectangle 24">
+            <a:extLst>
+              <a:ext uri="{FF2B5EF4-FFF2-40B4-BE49-F238E27FC236}">
+                <a16:creationId xmlns:a16="http://schemas.microsoft.com/office/drawing/2014/main" id="{1A17B72D-EC2C-9699-3AE2-5709649AADD1}"/>
+              </a:ext>
+            </a:extLst>
+          </p:cNvPr>
+          <p:cNvSpPr/>
+          <p:nvPr/>
+        </p:nvSpPr>
+        <p:spPr>
+          <a:xfrm>
+            <a:off x="1800281" y="121553"/>
+            <a:ext cx="1553923" cy="807813"/>
+          </a:xfrm>
+          <a:prstGeom prst="rect">
+            <a:avLst/>
+          </a:prstGeom>
+          <a:solidFill>
+            <a:schemeClr val="bg1"/>
+          </a:solidFill>
+          <a:ln>
+            <a:solidFill>
+              <a:schemeClr val="bg1"/>
+            </a:solidFill>
+          </a:ln>
+        </p:spPr>
+        <p:style>
+          <a:lnRef idx="2">
+            <a:schemeClr val="accent1">
+              <a:shade val="15000"/>
+            </a:schemeClr>
+          </a:lnRef>
+          <a:fillRef idx="1">
+            <a:schemeClr val="accent1"/>
+          </a:fillRef>
+          <a:effectRef idx="0">
+            <a:schemeClr val="accent1"/>
+          </a:effectRef>
+          <a:fontRef idx="minor">
+            <a:schemeClr val="lt1"/>
+          </a:fontRef>
+        </p:style>
+        <p:txBody>
+          <a:bodyPr rtlCol="0" anchor="ctr"/>
+          <a:lstStyle/>
+          <a:p>
+            <a:pPr algn="ctr"/>
+            <a:r>
+              <a:rPr lang="en-GB" dirty="0">
+                <a:ln>
+                  <a:solidFill>
+                    <a:schemeClr val="tx1"/>
+                  </a:solidFill>
+                </a:ln>
+                <a:solidFill>
+                  <a:sysClr val="windowText" lastClr="000000"/>
+                </a:solidFill>
+              </a:rPr>
+              <a:t>About us</a:t>
+            </a:r>
+          </a:p>
+        </p:txBody>
+      </p:sp>
+      <p:sp>
+        <p:nvSpPr>
+          <p:cNvPr id="26" name="Rectangle 25">
+            <a:extLst>
+              <a:ext uri="{FF2B5EF4-FFF2-40B4-BE49-F238E27FC236}">
+                <a16:creationId xmlns:a16="http://schemas.microsoft.com/office/drawing/2014/main" id="{FB574E8B-F699-ABEB-9794-9C30DEB2251D}"/>
+              </a:ext>
+            </a:extLst>
+          </p:cNvPr>
+          <p:cNvSpPr/>
+          <p:nvPr/>
+        </p:nvSpPr>
+        <p:spPr>
+          <a:xfrm>
+            <a:off x="3495388" y="122953"/>
+            <a:ext cx="1553923" cy="807813"/>
+          </a:xfrm>
+          <a:prstGeom prst="rect">
+            <a:avLst/>
+          </a:prstGeom>
+          <a:solidFill>
+            <a:schemeClr val="bg1"/>
+          </a:solidFill>
+          <a:ln>
+            <a:solidFill>
+              <a:schemeClr val="bg1"/>
+            </a:solidFill>
+          </a:ln>
+        </p:spPr>
+        <p:style>
+          <a:lnRef idx="2">
+            <a:schemeClr val="accent1">
+              <a:shade val="15000"/>
+            </a:schemeClr>
+          </a:lnRef>
+          <a:fillRef idx="1">
+            <a:schemeClr val="accent1"/>
+          </a:fillRef>
+          <a:effectRef idx="0">
+            <a:schemeClr val="accent1"/>
+          </a:effectRef>
+          <a:fontRef idx="minor">
+            <a:schemeClr val="lt1"/>
+          </a:fontRef>
+        </p:style>
+        <p:txBody>
+          <a:bodyPr rtlCol="0" anchor="ctr"/>
+          <a:lstStyle/>
+          <a:p>
+            <a:pPr algn="ctr"/>
+            <a:r>
+              <a:rPr lang="en-GB" dirty="0">
+                <a:ln>
+                  <a:solidFill>
+                    <a:schemeClr val="tx1"/>
+                  </a:solidFill>
+                </a:ln>
+                <a:solidFill>
+                  <a:sysClr val="windowText" lastClr="000000"/>
+                </a:solidFill>
+              </a:rPr>
+              <a:t>Shop</a:t>
+            </a:r>
+          </a:p>
+        </p:txBody>
+      </p:sp>
+      <p:sp>
+        <p:nvSpPr>
+          <p:cNvPr id="27" name="Rectangle 26">
+            <a:extLst>
+              <a:ext uri="{FF2B5EF4-FFF2-40B4-BE49-F238E27FC236}">
+                <a16:creationId xmlns:a16="http://schemas.microsoft.com/office/drawing/2014/main" id="{8EB46E95-6FA0-2DCF-DA14-C280DF39E6D1}"/>
+              </a:ext>
+            </a:extLst>
+          </p:cNvPr>
+          <p:cNvSpPr/>
+          <p:nvPr/>
+        </p:nvSpPr>
+        <p:spPr>
+          <a:xfrm>
+            <a:off x="5213160" y="118038"/>
+            <a:ext cx="1574947" cy="807813"/>
+          </a:xfrm>
+          <a:prstGeom prst="rect">
+            <a:avLst/>
+          </a:prstGeom>
+          <a:solidFill>
+            <a:schemeClr val="bg1"/>
+          </a:solidFill>
+          <a:ln>
+            <a:solidFill>
+              <a:schemeClr val="bg1"/>
+            </a:solidFill>
+          </a:ln>
+        </p:spPr>
+        <p:style>
+          <a:lnRef idx="2">
+            <a:schemeClr val="accent1">
+              <a:shade val="15000"/>
+            </a:schemeClr>
+          </a:lnRef>
+          <a:fillRef idx="1">
+            <a:schemeClr val="accent1"/>
+          </a:fillRef>
+          <a:effectRef idx="0">
+            <a:schemeClr val="accent1"/>
+          </a:effectRef>
+          <a:fontRef idx="minor">
+            <a:schemeClr val="lt1"/>
+          </a:fontRef>
+        </p:style>
+        <p:txBody>
+          <a:bodyPr rtlCol="0" anchor="ctr"/>
+          <a:lstStyle/>
+          <a:p>
+            <a:pPr algn="ctr"/>
+            <a:r>
+              <a:rPr lang="en-GB" dirty="0">
+                <a:ln>
+                  <a:solidFill>
+                    <a:schemeClr val="tx1"/>
+                  </a:solidFill>
+                </a:ln>
+                <a:solidFill>
+                  <a:sysClr val="windowText" lastClr="000000"/>
+                </a:solidFill>
+              </a:rPr>
+              <a:t>News</a:t>
+            </a:r>
+          </a:p>
+        </p:txBody>
+      </p:sp>
+      <p:sp>
+        <p:nvSpPr>
+          <p:cNvPr id="28" name="Rectangle 27">
+            <a:extLst>
+              <a:ext uri="{FF2B5EF4-FFF2-40B4-BE49-F238E27FC236}">
+                <a16:creationId xmlns:a16="http://schemas.microsoft.com/office/drawing/2014/main" id="{2BD270B0-3C25-2E48-E45B-D6E556B06FE1}"/>
+              </a:ext>
+            </a:extLst>
+          </p:cNvPr>
+          <p:cNvSpPr/>
+          <p:nvPr/>
+        </p:nvSpPr>
+        <p:spPr>
+          <a:xfrm>
+            <a:off x="8726071" y="118038"/>
+            <a:ext cx="1560931" cy="807813"/>
+          </a:xfrm>
+          <a:prstGeom prst="rect">
+            <a:avLst/>
+          </a:prstGeom>
+          <a:solidFill>
+            <a:schemeClr val="bg1"/>
+          </a:solidFill>
+          <a:ln>
+            <a:solidFill>
+              <a:schemeClr val="bg1"/>
+            </a:solidFill>
+          </a:ln>
+        </p:spPr>
+        <p:style>
+          <a:lnRef idx="2">
+            <a:schemeClr val="accent1">
+              <a:shade val="15000"/>
+            </a:schemeClr>
+          </a:lnRef>
+          <a:fillRef idx="1">
+            <a:schemeClr val="accent1"/>
+          </a:fillRef>
+          <a:effectRef idx="0">
+            <a:schemeClr val="accent1"/>
+          </a:effectRef>
+          <a:fontRef idx="minor">
+            <a:schemeClr val="lt1"/>
+          </a:fontRef>
+        </p:style>
+        <p:txBody>
+          <a:bodyPr rtlCol="0" anchor="ctr"/>
+          <a:lstStyle/>
+          <a:p>
+            <a:pPr algn="ctr"/>
+            <a:r>
+              <a:rPr lang="en-GB" dirty="0">
+                <a:ln>
+                  <a:solidFill>
+                    <a:schemeClr val="tx1"/>
+                  </a:solidFill>
+                </a:ln>
+                <a:solidFill>
+                  <a:sysClr val="windowText" lastClr="000000"/>
+                </a:solidFill>
+              </a:rPr>
+              <a:t>Uniform lists</a:t>
+            </a:r>
+          </a:p>
+        </p:txBody>
+      </p:sp>
+      <p:sp>
+        <p:nvSpPr>
+          <p:cNvPr id="29" name="Rectangle 28">
+            <a:extLst>
+              <a:ext uri="{FF2B5EF4-FFF2-40B4-BE49-F238E27FC236}">
+                <a16:creationId xmlns:a16="http://schemas.microsoft.com/office/drawing/2014/main" id="{CAFBEAD1-D3B6-1B1E-C357-A7881427C69F}"/>
+              </a:ext>
+            </a:extLst>
+          </p:cNvPr>
+          <p:cNvSpPr/>
+          <p:nvPr/>
+        </p:nvSpPr>
+        <p:spPr>
+          <a:xfrm>
+            <a:off x="6966457" y="118039"/>
+            <a:ext cx="1560931" cy="807813"/>
+          </a:xfrm>
+          <a:prstGeom prst="rect">
+            <a:avLst/>
+          </a:prstGeom>
+          <a:solidFill>
+            <a:schemeClr val="bg1"/>
+          </a:solidFill>
+          <a:ln>
+            <a:solidFill>
+              <a:schemeClr val="bg1"/>
+            </a:solidFill>
+          </a:ln>
+        </p:spPr>
+        <p:style>
+          <a:lnRef idx="2">
+            <a:schemeClr val="accent1">
+              <a:shade val="15000"/>
+            </a:schemeClr>
+          </a:lnRef>
+          <a:fillRef idx="1">
+            <a:schemeClr val="accent1"/>
+          </a:fillRef>
+          <a:effectRef idx="0">
+            <a:schemeClr val="accent1"/>
+          </a:effectRef>
+          <a:fontRef idx="minor">
+            <a:schemeClr val="lt1"/>
+          </a:fontRef>
+        </p:style>
+        <p:txBody>
+          <a:bodyPr rtlCol="0" anchor="ctr"/>
+          <a:lstStyle/>
+          <a:p>
+            <a:pPr algn="ctr"/>
+            <a:r>
+              <a:rPr lang="en-GB" dirty="0">
+                <a:ln>
+                  <a:solidFill>
+                    <a:schemeClr val="tx1"/>
+                  </a:solidFill>
+                </a:ln>
+                <a:solidFill>
+                  <a:sysClr val="windowText" lastClr="000000"/>
+                </a:solidFill>
+              </a:rPr>
+              <a:t>FAQs</a:t>
+            </a:r>
+          </a:p>
+        </p:txBody>
+      </p:sp>
+      <p:sp>
+        <p:nvSpPr>
+          <p:cNvPr id="5" name="Rectangle 4">
+            <a:extLst>
+              <a:ext uri="{FF2B5EF4-FFF2-40B4-BE49-F238E27FC236}">
+                <a16:creationId xmlns:a16="http://schemas.microsoft.com/office/drawing/2014/main" id="{8BD2BF45-BE4D-6DD8-D1C5-37021270AA4B}"/>
+              </a:ext>
+            </a:extLst>
+          </p:cNvPr>
+          <p:cNvSpPr/>
+          <p:nvPr/>
+        </p:nvSpPr>
+        <p:spPr>
+          <a:xfrm>
+            <a:off x="48597" y="1823608"/>
+            <a:ext cx="1897991" cy="1879977"/>
+          </a:xfrm>
+          <a:prstGeom prst="rect">
+            <a:avLst/>
+          </a:prstGeom>
+          <a:solidFill>
+            <a:schemeClr val="bg1"/>
+          </a:solidFill>
+        </p:spPr>
+        <p:style>
+          <a:lnRef idx="2">
+            <a:schemeClr val="accent1">
+              <a:shade val="15000"/>
+            </a:schemeClr>
+          </a:lnRef>
+          <a:fillRef idx="1">
+            <a:schemeClr val="accent1"/>
+          </a:fillRef>
+          <a:effectRef idx="0">
+            <a:schemeClr val="accent1"/>
+          </a:effectRef>
+          <a:fontRef idx="minor">
+            <a:schemeClr val="lt1"/>
+          </a:fontRef>
+        </p:style>
+        <p:txBody>
+          <a:bodyPr rtlCol="0" anchor="ctr"/>
+          <a:lstStyle/>
+          <a:p>
+            <a:pPr algn="ctr"/>
+            <a:r>
+              <a:rPr lang="en-GB" dirty="0">
+                <a:ln>
+                  <a:solidFill>
+                    <a:sysClr val="windowText" lastClr="000000"/>
+                  </a:solidFill>
+                </a:ln>
+                <a:solidFill>
+                  <a:sysClr val="windowText" lastClr="000000"/>
+                </a:solidFill>
+              </a:rPr>
+              <a:t>Photo of item</a:t>
+            </a:r>
+          </a:p>
+        </p:txBody>
+      </p:sp>
+      <p:sp>
+        <p:nvSpPr>
+          <p:cNvPr id="7" name="Rectangle 6">
+            <a:extLst>
+              <a:ext uri="{FF2B5EF4-FFF2-40B4-BE49-F238E27FC236}">
+                <a16:creationId xmlns:a16="http://schemas.microsoft.com/office/drawing/2014/main" id="{72EF8E69-78FC-7E8F-EEDC-61172683F7BA}"/>
+              </a:ext>
+            </a:extLst>
+          </p:cNvPr>
+          <p:cNvSpPr/>
+          <p:nvPr/>
+        </p:nvSpPr>
+        <p:spPr>
+          <a:xfrm>
+            <a:off x="8154798" y="1823611"/>
+            <a:ext cx="1897991" cy="1879977"/>
+          </a:xfrm>
+          <a:prstGeom prst="rect">
+            <a:avLst/>
+          </a:prstGeom>
+          <a:solidFill>
+            <a:schemeClr val="bg1"/>
+          </a:solidFill>
+        </p:spPr>
+        <p:style>
+          <a:lnRef idx="2">
+            <a:schemeClr val="accent1">
+              <a:shade val="15000"/>
+            </a:schemeClr>
+          </a:lnRef>
+          <a:fillRef idx="1">
+            <a:schemeClr val="accent1"/>
+          </a:fillRef>
+          <a:effectRef idx="0">
+            <a:schemeClr val="accent1"/>
+          </a:effectRef>
+          <a:fontRef idx="minor">
+            <a:schemeClr val="lt1"/>
+          </a:fontRef>
+        </p:style>
+        <p:txBody>
+          <a:bodyPr rtlCol="0" anchor="ctr"/>
+          <a:lstStyle/>
+          <a:p>
+            <a:pPr algn="ctr"/>
+            <a:endParaRPr lang="en-GB"/>
+          </a:p>
+        </p:txBody>
+      </p:sp>
+      <p:sp>
+        <p:nvSpPr>
+          <p:cNvPr id="9" name="Rectangle 8">
+            <a:extLst>
+              <a:ext uri="{FF2B5EF4-FFF2-40B4-BE49-F238E27FC236}">
+                <a16:creationId xmlns:a16="http://schemas.microsoft.com/office/drawing/2014/main" id="{C780CECD-2D87-C98D-E7C1-FC99A94C7823}"/>
+              </a:ext>
+            </a:extLst>
+          </p:cNvPr>
+          <p:cNvSpPr/>
+          <p:nvPr/>
+        </p:nvSpPr>
+        <p:spPr>
+          <a:xfrm>
+            <a:off x="10174334" y="1831793"/>
+            <a:ext cx="1897991" cy="1879977"/>
+          </a:xfrm>
+          <a:prstGeom prst="rect">
+            <a:avLst/>
+          </a:prstGeom>
+          <a:solidFill>
+            <a:schemeClr val="bg1"/>
+          </a:solidFill>
+        </p:spPr>
+        <p:style>
+          <a:lnRef idx="2">
+            <a:schemeClr val="accent1">
+              <a:shade val="15000"/>
+            </a:schemeClr>
+          </a:lnRef>
+          <a:fillRef idx="1">
+            <a:schemeClr val="accent1"/>
+          </a:fillRef>
+          <a:effectRef idx="0">
+            <a:schemeClr val="accent1"/>
+          </a:effectRef>
+          <a:fontRef idx="minor">
+            <a:schemeClr val="lt1"/>
+          </a:fontRef>
+        </p:style>
+        <p:txBody>
+          <a:bodyPr rtlCol="0" anchor="ctr"/>
+          <a:lstStyle/>
+          <a:p>
+            <a:pPr algn="ctr"/>
+            <a:endParaRPr lang="en-GB"/>
+          </a:p>
+        </p:txBody>
+      </p:sp>
+      <p:sp>
+        <p:nvSpPr>
+          <p:cNvPr id="10" name="Rectangle 9">
+            <a:extLst>
+              <a:ext uri="{FF2B5EF4-FFF2-40B4-BE49-F238E27FC236}">
+                <a16:creationId xmlns:a16="http://schemas.microsoft.com/office/drawing/2014/main" id="{6D09C83F-1D9D-69A6-9FDD-EE82991729DC}"/>
+              </a:ext>
+            </a:extLst>
+          </p:cNvPr>
+          <p:cNvSpPr/>
+          <p:nvPr/>
+        </p:nvSpPr>
+        <p:spPr>
+          <a:xfrm>
+            <a:off x="6135261" y="1823610"/>
+            <a:ext cx="1897992" cy="1879977"/>
+          </a:xfrm>
+          <a:prstGeom prst="rect">
+            <a:avLst/>
+          </a:prstGeom>
+          <a:solidFill>
+            <a:schemeClr val="bg1"/>
+          </a:solidFill>
+        </p:spPr>
+        <p:style>
+          <a:lnRef idx="2">
+            <a:schemeClr val="accent1">
+              <a:shade val="15000"/>
+            </a:schemeClr>
+          </a:lnRef>
+          <a:fillRef idx="1">
+            <a:schemeClr val="accent1"/>
+          </a:fillRef>
+          <a:effectRef idx="0">
+            <a:schemeClr val="accent1"/>
+          </a:effectRef>
+          <a:fontRef idx="minor">
+            <a:schemeClr val="lt1"/>
+          </a:fontRef>
+        </p:style>
+        <p:txBody>
+          <a:bodyPr rtlCol="0" anchor="ctr"/>
+          <a:lstStyle/>
+          <a:p>
+            <a:pPr algn="ctr"/>
+            <a:endParaRPr lang="en-GB"/>
+          </a:p>
+        </p:txBody>
+      </p:sp>
+      <p:sp>
+        <p:nvSpPr>
+          <p:cNvPr id="14" name="Rectangle 13">
+            <a:extLst>
+              <a:ext uri="{FF2B5EF4-FFF2-40B4-BE49-F238E27FC236}">
+                <a16:creationId xmlns:a16="http://schemas.microsoft.com/office/drawing/2014/main" id="{4F1BE9C0-D4CD-544A-3A4F-E19D98A50D0F}"/>
+              </a:ext>
+            </a:extLst>
+          </p:cNvPr>
+          <p:cNvSpPr/>
+          <p:nvPr/>
+        </p:nvSpPr>
+        <p:spPr>
+          <a:xfrm>
+            <a:off x="4128806" y="1831793"/>
+            <a:ext cx="1897991" cy="1879977"/>
+          </a:xfrm>
+          <a:prstGeom prst="rect">
+            <a:avLst/>
+          </a:prstGeom>
+          <a:solidFill>
+            <a:schemeClr val="bg1"/>
+          </a:solidFill>
+        </p:spPr>
+        <p:style>
+          <a:lnRef idx="2">
+            <a:schemeClr val="accent1">
+              <a:shade val="15000"/>
+            </a:schemeClr>
+          </a:lnRef>
+          <a:fillRef idx="1">
+            <a:schemeClr val="accent1"/>
+          </a:fillRef>
+          <a:effectRef idx="0">
+            <a:schemeClr val="accent1"/>
+          </a:effectRef>
+          <a:fontRef idx="minor">
+            <a:schemeClr val="lt1"/>
+          </a:fontRef>
+        </p:style>
+        <p:txBody>
+          <a:bodyPr rtlCol="0" anchor="ctr"/>
+          <a:lstStyle/>
+          <a:p>
+            <a:pPr algn="ctr"/>
+            <a:endParaRPr lang="en-GB"/>
+          </a:p>
+        </p:txBody>
+      </p:sp>
+      <p:sp>
+        <p:nvSpPr>
+          <p:cNvPr id="16" name="Rectangle 15">
+            <a:extLst>
+              <a:ext uri="{FF2B5EF4-FFF2-40B4-BE49-F238E27FC236}">
+                <a16:creationId xmlns:a16="http://schemas.microsoft.com/office/drawing/2014/main" id="{3C386DAD-DCD2-95C5-889B-BE22ABB4D8E6}"/>
+              </a:ext>
+            </a:extLst>
+          </p:cNvPr>
+          <p:cNvSpPr/>
+          <p:nvPr/>
+        </p:nvSpPr>
+        <p:spPr>
+          <a:xfrm>
+            <a:off x="2077485" y="1823609"/>
+            <a:ext cx="1897991" cy="1879977"/>
+          </a:xfrm>
+          <a:prstGeom prst="rect">
+            <a:avLst/>
+          </a:prstGeom>
+          <a:solidFill>
+            <a:schemeClr val="bg1"/>
+          </a:solidFill>
+        </p:spPr>
+        <p:style>
+          <a:lnRef idx="2">
+            <a:schemeClr val="accent1">
+              <a:shade val="15000"/>
+            </a:schemeClr>
+          </a:lnRef>
+          <a:fillRef idx="1">
+            <a:schemeClr val="accent1"/>
+          </a:fillRef>
+          <a:effectRef idx="0">
+            <a:schemeClr val="accent1"/>
+          </a:effectRef>
+          <a:fontRef idx="minor">
+            <a:schemeClr val="lt1"/>
+          </a:fontRef>
+        </p:style>
+        <p:txBody>
+          <a:bodyPr rtlCol="0" anchor="ctr"/>
+          <a:lstStyle/>
+          <a:p>
+            <a:pPr algn="ctr"/>
+            <a:endParaRPr lang="en-GB"/>
+          </a:p>
+        </p:txBody>
+      </p:sp>
+      <p:sp>
+        <p:nvSpPr>
+          <p:cNvPr id="17" name="Rectangle 16">
+            <a:extLst>
+              <a:ext uri="{FF2B5EF4-FFF2-40B4-BE49-F238E27FC236}">
+                <a16:creationId xmlns:a16="http://schemas.microsoft.com/office/drawing/2014/main" id="{BC05E0ED-4D75-412B-5E2E-6ADE21C1AA79}"/>
+              </a:ext>
+            </a:extLst>
+          </p:cNvPr>
+          <p:cNvSpPr/>
+          <p:nvPr/>
+        </p:nvSpPr>
+        <p:spPr>
+          <a:xfrm>
+            <a:off x="2077485" y="1823607"/>
+            <a:ext cx="1897991" cy="1879977"/>
+          </a:xfrm>
+          <a:prstGeom prst="rect">
+            <a:avLst/>
+          </a:prstGeom>
+          <a:solidFill>
+            <a:schemeClr val="bg1"/>
+          </a:solidFill>
+        </p:spPr>
+        <p:style>
+          <a:lnRef idx="2">
+            <a:schemeClr val="accent1">
+              <a:shade val="15000"/>
+            </a:schemeClr>
+          </a:lnRef>
+          <a:fillRef idx="1">
+            <a:schemeClr val="accent1"/>
+          </a:fillRef>
+          <a:effectRef idx="0">
+            <a:schemeClr val="accent1"/>
+          </a:effectRef>
+          <a:fontRef idx="minor">
+            <a:schemeClr val="lt1"/>
+          </a:fontRef>
+        </p:style>
+        <p:txBody>
+          <a:bodyPr rtlCol="0" anchor="ctr"/>
+          <a:lstStyle/>
+          <a:p>
+            <a:pPr algn="ctr"/>
+            <a:r>
+              <a:rPr lang="en-GB" dirty="0">
+                <a:ln>
+                  <a:solidFill>
+                    <a:sysClr val="windowText" lastClr="000000"/>
+                  </a:solidFill>
+                </a:ln>
+                <a:solidFill>
+                  <a:sysClr val="windowText" lastClr="000000"/>
+                </a:solidFill>
+              </a:rPr>
+              <a:t>Photo of item</a:t>
+            </a:r>
+          </a:p>
+        </p:txBody>
+      </p:sp>
+      <p:sp>
+        <p:nvSpPr>
+          <p:cNvPr id="18" name="Rectangle 17">
+            <a:extLst>
+              <a:ext uri="{FF2B5EF4-FFF2-40B4-BE49-F238E27FC236}">
+                <a16:creationId xmlns:a16="http://schemas.microsoft.com/office/drawing/2014/main" id="{C80646AE-4BCE-4E60-BAF1-ED37E8342DEA}"/>
+              </a:ext>
+            </a:extLst>
+          </p:cNvPr>
+          <p:cNvSpPr/>
+          <p:nvPr/>
+        </p:nvSpPr>
+        <p:spPr>
+          <a:xfrm>
+            <a:off x="4128805" y="1831793"/>
+            <a:ext cx="1897991" cy="1879977"/>
+          </a:xfrm>
+          <a:prstGeom prst="rect">
+            <a:avLst/>
+          </a:prstGeom>
+          <a:solidFill>
+            <a:schemeClr val="bg1"/>
+          </a:solidFill>
+        </p:spPr>
+        <p:style>
+          <a:lnRef idx="2">
+            <a:schemeClr val="accent1">
+              <a:shade val="15000"/>
+            </a:schemeClr>
+          </a:lnRef>
+          <a:fillRef idx="1">
+            <a:schemeClr val="accent1"/>
+          </a:fillRef>
+          <a:effectRef idx="0">
+            <a:schemeClr val="accent1"/>
+          </a:effectRef>
+          <a:fontRef idx="minor">
+            <a:schemeClr val="lt1"/>
+          </a:fontRef>
+        </p:style>
+        <p:txBody>
+          <a:bodyPr rtlCol="0" anchor="ctr"/>
+          <a:lstStyle/>
+          <a:p>
+            <a:pPr algn="ctr"/>
+            <a:r>
+              <a:rPr lang="en-GB" dirty="0">
+                <a:ln>
+                  <a:solidFill>
+                    <a:sysClr val="windowText" lastClr="000000"/>
+                  </a:solidFill>
+                </a:ln>
+                <a:solidFill>
+                  <a:sysClr val="windowText" lastClr="000000"/>
+                </a:solidFill>
+              </a:rPr>
+              <a:t>Photo of item</a:t>
+            </a:r>
+          </a:p>
+        </p:txBody>
+      </p:sp>
+      <p:sp>
+        <p:nvSpPr>
+          <p:cNvPr id="19" name="Rectangle 18">
+            <a:extLst>
+              <a:ext uri="{FF2B5EF4-FFF2-40B4-BE49-F238E27FC236}">
+                <a16:creationId xmlns:a16="http://schemas.microsoft.com/office/drawing/2014/main" id="{CAD47FAB-00D7-C6CA-939D-59B2BB0B95AD}"/>
+              </a:ext>
+            </a:extLst>
+          </p:cNvPr>
+          <p:cNvSpPr/>
+          <p:nvPr/>
+        </p:nvSpPr>
+        <p:spPr>
+          <a:xfrm>
+            <a:off x="6135262" y="1823606"/>
+            <a:ext cx="1897991" cy="1879977"/>
+          </a:xfrm>
+          <a:prstGeom prst="rect">
+            <a:avLst/>
+          </a:prstGeom>
+          <a:solidFill>
+            <a:schemeClr val="bg1"/>
+          </a:solidFill>
+        </p:spPr>
+        <p:style>
+          <a:lnRef idx="2">
+            <a:schemeClr val="accent1">
+              <a:shade val="15000"/>
+            </a:schemeClr>
+          </a:lnRef>
+          <a:fillRef idx="1">
+            <a:schemeClr val="accent1"/>
+          </a:fillRef>
+          <a:effectRef idx="0">
+            <a:schemeClr val="accent1"/>
+          </a:effectRef>
+          <a:fontRef idx="minor">
+            <a:schemeClr val="lt1"/>
+          </a:fontRef>
+        </p:style>
+        <p:txBody>
+          <a:bodyPr rtlCol="0" anchor="ctr"/>
+          <a:lstStyle/>
+          <a:p>
+            <a:pPr algn="ctr"/>
+            <a:r>
+              <a:rPr lang="en-GB" dirty="0">
+                <a:ln>
+                  <a:solidFill>
+                    <a:sysClr val="windowText" lastClr="000000"/>
+                  </a:solidFill>
+                </a:ln>
+                <a:solidFill>
+                  <a:sysClr val="windowText" lastClr="000000"/>
+                </a:solidFill>
+              </a:rPr>
+              <a:t>Photo of item</a:t>
+            </a:r>
+          </a:p>
+        </p:txBody>
+      </p:sp>
+      <p:sp>
+        <p:nvSpPr>
+          <p:cNvPr id="20" name="Rectangle 19">
+            <a:extLst>
+              <a:ext uri="{FF2B5EF4-FFF2-40B4-BE49-F238E27FC236}">
+                <a16:creationId xmlns:a16="http://schemas.microsoft.com/office/drawing/2014/main" id="{06FF01B2-1C49-53B0-5E7D-9F41D8DE6DA4}"/>
+              </a:ext>
+            </a:extLst>
+          </p:cNvPr>
+          <p:cNvSpPr/>
+          <p:nvPr/>
+        </p:nvSpPr>
+        <p:spPr>
+          <a:xfrm>
+            <a:off x="8155718" y="1823605"/>
+            <a:ext cx="1897991" cy="1879977"/>
+          </a:xfrm>
+          <a:prstGeom prst="rect">
+            <a:avLst/>
+          </a:prstGeom>
+          <a:solidFill>
+            <a:schemeClr val="bg1"/>
+          </a:solidFill>
+        </p:spPr>
+        <p:style>
+          <a:lnRef idx="2">
+            <a:schemeClr val="accent1">
+              <a:shade val="15000"/>
+            </a:schemeClr>
+          </a:lnRef>
+          <a:fillRef idx="1">
+            <a:schemeClr val="accent1"/>
+          </a:fillRef>
+          <a:effectRef idx="0">
+            <a:schemeClr val="accent1"/>
+          </a:effectRef>
+          <a:fontRef idx="minor">
+            <a:schemeClr val="lt1"/>
+          </a:fontRef>
+        </p:style>
+        <p:txBody>
+          <a:bodyPr rtlCol="0" anchor="ctr"/>
+          <a:lstStyle/>
+          <a:p>
+            <a:pPr algn="ctr"/>
+            <a:r>
+              <a:rPr lang="en-GB" dirty="0">
+                <a:ln>
+                  <a:solidFill>
+                    <a:sysClr val="windowText" lastClr="000000"/>
+                  </a:solidFill>
+                </a:ln>
+                <a:solidFill>
+                  <a:sysClr val="windowText" lastClr="000000"/>
+                </a:solidFill>
+              </a:rPr>
+              <a:t>Photo of item</a:t>
+            </a:r>
+          </a:p>
+        </p:txBody>
+      </p:sp>
+      <p:sp>
+        <p:nvSpPr>
+          <p:cNvPr id="21" name="Rectangle 20">
+            <a:extLst>
+              <a:ext uri="{FF2B5EF4-FFF2-40B4-BE49-F238E27FC236}">
+                <a16:creationId xmlns:a16="http://schemas.microsoft.com/office/drawing/2014/main" id="{AC17E3EF-6463-3A60-8268-89488B901122}"/>
+              </a:ext>
+            </a:extLst>
+          </p:cNvPr>
+          <p:cNvSpPr/>
+          <p:nvPr/>
+        </p:nvSpPr>
+        <p:spPr>
+          <a:xfrm>
+            <a:off x="10173414" y="1831793"/>
+            <a:ext cx="1897991" cy="1879977"/>
+          </a:xfrm>
+          <a:prstGeom prst="rect">
+            <a:avLst/>
+          </a:prstGeom>
+          <a:solidFill>
+            <a:schemeClr val="bg1"/>
+          </a:solidFill>
+        </p:spPr>
+        <p:style>
+          <a:lnRef idx="2">
+            <a:schemeClr val="accent1">
+              <a:shade val="15000"/>
+            </a:schemeClr>
+          </a:lnRef>
+          <a:fillRef idx="1">
+            <a:schemeClr val="accent1"/>
+          </a:fillRef>
+          <a:effectRef idx="0">
+            <a:schemeClr val="accent1"/>
+          </a:effectRef>
+          <a:fontRef idx="minor">
+            <a:schemeClr val="lt1"/>
+          </a:fontRef>
+        </p:style>
+        <p:txBody>
+          <a:bodyPr rtlCol="0" anchor="ctr"/>
+          <a:lstStyle/>
+          <a:p>
+            <a:pPr algn="ctr"/>
+            <a:r>
+              <a:rPr lang="en-GB" dirty="0">
+                <a:ln>
+                  <a:solidFill>
+                    <a:sysClr val="windowText" lastClr="000000"/>
+                  </a:solidFill>
+                </a:ln>
+                <a:solidFill>
+                  <a:sysClr val="windowText" lastClr="000000"/>
+                </a:solidFill>
+              </a:rPr>
+              <a:t>Photo of item</a:t>
+            </a:r>
+          </a:p>
+        </p:txBody>
+      </p:sp>
+      <p:sp>
+        <p:nvSpPr>
+          <p:cNvPr id="22" name="TextBox 21">
+            <a:extLst>
+              <a:ext uri="{FF2B5EF4-FFF2-40B4-BE49-F238E27FC236}">
+                <a16:creationId xmlns:a16="http://schemas.microsoft.com/office/drawing/2014/main" id="{601AF672-4220-D216-78D8-AA012C0DE55B}"/>
+              </a:ext>
+            </a:extLst>
+          </p:cNvPr>
+          <p:cNvSpPr txBox="1"/>
+          <p:nvPr/>
+        </p:nvSpPr>
+        <p:spPr>
+          <a:xfrm>
+            <a:off x="329099" y="3728581"/>
+            <a:ext cx="1262209" cy="338554"/>
+          </a:xfrm>
+          <a:prstGeom prst="rect">
+            <a:avLst/>
+          </a:prstGeom>
+          <a:noFill/>
+        </p:spPr>
+        <p:txBody>
+          <a:bodyPr wrap="square" rtlCol="0">
+            <a:spAutoFit/>
+          </a:bodyPr>
+          <a:lstStyle/>
+          <a:p>
+            <a:r>
+              <a:rPr lang="en-GB" sz="1600" dirty="0"/>
+              <a:t>Item name</a:t>
+            </a:r>
+          </a:p>
+        </p:txBody>
+      </p:sp>
+      <p:sp>
+        <p:nvSpPr>
+          <p:cNvPr id="30" name="TextBox 29">
+            <a:extLst>
+              <a:ext uri="{FF2B5EF4-FFF2-40B4-BE49-F238E27FC236}">
+                <a16:creationId xmlns:a16="http://schemas.microsoft.com/office/drawing/2014/main" id="{BDF08983-7ED7-CBBB-EC22-DF7CFF37490B}"/>
+              </a:ext>
+            </a:extLst>
+          </p:cNvPr>
+          <p:cNvSpPr txBox="1"/>
+          <p:nvPr/>
+        </p:nvSpPr>
+        <p:spPr>
+          <a:xfrm>
+            <a:off x="362757" y="4041815"/>
+            <a:ext cx="1194891" cy="338554"/>
+          </a:xfrm>
+          <a:prstGeom prst="rect">
+            <a:avLst/>
+          </a:prstGeom>
+          <a:noFill/>
+        </p:spPr>
+        <p:txBody>
+          <a:bodyPr wrap="square" rtlCol="0">
+            <a:spAutoFit/>
+          </a:bodyPr>
+          <a:lstStyle/>
+          <a:p>
+            <a:r>
+              <a:rPr lang="en-GB" sz="1600" dirty="0"/>
+              <a:t>Item price</a:t>
+            </a:r>
+          </a:p>
+        </p:txBody>
+      </p:sp>
+      <p:sp>
+        <p:nvSpPr>
+          <p:cNvPr id="31" name="TextBox 30">
+            <a:extLst>
+              <a:ext uri="{FF2B5EF4-FFF2-40B4-BE49-F238E27FC236}">
+                <a16:creationId xmlns:a16="http://schemas.microsoft.com/office/drawing/2014/main" id="{EB5A0EA4-C70F-BD61-9CED-8B250EE85385}"/>
+              </a:ext>
+            </a:extLst>
+          </p:cNvPr>
+          <p:cNvSpPr txBox="1"/>
+          <p:nvPr/>
+        </p:nvSpPr>
+        <p:spPr>
+          <a:xfrm>
+            <a:off x="2433715" y="3711770"/>
+            <a:ext cx="1262209" cy="338554"/>
+          </a:xfrm>
+          <a:prstGeom prst="rect">
+            <a:avLst/>
+          </a:prstGeom>
+          <a:noFill/>
+        </p:spPr>
+        <p:txBody>
+          <a:bodyPr wrap="square" rtlCol="0">
+            <a:spAutoFit/>
+          </a:bodyPr>
+          <a:lstStyle/>
+          <a:p>
+            <a:r>
+              <a:rPr lang="en-GB" sz="1600" dirty="0"/>
+              <a:t>Item name</a:t>
+            </a:r>
+          </a:p>
+        </p:txBody>
+      </p:sp>
+      <p:sp>
+        <p:nvSpPr>
+          <p:cNvPr id="32" name="TextBox 31">
+            <a:extLst>
+              <a:ext uri="{FF2B5EF4-FFF2-40B4-BE49-F238E27FC236}">
+                <a16:creationId xmlns:a16="http://schemas.microsoft.com/office/drawing/2014/main" id="{C2E9F7B6-DB76-C522-0A03-DB1F6894AC9A}"/>
+              </a:ext>
+            </a:extLst>
+          </p:cNvPr>
+          <p:cNvSpPr txBox="1"/>
+          <p:nvPr/>
+        </p:nvSpPr>
+        <p:spPr>
+          <a:xfrm>
+            <a:off x="2467373" y="4041815"/>
+            <a:ext cx="1194891" cy="338554"/>
+          </a:xfrm>
+          <a:prstGeom prst="rect">
+            <a:avLst/>
+          </a:prstGeom>
+          <a:noFill/>
+        </p:spPr>
+        <p:txBody>
+          <a:bodyPr wrap="square" rtlCol="0">
+            <a:spAutoFit/>
+          </a:bodyPr>
+          <a:lstStyle/>
+          <a:p>
+            <a:r>
+              <a:rPr lang="en-GB" sz="1600" dirty="0"/>
+              <a:t>Item price</a:t>
+            </a:r>
+          </a:p>
+        </p:txBody>
+      </p:sp>
+      <p:sp>
+        <p:nvSpPr>
+          <p:cNvPr id="33" name="TextBox 32">
+            <a:extLst>
+              <a:ext uri="{FF2B5EF4-FFF2-40B4-BE49-F238E27FC236}">
+                <a16:creationId xmlns:a16="http://schemas.microsoft.com/office/drawing/2014/main" id="{98DD2A99-2B45-52C5-B8D6-187770F896A0}"/>
+              </a:ext>
+            </a:extLst>
+          </p:cNvPr>
+          <p:cNvSpPr txBox="1"/>
+          <p:nvPr/>
+        </p:nvSpPr>
+        <p:spPr>
+          <a:xfrm>
+            <a:off x="4465404" y="3728581"/>
+            <a:ext cx="1262209" cy="338554"/>
+          </a:xfrm>
+          <a:prstGeom prst="rect">
+            <a:avLst/>
+          </a:prstGeom>
+          <a:noFill/>
+        </p:spPr>
+        <p:txBody>
+          <a:bodyPr wrap="square" rtlCol="0">
+            <a:spAutoFit/>
+          </a:bodyPr>
+          <a:lstStyle/>
+          <a:p>
+            <a:r>
+              <a:rPr lang="en-GB" sz="1600" dirty="0"/>
+              <a:t>Item name</a:t>
+            </a:r>
+          </a:p>
+        </p:txBody>
+      </p:sp>
+      <p:sp>
+        <p:nvSpPr>
+          <p:cNvPr id="34" name="TextBox 33">
+            <a:extLst>
+              <a:ext uri="{FF2B5EF4-FFF2-40B4-BE49-F238E27FC236}">
+                <a16:creationId xmlns:a16="http://schemas.microsoft.com/office/drawing/2014/main" id="{5C117C62-704B-4189-64DC-B6E855A5CBF1}"/>
+              </a:ext>
+            </a:extLst>
+          </p:cNvPr>
+          <p:cNvSpPr txBox="1"/>
+          <p:nvPr/>
+        </p:nvSpPr>
+        <p:spPr>
+          <a:xfrm>
+            <a:off x="4499062" y="4058626"/>
+            <a:ext cx="1194891" cy="338554"/>
+          </a:xfrm>
+          <a:prstGeom prst="rect">
+            <a:avLst/>
+          </a:prstGeom>
+          <a:noFill/>
+        </p:spPr>
+        <p:txBody>
+          <a:bodyPr wrap="square" rtlCol="0">
+            <a:spAutoFit/>
+          </a:bodyPr>
+          <a:lstStyle/>
+          <a:p>
+            <a:r>
+              <a:rPr lang="en-GB" sz="1600" dirty="0"/>
+              <a:t>Item price</a:t>
+            </a:r>
+          </a:p>
+        </p:txBody>
+      </p:sp>
+      <p:sp>
+        <p:nvSpPr>
+          <p:cNvPr id="35" name="TextBox 34">
+            <a:extLst>
+              <a:ext uri="{FF2B5EF4-FFF2-40B4-BE49-F238E27FC236}">
+                <a16:creationId xmlns:a16="http://schemas.microsoft.com/office/drawing/2014/main" id="{15A6F5E3-D73C-47ED-FCFB-B3619C7C4837}"/>
+              </a:ext>
+            </a:extLst>
+          </p:cNvPr>
+          <p:cNvSpPr txBox="1"/>
+          <p:nvPr/>
+        </p:nvSpPr>
+        <p:spPr>
+          <a:xfrm>
+            <a:off x="6463435" y="3711770"/>
+            <a:ext cx="1262209" cy="338554"/>
+          </a:xfrm>
+          <a:prstGeom prst="rect">
+            <a:avLst/>
+          </a:prstGeom>
+          <a:noFill/>
+        </p:spPr>
+        <p:txBody>
+          <a:bodyPr wrap="square" rtlCol="0">
+            <a:spAutoFit/>
+          </a:bodyPr>
+          <a:lstStyle/>
+          <a:p>
+            <a:r>
+              <a:rPr lang="en-GB" sz="1600" dirty="0"/>
+              <a:t>Item name</a:t>
+            </a:r>
+          </a:p>
+        </p:txBody>
+      </p:sp>
+      <p:sp>
+        <p:nvSpPr>
+          <p:cNvPr id="36" name="TextBox 35">
+            <a:extLst>
+              <a:ext uri="{FF2B5EF4-FFF2-40B4-BE49-F238E27FC236}">
+                <a16:creationId xmlns:a16="http://schemas.microsoft.com/office/drawing/2014/main" id="{18F8C57F-20C3-43C3-9C9B-BF17BC761B35}"/>
+              </a:ext>
+            </a:extLst>
+          </p:cNvPr>
+          <p:cNvSpPr txBox="1"/>
+          <p:nvPr/>
+        </p:nvSpPr>
+        <p:spPr>
+          <a:xfrm>
+            <a:off x="6497093" y="4041815"/>
+            <a:ext cx="1194891" cy="338554"/>
+          </a:xfrm>
+          <a:prstGeom prst="rect">
+            <a:avLst/>
+          </a:prstGeom>
+          <a:noFill/>
+        </p:spPr>
+        <p:txBody>
+          <a:bodyPr wrap="square" rtlCol="0">
+            <a:spAutoFit/>
+          </a:bodyPr>
+          <a:lstStyle/>
+          <a:p>
+            <a:r>
+              <a:rPr lang="en-GB" sz="1600" dirty="0"/>
+              <a:t>Item price</a:t>
+            </a:r>
+          </a:p>
+        </p:txBody>
+      </p:sp>
+      <p:sp>
+        <p:nvSpPr>
+          <p:cNvPr id="37" name="TextBox 36">
+            <a:extLst>
+              <a:ext uri="{FF2B5EF4-FFF2-40B4-BE49-F238E27FC236}">
+                <a16:creationId xmlns:a16="http://schemas.microsoft.com/office/drawing/2014/main" id="{E20F7B34-F09B-FDE0-5B20-B7102ADE21F2}"/>
+              </a:ext>
+            </a:extLst>
+          </p:cNvPr>
+          <p:cNvSpPr txBox="1"/>
+          <p:nvPr/>
+        </p:nvSpPr>
+        <p:spPr>
+          <a:xfrm>
+            <a:off x="8479229" y="3728581"/>
+            <a:ext cx="1262209" cy="338554"/>
+          </a:xfrm>
+          <a:prstGeom prst="rect">
+            <a:avLst/>
+          </a:prstGeom>
+          <a:noFill/>
+        </p:spPr>
+        <p:txBody>
+          <a:bodyPr wrap="square" rtlCol="0">
+            <a:spAutoFit/>
+          </a:bodyPr>
+          <a:lstStyle/>
+          <a:p>
+            <a:r>
+              <a:rPr lang="en-GB" sz="1600" dirty="0"/>
+              <a:t>Item name</a:t>
+            </a:r>
+          </a:p>
+        </p:txBody>
+      </p:sp>
+      <p:sp>
+        <p:nvSpPr>
+          <p:cNvPr id="38" name="TextBox 37">
+            <a:extLst>
+              <a:ext uri="{FF2B5EF4-FFF2-40B4-BE49-F238E27FC236}">
+                <a16:creationId xmlns:a16="http://schemas.microsoft.com/office/drawing/2014/main" id="{92CB4E03-1C60-A10B-085F-B8EF1367B9B6}"/>
+              </a:ext>
+            </a:extLst>
+          </p:cNvPr>
+          <p:cNvSpPr txBox="1"/>
+          <p:nvPr/>
+        </p:nvSpPr>
+        <p:spPr>
+          <a:xfrm>
+            <a:off x="8512887" y="4058626"/>
+            <a:ext cx="1194891" cy="338554"/>
+          </a:xfrm>
+          <a:prstGeom prst="rect">
+            <a:avLst/>
+          </a:prstGeom>
+          <a:noFill/>
+        </p:spPr>
+        <p:txBody>
+          <a:bodyPr wrap="square" rtlCol="0">
+            <a:spAutoFit/>
+          </a:bodyPr>
+          <a:lstStyle/>
+          <a:p>
+            <a:r>
+              <a:rPr lang="en-GB" sz="1600" dirty="0"/>
+              <a:t>Item price</a:t>
+            </a:r>
+          </a:p>
+        </p:txBody>
+      </p:sp>
+      <p:sp>
+        <p:nvSpPr>
+          <p:cNvPr id="39" name="TextBox 38">
+            <a:extLst>
+              <a:ext uri="{FF2B5EF4-FFF2-40B4-BE49-F238E27FC236}">
+                <a16:creationId xmlns:a16="http://schemas.microsoft.com/office/drawing/2014/main" id="{2D2AE9EA-222A-3B9D-5D5B-805C505376BE}"/>
+              </a:ext>
+            </a:extLst>
+          </p:cNvPr>
+          <p:cNvSpPr txBox="1"/>
+          <p:nvPr/>
+        </p:nvSpPr>
+        <p:spPr>
+          <a:xfrm>
+            <a:off x="10481465" y="3728581"/>
+            <a:ext cx="1262209" cy="338554"/>
+          </a:xfrm>
+          <a:prstGeom prst="rect">
+            <a:avLst/>
+          </a:prstGeom>
+          <a:noFill/>
+        </p:spPr>
+        <p:txBody>
+          <a:bodyPr wrap="square" rtlCol="0">
+            <a:spAutoFit/>
+          </a:bodyPr>
+          <a:lstStyle/>
+          <a:p>
+            <a:r>
+              <a:rPr lang="en-GB" sz="1600" dirty="0"/>
+              <a:t>Item name</a:t>
+            </a:r>
+          </a:p>
+        </p:txBody>
+      </p:sp>
+      <p:sp>
+        <p:nvSpPr>
+          <p:cNvPr id="40" name="TextBox 39">
+            <a:extLst>
+              <a:ext uri="{FF2B5EF4-FFF2-40B4-BE49-F238E27FC236}">
+                <a16:creationId xmlns:a16="http://schemas.microsoft.com/office/drawing/2014/main" id="{A3814B34-667E-F8D9-0D1C-EBEB295FE3E5}"/>
+              </a:ext>
+            </a:extLst>
+          </p:cNvPr>
+          <p:cNvSpPr txBox="1"/>
+          <p:nvPr/>
+        </p:nvSpPr>
+        <p:spPr>
+          <a:xfrm>
+            <a:off x="10515123" y="4058626"/>
+            <a:ext cx="1194891" cy="338554"/>
+          </a:xfrm>
+          <a:prstGeom prst="rect">
+            <a:avLst/>
+          </a:prstGeom>
+          <a:noFill/>
+        </p:spPr>
+        <p:txBody>
+          <a:bodyPr wrap="square" rtlCol="0">
+            <a:spAutoFit/>
+          </a:bodyPr>
+          <a:lstStyle/>
+          <a:p>
+            <a:r>
+              <a:rPr lang="en-GB" sz="1600" dirty="0"/>
+              <a:t>Item price</a:t>
+            </a:r>
+          </a:p>
+        </p:txBody>
+      </p:sp>
+      <p:sp>
+        <p:nvSpPr>
+          <p:cNvPr id="64" name="Rectangle 63">
+            <a:extLst>
+              <a:ext uri="{FF2B5EF4-FFF2-40B4-BE49-F238E27FC236}">
+                <a16:creationId xmlns:a16="http://schemas.microsoft.com/office/drawing/2014/main" id="{B0ACB2AE-D212-1FBB-6B77-998DF065EA83}"/>
+              </a:ext>
+            </a:extLst>
+          </p:cNvPr>
+          <p:cNvSpPr/>
+          <p:nvPr/>
+        </p:nvSpPr>
+        <p:spPr>
+          <a:xfrm>
+            <a:off x="79477" y="4412350"/>
+            <a:ext cx="1897991" cy="1752055"/>
+          </a:xfrm>
+          <a:prstGeom prst="rect">
+            <a:avLst/>
+          </a:prstGeom>
+          <a:solidFill>
+            <a:schemeClr val="bg1"/>
+          </a:solidFill>
+        </p:spPr>
+        <p:style>
+          <a:lnRef idx="2">
+            <a:schemeClr val="accent1">
+              <a:shade val="15000"/>
+            </a:schemeClr>
+          </a:lnRef>
+          <a:fillRef idx="1">
+            <a:schemeClr val="accent1"/>
+          </a:fillRef>
+          <a:effectRef idx="0">
+            <a:schemeClr val="accent1"/>
+          </a:effectRef>
+          <a:fontRef idx="minor">
+            <a:schemeClr val="lt1"/>
+          </a:fontRef>
+        </p:style>
+        <p:txBody>
+          <a:bodyPr rtlCol="0" anchor="ctr"/>
+          <a:lstStyle/>
+          <a:p>
+            <a:pPr algn="ctr"/>
+            <a:r>
+              <a:rPr lang="en-GB" dirty="0">
+                <a:ln>
+                  <a:solidFill>
+                    <a:sysClr val="windowText" lastClr="000000"/>
+                  </a:solidFill>
+                </a:ln>
+                <a:solidFill>
+                  <a:sysClr val="windowText" lastClr="000000"/>
+                </a:solidFill>
+              </a:rPr>
+              <a:t>Photo of item</a:t>
+            </a:r>
+          </a:p>
+        </p:txBody>
+      </p:sp>
+      <p:sp>
+        <p:nvSpPr>
+          <p:cNvPr id="65" name="Rectangle 64">
+            <a:extLst>
+              <a:ext uri="{FF2B5EF4-FFF2-40B4-BE49-F238E27FC236}">
+                <a16:creationId xmlns:a16="http://schemas.microsoft.com/office/drawing/2014/main" id="{4ADA7CC9-39CA-C26A-1ECA-41729A8240A0}"/>
+              </a:ext>
+            </a:extLst>
+          </p:cNvPr>
+          <p:cNvSpPr/>
+          <p:nvPr/>
+        </p:nvSpPr>
+        <p:spPr>
+          <a:xfrm>
+            <a:off x="8185678" y="4412353"/>
+            <a:ext cx="1897991" cy="1752055"/>
+          </a:xfrm>
+          <a:prstGeom prst="rect">
+            <a:avLst/>
+          </a:prstGeom>
+          <a:solidFill>
+            <a:schemeClr val="bg1"/>
+          </a:solidFill>
+        </p:spPr>
+        <p:style>
+          <a:lnRef idx="2">
+            <a:schemeClr val="accent1">
+              <a:shade val="15000"/>
+            </a:schemeClr>
+          </a:lnRef>
+          <a:fillRef idx="1">
+            <a:schemeClr val="accent1"/>
+          </a:fillRef>
+          <a:effectRef idx="0">
+            <a:schemeClr val="accent1"/>
+          </a:effectRef>
+          <a:fontRef idx="minor">
+            <a:schemeClr val="lt1"/>
+          </a:fontRef>
+        </p:style>
+        <p:txBody>
+          <a:bodyPr rtlCol="0" anchor="ctr"/>
+          <a:lstStyle/>
+          <a:p>
+            <a:pPr algn="ctr"/>
+            <a:endParaRPr lang="en-GB"/>
+          </a:p>
+        </p:txBody>
+      </p:sp>
+      <p:sp>
+        <p:nvSpPr>
+          <p:cNvPr id="66" name="Rectangle 65">
+            <a:extLst>
+              <a:ext uri="{FF2B5EF4-FFF2-40B4-BE49-F238E27FC236}">
+                <a16:creationId xmlns:a16="http://schemas.microsoft.com/office/drawing/2014/main" id="{12BC1AE2-1330-1794-019C-B4849E8A3526}"/>
+              </a:ext>
+            </a:extLst>
+          </p:cNvPr>
+          <p:cNvSpPr/>
+          <p:nvPr/>
+        </p:nvSpPr>
+        <p:spPr>
+          <a:xfrm>
+            <a:off x="10205214" y="4420535"/>
+            <a:ext cx="1897991" cy="1752055"/>
+          </a:xfrm>
+          <a:prstGeom prst="rect">
+            <a:avLst/>
+          </a:prstGeom>
+          <a:solidFill>
+            <a:schemeClr val="bg1"/>
+          </a:solidFill>
+        </p:spPr>
+        <p:style>
+          <a:lnRef idx="2">
+            <a:schemeClr val="accent1">
+              <a:shade val="15000"/>
+            </a:schemeClr>
+          </a:lnRef>
+          <a:fillRef idx="1">
+            <a:schemeClr val="accent1"/>
+          </a:fillRef>
+          <a:effectRef idx="0">
+            <a:schemeClr val="accent1"/>
+          </a:effectRef>
+          <a:fontRef idx="minor">
+            <a:schemeClr val="lt1"/>
+          </a:fontRef>
+        </p:style>
+        <p:txBody>
+          <a:bodyPr rtlCol="0" anchor="ctr"/>
+          <a:lstStyle/>
+          <a:p>
+            <a:pPr algn="ctr"/>
+            <a:endParaRPr lang="en-GB"/>
+          </a:p>
+        </p:txBody>
+      </p:sp>
+      <p:sp>
+        <p:nvSpPr>
+          <p:cNvPr id="67" name="Rectangle 66">
+            <a:extLst>
+              <a:ext uri="{FF2B5EF4-FFF2-40B4-BE49-F238E27FC236}">
+                <a16:creationId xmlns:a16="http://schemas.microsoft.com/office/drawing/2014/main" id="{D44794BF-4CA8-3C6C-FCAE-1934208626D4}"/>
+              </a:ext>
+            </a:extLst>
+          </p:cNvPr>
+          <p:cNvSpPr/>
+          <p:nvPr/>
+        </p:nvSpPr>
+        <p:spPr>
+          <a:xfrm>
+            <a:off x="6166141" y="4412352"/>
+            <a:ext cx="1897992" cy="1752055"/>
+          </a:xfrm>
+          <a:prstGeom prst="rect">
+            <a:avLst/>
+          </a:prstGeom>
+          <a:solidFill>
+            <a:schemeClr val="bg1"/>
+          </a:solidFill>
+        </p:spPr>
+        <p:style>
+          <a:lnRef idx="2">
+            <a:schemeClr val="accent1">
+              <a:shade val="15000"/>
+            </a:schemeClr>
+          </a:lnRef>
+          <a:fillRef idx="1">
+            <a:schemeClr val="accent1"/>
+          </a:fillRef>
+          <a:effectRef idx="0">
+            <a:schemeClr val="accent1"/>
+          </a:effectRef>
+          <a:fontRef idx="minor">
+            <a:schemeClr val="lt1"/>
+          </a:fontRef>
+        </p:style>
+        <p:txBody>
+          <a:bodyPr rtlCol="0" anchor="ctr"/>
+          <a:lstStyle/>
+          <a:p>
+            <a:pPr algn="ctr"/>
+            <a:endParaRPr lang="en-GB"/>
+          </a:p>
+        </p:txBody>
+      </p:sp>
+      <p:sp>
+        <p:nvSpPr>
+          <p:cNvPr id="68" name="Rectangle 67">
+            <a:extLst>
+              <a:ext uri="{FF2B5EF4-FFF2-40B4-BE49-F238E27FC236}">
+                <a16:creationId xmlns:a16="http://schemas.microsoft.com/office/drawing/2014/main" id="{CDFBC627-CFA6-7AA1-597E-899E1EC42FCD}"/>
+              </a:ext>
+            </a:extLst>
+          </p:cNvPr>
+          <p:cNvSpPr/>
+          <p:nvPr/>
+        </p:nvSpPr>
+        <p:spPr>
+          <a:xfrm>
+            <a:off x="4159686" y="4420535"/>
+            <a:ext cx="1897991" cy="1752055"/>
+          </a:xfrm>
+          <a:prstGeom prst="rect">
+            <a:avLst/>
+          </a:prstGeom>
+          <a:solidFill>
+            <a:schemeClr val="bg1"/>
+          </a:solidFill>
+        </p:spPr>
+        <p:style>
+          <a:lnRef idx="2">
+            <a:schemeClr val="accent1">
+              <a:shade val="15000"/>
+            </a:schemeClr>
+          </a:lnRef>
+          <a:fillRef idx="1">
+            <a:schemeClr val="accent1"/>
+          </a:fillRef>
+          <a:effectRef idx="0">
+            <a:schemeClr val="accent1"/>
+          </a:effectRef>
+          <a:fontRef idx="minor">
+            <a:schemeClr val="lt1"/>
+          </a:fontRef>
+        </p:style>
+        <p:txBody>
+          <a:bodyPr rtlCol="0" anchor="ctr"/>
+          <a:lstStyle/>
+          <a:p>
+            <a:pPr algn="ctr"/>
+            <a:endParaRPr lang="en-GB"/>
+          </a:p>
+        </p:txBody>
+      </p:sp>
+      <p:sp>
+        <p:nvSpPr>
+          <p:cNvPr id="69" name="Rectangle 68">
+            <a:extLst>
+              <a:ext uri="{FF2B5EF4-FFF2-40B4-BE49-F238E27FC236}">
+                <a16:creationId xmlns:a16="http://schemas.microsoft.com/office/drawing/2014/main" id="{D5D5D520-6873-97F6-F0AF-C90B778929AA}"/>
+              </a:ext>
+            </a:extLst>
+          </p:cNvPr>
+          <p:cNvSpPr/>
+          <p:nvPr/>
+        </p:nvSpPr>
+        <p:spPr>
+          <a:xfrm>
+            <a:off x="2108365" y="4412351"/>
+            <a:ext cx="1897991" cy="1752055"/>
+          </a:xfrm>
+          <a:prstGeom prst="rect">
+            <a:avLst/>
+          </a:prstGeom>
+          <a:solidFill>
+            <a:schemeClr val="bg1"/>
+          </a:solidFill>
+        </p:spPr>
+        <p:style>
+          <a:lnRef idx="2">
+            <a:schemeClr val="accent1">
+              <a:shade val="15000"/>
+            </a:schemeClr>
+          </a:lnRef>
+          <a:fillRef idx="1">
+            <a:schemeClr val="accent1"/>
+          </a:fillRef>
+          <a:effectRef idx="0">
+            <a:schemeClr val="accent1"/>
+          </a:effectRef>
+          <a:fontRef idx="minor">
+            <a:schemeClr val="lt1"/>
+          </a:fontRef>
+        </p:style>
+        <p:txBody>
+          <a:bodyPr rtlCol="0" anchor="ctr"/>
+          <a:lstStyle/>
+          <a:p>
+            <a:pPr algn="ctr"/>
+            <a:endParaRPr lang="en-GB"/>
+          </a:p>
+        </p:txBody>
+      </p:sp>
+      <p:sp>
+        <p:nvSpPr>
+          <p:cNvPr id="70" name="Rectangle 69">
+            <a:extLst>
+              <a:ext uri="{FF2B5EF4-FFF2-40B4-BE49-F238E27FC236}">
+                <a16:creationId xmlns:a16="http://schemas.microsoft.com/office/drawing/2014/main" id="{9CA02AE4-830D-14A7-22A6-FB868BF4D917}"/>
+              </a:ext>
+            </a:extLst>
+          </p:cNvPr>
+          <p:cNvSpPr/>
+          <p:nvPr/>
+        </p:nvSpPr>
+        <p:spPr>
+          <a:xfrm>
+            <a:off x="2108365" y="4412349"/>
+            <a:ext cx="1897991" cy="1752055"/>
+          </a:xfrm>
+          <a:prstGeom prst="rect">
+            <a:avLst/>
+          </a:prstGeom>
+          <a:solidFill>
+            <a:schemeClr val="bg1"/>
+          </a:solidFill>
+        </p:spPr>
+        <p:style>
+          <a:lnRef idx="2">
+            <a:schemeClr val="accent1">
+              <a:shade val="15000"/>
+            </a:schemeClr>
+          </a:lnRef>
+          <a:fillRef idx="1">
+            <a:schemeClr val="accent1"/>
+          </a:fillRef>
+          <a:effectRef idx="0">
+            <a:schemeClr val="accent1"/>
+          </a:effectRef>
+          <a:fontRef idx="minor">
+            <a:schemeClr val="lt1"/>
+          </a:fontRef>
+        </p:style>
+        <p:txBody>
+          <a:bodyPr rtlCol="0" anchor="ctr"/>
+          <a:lstStyle/>
+          <a:p>
+            <a:pPr algn="ctr"/>
+            <a:r>
+              <a:rPr lang="en-GB" dirty="0">
+                <a:ln>
+                  <a:solidFill>
+                    <a:sysClr val="windowText" lastClr="000000"/>
+                  </a:solidFill>
+                </a:ln>
+                <a:solidFill>
+                  <a:sysClr val="windowText" lastClr="000000"/>
+                </a:solidFill>
+              </a:rPr>
+              <a:t>Photo of item</a:t>
+            </a:r>
+          </a:p>
+        </p:txBody>
+      </p:sp>
+      <p:sp>
+        <p:nvSpPr>
+          <p:cNvPr id="71" name="Rectangle 70">
+            <a:extLst>
+              <a:ext uri="{FF2B5EF4-FFF2-40B4-BE49-F238E27FC236}">
+                <a16:creationId xmlns:a16="http://schemas.microsoft.com/office/drawing/2014/main" id="{77FEC63D-BEF9-9F3A-17FC-DB76581F5783}"/>
+              </a:ext>
+            </a:extLst>
+          </p:cNvPr>
+          <p:cNvSpPr/>
+          <p:nvPr/>
+        </p:nvSpPr>
+        <p:spPr>
+          <a:xfrm>
+            <a:off x="4159685" y="4420535"/>
+            <a:ext cx="1897991" cy="1752055"/>
+          </a:xfrm>
+          <a:prstGeom prst="rect">
+            <a:avLst/>
+          </a:prstGeom>
+          <a:solidFill>
+            <a:schemeClr val="bg1"/>
+          </a:solidFill>
+        </p:spPr>
+        <p:style>
+          <a:lnRef idx="2">
+            <a:schemeClr val="accent1">
+              <a:shade val="15000"/>
+            </a:schemeClr>
+          </a:lnRef>
+          <a:fillRef idx="1">
+            <a:schemeClr val="accent1"/>
+          </a:fillRef>
+          <a:effectRef idx="0">
+            <a:schemeClr val="accent1"/>
+          </a:effectRef>
+          <a:fontRef idx="minor">
+            <a:schemeClr val="lt1"/>
+          </a:fontRef>
+        </p:style>
+        <p:txBody>
+          <a:bodyPr rtlCol="0" anchor="ctr"/>
+          <a:lstStyle/>
+          <a:p>
+            <a:pPr algn="ctr"/>
+            <a:r>
+              <a:rPr lang="en-GB" dirty="0">
+                <a:ln>
+                  <a:solidFill>
+                    <a:sysClr val="windowText" lastClr="000000"/>
+                  </a:solidFill>
+                </a:ln>
+                <a:solidFill>
+                  <a:sysClr val="windowText" lastClr="000000"/>
+                </a:solidFill>
+              </a:rPr>
+              <a:t>Photo of item</a:t>
+            </a:r>
+          </a:p>
+        </p:txBody>
+      </p:sp>
+      <p:sp>
+        <p:nvSpPr>
+          <p:cNvPr id="72" name="Rectangle 71">
+            <a:extLst>
+              <a:ext uri="{FF2B5EF4-FFF2-40B4-BE49-F238E27FC236}">
+                <a16:creationId xmlns:a16="http://schemas.microsoft.com/office/drawing/2014/main" id="{55A5D57A-A3F9-F1B0-AA96-DB7F840631AC}"/>
+              </a:ext>
+            </a:extLst>
+          </p:cNvPr>
+          <p:cNvSpPr/>
+          <p:nvPr/>
+        </p:nvSpPr>
+        <p:spPr>
+          <a:xfrm>
+            <a:off x="6166142" y="4412348"/>
+            <a:ext cx="1897991" cy="1752055"/>
+          </a:xfrm>
+          <a:prstGeom prst="rect">
+            <a:avLst/>
+          </a:prstGeom>
+          <a:solidFill>
+            <a:schemeClr val="bg1"/>
+          </a:solidFill>
+        </p:spPr>
+        <p:style>
+          <a:lnRef idx="2">
+            <a:schemeClr val="accent1">
+              <a:shade val="15000"/>
+            </a:schemeClr>
+          </a:lnRef>
+          <a:fillRef idx="1">
+            <a:schemeClr val="accent1"/>
+          </a:fillRef>
+          <a:effectRef idx="0">
+            <a:schemeClr val="accent1"/>
+          </a:effectRef>
+          <a:fontRef idx="minor">
+            <a:schemeClr val="lt1"/>
+          </a:fontRef>
+        </p:style>
+        <p:txBody>
+          <a:bodyPr rtlCol="0" anchor="ctr"/>
+          <a:lstStyle/>
+          <a:p>
+            <a:pPr algn="ctr"/>
+            <a:r>
+              <a:rPr lang="en-GB" dirty="0">
+                <a:ln>
+                  <a:solidFill>
+                    <a:sysClr val="windowText" lastClr="000000"/>
+                  </a:solidFill>
+                </a:ln>
+                <a:solidFill>
+                  <a:sysClr val="windowText" lastClr="000000"/>
+                </a:solidFill>
+              </a:rPr>
+              <a:t>Photo of item</a:t>
+            </a:r>
+          </a:p>
+        </p:txBody>
+      </p:sp>
+      <p:sp>
+        <p:nvSpPr>
+          <p:cNvPr id="73" name="Rectangle 72">
+            <a:extLst>
+              <a:ext uri="{FF2B5EF4-FFF2-40B4-BE49-F238E27FC236}">
+                <a16:creationId xmlns:a16="http://schemas.microsoft.com/office/drawing/2014/main" id="{0AAE6EEA-9408-9AE3-7038-F1F389958201}"/>
+              </a:ext>
+            </a:extLst>
+          </p:cNvPr>
+          <p:cNvSpPr/>
+          <p:nvPr/>
+        </p:nvSpPr>
+        <p:spPr>
+          <a:xfrm>
+            <a:off x="8186598" y="4412347"/>
+            <a:ext cx="1897991" cy="1752055"/>
+          </a:xfrm>
+          <a:prstGeom prst="rect">
+            <a:avLst/>
+          </a:prstGeom>
+          <a:solidFill>
+            <a:schemeClr val="bg1"/>
+          </a:solidFill>
+        </p:spPr>
+        <p:style>
+          <a:lnRef idx="2">
+            <a:schemeClr val="accent1">
+              <a:shade val="15000"/>
+            </a:schemeClr>
+          </a:lnRef>
+          <a:fillRef idx="1">
+            <a:schemeClr val="accent1"/>
+          </a:fillRef>
+          <a:effectRef idx="0">
+            <a:schemeClr val="accent1"/>
+          </a:effectRef>
+          <a:fontRef idx="minor">
+            <a:schemeClr val="lt1"/>
+          </a:fontRef>
+        </p:style>
+        <p:txBody>
+          <a:bodyPr rtlCol="0" anchor="ctr"/>
+          <a:lstStyle/>
+          <a:p>
+            <a:pPr algn="ctr"/>
+            <a:r>
+              <a:rPr lang="en-GB" dirty="0">
+                <a:ln>
+                  <a:solidFill>
+                    <a:sysClr val="windowText" lastClr="000000"/>
+                  </a:solidFill>
+                </a:ln>
+                <a:solidFill>
+                  <a:sysClr val="windowText" lastClr="000000"/>
+                </a:solidFill>
+              </a:rPr>
+              <a:t>Photo of item</a:t>
+            </a:r>
+          </a:p>
+        </p:txBody>
+      </p:sp>
+      <p:sp>
+        <p:nvSpPr>
+          <p:cNvPr id="74" name="Rectangle 73">
+            <a:extLst>
+              <a:ext uri="{FF2B5EF4-FFF2-40B4-BE49-F238E27FC236}">
+                <a16:creationId xmlns:a16="http://schemas.microsoft.com/office/drawing/2014/main" id="{BB4C9EDB-90AF-D9E1-17C6-2BAAED27EF2A}"/>
+              </a:ext>
+            </a:extLst>
+          </p:cNvPr>
+          <p:cNvSpPr/>
+          <p:nvPr/>
+        </p:nvSpPr>
+        <p:spPr>
+          <a:xfrm>
+            <a:off x="10204294" y="4420535"/>
+            <a:ext cx="1897991" cy="1752055"/>
+          </a:xfrm>
+          <a:prstGeom prst="rect">
+            <a:avLst/>
+          </a:prstGeom>
+          <a:solidFill>
+            <a:schemeClr val="bg1"/>
+          </a:solidFill>
+        </p:spPr>
+        <p:style>
+          <a:lnRef idx="2">
+            <a:schemeClr val="accent1">
+              <a:shade val="15000"/>
+            </a:schemeClr>
+          </a:lnRef>
+          <a:fillRef idx="1">
+            <a:schemeClr val="accent1"/>
+          </a:fillRef>
+          <a:effectRef idx="0">
+            <a:schemeClr val="accent1"/>
+          </a:effectRef>
+          <a:fontRef idx="minor">
+            <a:schemeClr val="lt1"/>
+          </a:fontRef>
+        </p:style>
+        <p:txBody>
+          <a:bodyPr rtlCol="0" anchor="ctr"/>
+          <a:lstStyle/>
+          <a:p>
+            <a:pPr algn="ctr"/>
+            <a:r>
+              <a:rPr lang="en-GB" dirty="0">
+                <a:ln>
+                  <a:solidFill>
+                    <a:sysClr val="windowText" lastClr="000000"/>
+                  </a:solidFill>
+                </a:ln>
+                <a:solidFill>
+                  <a:sysClr val="windowText" lastClr="000000"/>
+                </a:solidFill>
+              </a:rPr>
+              <a:t>Photo of item</a:t>
+            </a:r>
+          </a:p>
+        </p:txBody>
+      </p:sp>
+      <p:sp>
+        <p:nvSpPr>
+          <p:cNvPr id="75" name="TextBox 74">
+            <a:extLst>
+              <a:ext uri="{FF2B5EF4-FFF2-40B4-BE49-F238E27FC236}">
+                <a16:creationId xmlns:a16="http://schemas.microsoft.com/office/drawing/2014/main" id="{178DD858-5906-BC4F-5014-6347307636A8}"/>
+              </a:ext>
+            </a:extLst>
+          </p:cNvPr>
+          <p:cNvSpPr txBox="1"/>
+          <p:nvPr/>
+        </p:nvSpPr>
+        <p:spPr>
+          <a:xfrm>
+            <a:off x="359979" y="6189401"/>
+            <a:ext cx="1262209" cy="338554"/>
+          </a:xfrm>
+          <a:prstGeom prst="rect">
+            <a:avLst/>
+          </a:prstGeom>
+          <a:noFill/>
+        </p:spPr>
+        <p:txBody>
+          <a:bodyPr wrap="square" rtlCol="0">
+            <a:spAutoFit/>
+          </a:bodyPr>
+          <a:lstStyle/>
+          <a:p>
+            <a:r>
+              <a:rPr lang="en-GB" sz="1600" dirty="0"/>
+              <a:t>Item name</a:t>
+            </a:r>
+          </a:p>
+        </p:txBody>
+      </p:sp>
+      <p:sp>
+        <p:nvSpPr>
+          <p:cNvPr id="76" name="TextBox 75">
+            <a:extLst>
+              <a:ext uri="{FF2B5EF4-FFF2-40B4-BE49-F238E27FC236}">
+                <a16:creationId xmlns:a16="http://schemas.microsoft.com/office/drawing/2014/main" id="{9A435591-EB4C-75F4-E2F2-83B614CB6A06}"/>
+              </a:ext>
+            </a:extLst>
+          </p:cNvPr>
+          <p:cNvSpPr txBox="1"/>
+          <p:nvPr/>
+        </p:nvSpPr>
+        <p:spPr>
+          <a:xfrm>
+            <a:off x="393637" y="6502635"/>
+            <a:ext cx="1194891" cy="338554"/>
+          </a:xfrm>
+          <a:prstGeom prst="rect">
+            <a:avLst/>
+          </a:prstGeom>
+          <a:noFill/>
+        </p:spPr>
+        <p:txBody>
+          <a:bodyPr wrap="square" rtlCol="0">
+            <a:spAutoFit/>
+          </a:bodyPr>
+          <a:lstStyle/>
+          <a:p>
+            <a:r>
+              <a:rPr lang="en-GB" sz="1600" dirty="0"/>
+              <a:t>Item price</a:t>
+            </a:r>
+          </a:p>
+        </p:txBody>
+      </p:sp>
+      <p:sp>
+        <p:nvSpPr>
+          <p:cNvPr id="77" name="TextBox 76">
+            <a:extLst>
+              <a:ext uri="{FF2B5EF4-FFF2-40B4-BE49-F238E27FC236}">
+                <a16:creationId xmlns:a16="http://schemas.microsoft.com/office/drawing/2014/main" id="{FCCB69BB-8A22-57CB-334C-A94262ECB933}"/>
+              </a:ext>
+            </a:extLst>
+          </p:cNvPr>
+          <p:cNvSpPr txBox="1"/>
+          <p:nvPr/>
+        </p:nvSpPr>
+        <p:spPr>
+          <a:xfrm>
+            <a:off x="2464595" y="6172590"/>
+            <a:ext cx="1262209" cy="338554"/>
+          </a:xfrm>
+          <a:prstGeom prst="rect">
+            <a:avLst/>
+          </a:prstGeom>
+          <a:noFill/>
+        </p:spPr>
+        <p:txBody>
+          <a:bodyPr wrap="square" rtlCol="0">
+            <a:spAutoFit/>
+          </a:bodyPr>
+          <a:lstStyle/>
+          <a:p>
+            <a:r>
+              <a:rPr lang="en-GB" sz="1600" dirty="0"/>
+              <a:t>Item name</a:t>
+            </a:r>
+          </a:p>
+        </p:txBody>
+      </p:sp>
+      <p:sp>
+        <p:nvSpPr>
+          <p:cNvPr id="78" name="TextBox 77">
+            <a:extLst>
+              <a:ext uri="{FF2B5EF4-FFF2-40B4-BE49-F238E27FC236}">
+                <a16:creationId xmlns:a16="http://schemas.microsoft.com/office/drawing/2014/main" id="{7C03F766-F93D-8199-5922-8BE454B55E9B}"/>
+              </a:ext>
+            </a:extLst>
+          </p:cNvPr>
+          <p:cNvSpPr txBox="1"/>
+          <p:nvPr/>
+        </p:nvSpPr>
+        <p:spPr>
+          <a:xfrm>
+            <a:off x="2498253" y="6502635"/>
+            <a:ext cx="1194891" cy="338554"/>
+          </a:xfrm>
+          <a:prstGeom prst="rect">
+            <a:avLst/>
+          </a:prstGeom>
+          <a:noFill/>
+        </p:spPr>
+        <p:txBody>
+          <a:bodyPr wrap="square" rtlCol="0">
+            <a:spAutoFit/>
+          </a:bodyPr>
+          <a:lstStyle/>
+          <a:p>
+            <a:r>
+              <a:rPr lang="en-GB" sz="1600" dirty="0"/>
+              <a:t>Item price</a:t>
+            </a:r>
+          </a:p>
+        </p:txBody>
+      </p:sp>
+      <p:sp>
+        <p:nvSpPr>
+          <p:cNvPr id="79" name="TextBox 78">
+            <a:extLst>
+              <a:ext uri="{FF2B5EF4-FFF2-40B4-BE49-F238E27FC236}">
+                <a16:creationId xmlns:a16="http://schemas.microsoft.com/office/drawing/2014/main" id="{143C883A-84FE-9267-8150-0963529039E0}"/>
+              </a:ext>
+            </a:extLst>
+          </p:cNvPr>
+          <p:cNvSpPr txBox="1"/>
+          <p:nvPr/>
+        </p:nvSpPr>
+        <p:spPr>
+          <a:xfrm>
+            <a:off x="4496284" y="6189401"/>
+            <a:ext cx="1262209" cy="338554"/>
+          </a:xfrm>
+          <a:prstGeom prst="rect">
+            <a:avLst/>
+          </a:prstGeom>
+          <a:noFill/>
+        </p:spPr>
+        <p:txBody>
+          <a:bodyPr wrap="square" rtlCol="0">
+            <a:spAutoFit/>
+          </a:bodyPr>
+          <a:lstStyle/>
+          <a:p>
+            <a:r>
+              <a:rPr lang="en-GB" sz="1600" dirty="0"/>
+              <a:t>Item name</a:t>
+            </a:r>
+          </a:p>
+        </p:txBody>
+      </p:sp>
+      <p:sp>
+        <p:nvSpPr>
+          <p:cNvPr id="80" name="TextBox 79">
+            <a:extLst>
+              <a:ext uri="{FF2B5EF4-FFF2-40B4-BE49-F238E27FC236}">
+                <a16:creationId xmlns:a16="http://schemas.microsoft.com/office/drawing/2014/main" id="{D919516C-727F-212B-04FC-B67565D2544C}"/>
+              </a:ext>
+            </a:extLst>
+          </p:cNvPr>
+          <p:cNvSpPr txBox="1"/>
+          <p:nvPr/>
+        </p:nvSpPr>
+        <p:spPr>
+          <a:xfrm>
+            <a:off x="4529942" y="6519446"/>
+            <a:ext cx="1194891" cy="338554"/>
+          </a:xfrm>
+          <a:prstGeom prst="rect">
+            <a:avLst/>
+          </a:prstGeom>
+          <a:noFill/>
+        </p:spPr>
+        <p:txBody>
+          <a:bodyPr wrap="square" rtlCol="0">
+            <a:spAutoFit/>
+          </a:bodyPr>
+          <a:lstStyle/>
+          <a:p>
+            <a:r>
+              <a:rPr lang="en-GB" sz="1600" dirty="0"/>
+              <a:t>Item price</a:t>
+            </a:r>
+          </a:p>
+        </p:txBody>
+      </p:sp>
+      <p:sp>
+        <p:nvSpPr>
+          <p:cNvPr id="81" name="TextBox 80">
+            <a:extLst>
+              <a:ext uri="{FF2B5EF4-FFF2-40B4-BE49-F238E27FC236}">
+                <a16:creationId xmlns:a16="http://schemas.microsoft.com/office/drawing/2014/main" id="{B1B51CDD-7485-B0E6-386A-6DC6B6B8E5FF}"/>
+              </a:ext>
+            </a:extLst>
+          </p:cNvPr>
+          <p:cNvSpPr txBox="1"/>
+          <p:nvPr/>
+        </p:nvSpPr>
+        <p:spPr>
+          <a:xfrm>
+            <a:off x="6494315" y="6172590"/>
+            <a:ext cx="1262209" cy="338554"/>
+          </a:xfrm>
+          <a:prstGeom prst="rect">
+            <a:avLst/>
+          </a:prstGeom>
+          <a:noFill/>
+        </p:spPr>
+        <p:txBody>
+          <a:bodyPr wrap="square" rtlCol="0">
+            <a:spAutoFit/>
+          </a:bodyPr>
+          <a:lstStyle/>
+          <a:p>
+            <a:r>
+              <a:rPr lang="en-GB" sz="1600" dirty="0"/>
+              <a:t>Item name</a:t>
+            </a:r>
+          </a:p>
+        </p:txBody>
+      </p:sp>
+      <p:sp>
+        <p:nvSpPr>
+          <p:cNvPr id="82" name="TextBox 81">
+            <a:extLst>
+              <a:ext uri="{FF2B5EF4-FFF2-40B4-BE49-F238E27FC236}">
+                <a16:creationId xmlns:a16="http://schemas.microsoft.com/office/drawing/2014/main" id="{BF055A69-8ACE-C4C3-6EE3-9BBA1C9C70DD}"/>
+              </a:ext>
+            </a:extLst>
+          </p:cNvPr>
+          <p:cNvSpPr txBox="1"/>
+          <p:nvPr/>
+        </p:nvSpPr>
+        <p:spPr>
+          <a:xfrm>
+            <a:off x="6527973" y="6502635"/>
+            <a:ext cx="1194891" cy="338554"/>
+          </a:xfrm>
+          <a:prstGeom prst="rect">
+            <a:avLst/>
+          </a:prstGeom>
+          <a:noFill/>
+        </p:spPr>
+        <p:txBody>
+          <a:bodyPr wrap="square" rtlCol="0">
+            <a:spAutoFit/>
+          </a:bodyPr>
+          <a:lstStyle/>
+          <a:p>
+            <a:r>
+              <a:rPr lang="en-GB" sz="1600" dirty="0"/>
+              <a:t>Item price</a:t>
+            </a:r>
+          </a:p>
+        </p:txBody>
+      </p:sp>
+      <p:sp>
+        <p:nvSpPr>
+          <p:cNvPr id="83" name="TextBox 82">
+            <a:extLst>
+              <a:ext uri="{FF2B5EF4-FFF2-40B4-BE49-F238E27FC236}">
+                <a16:creationId xmlns:a16="http://schemas.microsoft.com/office/drawing/2014/main" id="{8FC6A2D6-717D-25DF-B58F-B950BE310B36}"/>
+              </a:ext>
+            </a:extLst>
+          </p:cNvPr>
+          <p:cNvSpPr txBox="1"/>
+          <p:nvPr/>
+        </p:nvSpPr>
+        <p:spPr>
+          <a:xfrm>
+            <a:off x="8510109" y="6189401"/>
+            <a:ext cx="1262209" cy="338554"/>
+          </a:xfrm>
+          <a:prstGeom prst="rect">
+            <a:avLst/>
+          </a:prstGeom>
+          <a:noFill/>
+        </p:spPr>
+        <p:txBody>
+          <a:bodyPr wrap="square" rtlCol="0">
+            <a:spAutoFit/>
+          </a:bodyPr>
+          <a:lstStyle/>
+          <a:p>
+            <a:r>
+              <a:rPr lang="en-GB" sz="1600" dirty="0"/>
+              <a:t>Item name</a:t>
+            </a:r>
+          </a:p>
+        </p:txBody>
+      </p:sp>
+      <p:sp>
+        <p:nvSpPr>
+          <p:cNvPr id="84" name="TextBox 83">
+            <a:extLst>
+              <a:ext uri="{FF2B5EF4-FFF2-40B4-BE49-F238E27FC236}">
+                <a16:creationId xmlns:a16="http://schemas.microsoft.com/office/drawing/2014/main" id="{287AF01A-E467-FF6F-CDB2-7B5804BEC6C9}"/>
+              </a:ext>
+            </a:extLst>
+          </p:cNvPr>
+          <p:cNvSpPr txBox="1"/>
+          <p:nvPr/>
+        </p:nvSpPr>
+        <p:spPr>
+          <a:xfrm>
+            <a:off x="8543767" y="6519446"/>
+            <a:ext cx="1194891" cy="338554"/>
+          </a:xfrm>
+          <a:prstGeom prst="rect">
+            <a:avLst/>
+          </a:prstGeom>
+          <a:noFill/>
+        </p:spPr>
+        <p:txBody>
+          <a:bodyPr wrap="square" rtlCol="0">
+            <a:spAutoFit/>
+          </a:bodyPr>
+          <a:lstStyle/>
+          <a:p>
+            <a:r>
+              <a:rPr lang="en-GB" sz="1600" dirty="0"/>
+              <a:t>Item price</a:t>
+            </a:r>
+          </a:p>
+        </p:txBody>
+      </p:sp>
+      <p:sp>
+        <p:nvSpPr>
+          <p:cNvPr id="85" name="TextBox 84">
+            <a:extLst>
+              <a:ext uri="{FF2B5EF4-FFF2-40B4-BE49-F238E27FC236}">
+                <a16:creationId xmlns:a16="http://schemas.microsoft.com/office/drawing/2014/main" id="{DE7A0DC4-9FE0-27D0-E12D-29CF9C834672}"/>
+              </a:ext>
+            </a:extLst>
+          </p:cNvPr>
+          <p:cNvSpPr txBox="1"/>
+          <p:nvPr/>
+        </p:nvSpPr>
+        <p:spPr>
+          <a:xfrm>
+            <a:off x="10512345" y="6189401"/>
+            <a:ext cx="1262209" cy="338554"/>
+          </a:xfrm>
+          <a:prstGeom prst="rect">
+            <a:avLst/>
+          </a:prstGeom>
+          <a:noFill/>
+        </p:spPr>
+        <p:txBody>
+          <a:bodyPr wrap="square" rtlCol="0">
+            <a:spAutoFit/>
+          </a:bodyPr>
+          <a:lstStyle/>
+          <a:p>
+            <a:r>
+              <a:rPr lang="en-GB" sz="1600" dirty="0"/>
+              <a:t>Item name</a:t>
+            </a:r>
+          </a:p>
+        </p:txBody>
+      </p:sp>
+      <p:sp>
+        <p:nvSpPr>
+          <p:cNvPr id="86" name="TextBox 85">
+            <a:extLst>
+              <a:ext uri="{FF2B5EF4-FFF2-40B4-BE49-F238E27FC236}">
+                <a16:creationId xmlns:a16="http://schemas.microsoft.com/office/drawing/2014/main" id="{F75009E9-7920-F606-B56A-729AD14AB744}"/>
+              </a:ext>
+            </a:extLst>
+          </p:cNvPr>
+          <p:cNvSpPr txBox="1"/>
+          <p:nvPr/>
+        </p:nvSpPr>
+        <p:spPr>
+          <a:xfrm>
+            <a:off x="10546003" y="6519446"/>
+            <a:ext cx="1194891" cy="338554"/>
+          </a:xfrm>
+          <a:prstGeom prst="rect">
+            <a:avLst/>
+          </a:prstGeom>
+          <a:noFill/>
+        </p:spPr>
+        <p:txBody>
+          <a:bodyPr wrap="square" rtlCol="0">
+            <a:spAutoFit/>
+          </a:bodyPr>
+          <a:lstStyle/>
+          <a:p>
+            <a:r>
+              <a:rPr lang="en-GB" sz="1600" dirty="0"/>
+              <a:t>Item price</a:t>
+            </a:r>
+          </a:p>
+        </p:txBody>
+      </p:sp>
+      <p:sp>
+        <p:nvSpPr>
+          <p:cNvPr id="88" name="TextBox 87">
+            <a:extLst>
+              <a:ext uri="{FF2B5EF4-FFF2-40B4-BE49-F238E27FC236}">
+                <a16:creationId xmlns:a16="http://schemas.microsoft.com/office/drawing/2014/main" id="{E4A56AAA-1506-4F4B-F36C-37FB3894B4AA}"/>
+              </a:ext>
+            </a:extLst>
+          </p:cNvPr>
+          <p:cNvSpPr txBox="1"/>
+          <p:nvPr/>
+        </p:nvSpPr>
+        <p:spPr>
+          <a:xfrm>
+            <a:off x="11025200" y="1264077"/>
+            <a:ext cx="1046205" cy="369332"/>
+          </a:xfrm>
+          <a:prstGeom prst="rect">
+            <a:avLst/>
+          </a:prstGeom>
+          <a:noFill/>
+          <a:ln>
+            <a:solidFill>
+              <a:schemeClr val="accent1"/>
+            </a:solidFill>
+          </a:ln>
+        </p:spPr>
+        <p:txBody>
+          <a:bodyPr wrap="square" rtlCol="0">
+            <a:spAutoFit/>
+          </a:bodyPr>
           <a:lstStyle/>
           <a:p>
             <a:r>
               <a:rPr lang="en-GB" dirty="0"/>
-              <a:t>Online Shop (detailed view of item)</a:t>
-            </a:r>
+              <a:t>Filter</a:t>
+            </a:r>
+          </a:p>
+        </p:txBody>
+      </p:sp>
+      <p:sp>
+        <p:nvSpPr>
+          <p:cNvPr id="89" name="Isosceles Triangle 88">
+            <a:extLst>
+              <a:ext uri="{FF2B5EF4-FFF2-40B4-BE49-F238E27FC236}">
+                <a16:creationId xmlns:a16="http://schemas.microsoft.com/office/drawing/2014/main" id="{41D8A267-4210-3D04-04D9-B8BF8D4A63FD}"/>
+              </a:ext>
+            </a:extLst>
+          </p:cNvPr>
+          <p:cNvSpPr/>
+          <p:nvPr/>
+        </p:nvSpPr>
+        <p:spPr>
+          <a:xfrm rot="10800000">
+            <a:off x="11739948" y="1378142"/>
+            <a:ext cx="185602" cy="158694"/>
+          </a:xfrm>
+          <a:prstGeom prst="triangle">
+            <a:avLst/>
+          </a:prstGeom>
+          <a:solidFill>
+            <a:schemeClr val="tx1"/>
+          </a:solidFill>
+          <a:ln>
+            <a:solidFill>
+              <a:schemeClr val="tx1"/>
+            </a:solidFill>
+          </a:ln>
+        </p:spPr>
+        <p:style>
+          <a:lnRef idx="2">
+            <a:schemeClr val="accent1">
+              <a:shade val="15000"/>
+            </a:schemeClr>
+          </a:lnRef>
+          <a:fillRef idx="1">
+            <a:schemeClr val="accent1"/>
+          </a:fillRef>
+          <a:effectRef idx="0">
+            <a:schemeClr val="accent1"/>
+          </a:effectRef>
+          <a:fontRef idx="minor">
+            <a:schemeClr val="lt1"/>
+          </a:fontRef>
+        </p:style>
+        <p:txBody>
+          <a:bodyPr rtlCol="0" anchor="ctr"/>
+          <a:lstStyle/>
+          <a:p>
+            <a:pPr algn="ctr"/>
+            <a:endParaRPr lang="en-GB"/>
           </a:p>
         </p:txBody>
       </p:sp>
     </p:spTree>
     <p:extLst>
       <p:ext uri="{BB962C8B-B14F-4D97-AF65-F5344CB8AC3E}">
-        <p14:creationId xmlns:p14="http://schemas.microsoft.com/office/powerpoint/2010/main" val="946820477"/>
+        <p14:creationId xmlns:p14="http://schemas.microsoft.com/office/powerpoint/2010/main" val="3504322548"/>
       </p:ext>
     </p:extLst>
   </p:cSld>
@@ -11031,7 +13752,7 @@
           <a:p>
             <a:r>
               <a:rPr lang="en-GB" dirty="0"/>
-              <a:t>Add users</a:t>
+              <a:t>Online Shop (detailed view of item)</a:t>
             </a:r>
           </a:p>
         </p:txBody>
@@ -11039,7 +13760,7 @@
     </p:spTree>
     <p:extLst>
       <p:ext uri="{BB962C8B-B14F-4D97-AF65-F5344CB8AC3E}">
-        <p14:creationId xmlns:p14="http://schemas.microsoft.com/office/powerpoint/2010/main" val="1398335402"/>
+        <p14:creationId xmlns:p14="http://schemas.microsoft.com/office/powerpoint/2010/main" val="946820477"/>
       </p:ext>
     </p:extLst>
   </p:cSld>
@@ -11089,7 +13810,7 @@
           <a:p>
             <a:r>
               <a:rPr lang="en-GB" dirty="0"/>
-              <a:t>Checkout system (barcode)</a:t>
+              <a:t>Add users</a:t>
             </a:r>
           </a:p>
         </p:txBody>
@@ -11097,7 +13818,7 @@
     </p:spTree>
     <p:extLst>
       <p:ext uri="{BB962C8B-B14F-4D97-AF65-F5344CB8AC3E}">
-        <p14:creationId xmlns:p14="http://schemas.microsoft.com/office/powerpoint/2010/main" val="560281624"/>
+        <p14:creationId xmlns:p14="http://schemas.microsoft.com/office/powerpoint/2010/main" val="1398335402"/>
       </p:ext>
     </p:extLst>
   </p:cSld>
@@ -11126,693 +13847,28 @@
       </p:grpSpPr>
       <p:sp>
         <p:nvSpPr>
-          <p:cNvPr id="4" name="Rectangle 3">
-            <a:extLst>
-              <a:ext uri="{FF2B5EF4-FFF2-40B4-BE49-F238E27FC236}">
-                <a16:creationId xmlns:a16="http://schemas.microsoft.com/office/drawing/2014/main" id="{9DF92B7C-3248-8476-5639-82C1CDFBFA0C}"/>
-              </a:ext>
-            </a:extLst>
-          </p:cNvPr>
-          <p:cNvSpPr/>
-          <p:nvPr/>
-        </p:nvSpPr>
-        <p:spPr>
-          <a:xfrm>
-            <a:off x="0" y="0"/>
-            <a:ext cx="12192000" cy="1060255"/>
-          </a:xfrm>
-          <a:prstGeom prst="rect">
-            <a:avLst/>
-          </a:prstGeom>
-        </p:spPr>
-        <p:style>
-          <a:lnRef idx="2">
-            <a:schemeClr val="accent1">
-              <a:shade val="15000"/>
-            </a:schemeClr>
-          </a:lnRef>
-          <a:fillRef idx="1">
-            <a:schemeClr val="accent1"/>
-          </a:fillRef>
-          <a:effectRef idx="0">
-            <a:schemeClr val="accent1"/>
-          </a:effectRef>
-          <a:fontRef idx="minor">
-            <a:schemeClr val="lt1"/>
-          </a:fontRef>
-        </p:style>
-        <p:txBody>
-          <a:bodyPr rtlCol="0" anchor="ctr"/>
-          <a:lstStyle/>
-          <a:p>
-            <a:pPr algn="ctr"/>
-            <a:endParaRPr lang="en-GB"/>
-          </a:p>
-        </p:txBody>
-      </p:sp>
-      <p:sp>
-        <p:nvSpPr>
-          <p:cNvPr id="5" name="Rectangle 4">
-            <a:extLst>
-              <a:ext uri="{FF2B5EF4-FFF2-40B4-BE49-F238E27FC236}">
-                <a16:creationId xmlns:a16="http://schemas.microsoft.com/office/drawing/2014/main" id="{CD2803DB-E044-51FC-403D-F08AE77A7E99}"/>
-              </a:ext>
-            </a:extLst>
-          </p:cNvPr>
-          <p:cNvSpPr/>
-          <p:nvPr/>
-        </p:nvSpPr>
-        <p:spPr>
-          <a:xfrm>
-            <a:off x="10210799" y="126219"/>
-            <a:ext cx="1851238" cy="807813"/>
-          </a:xfrm>
-          <a:prstGeom prst="rect">
-            <a:avLst/>
-          </a:prstGeom>
-          <a:solidFill>
-            <a:schemeClr val="bg1"/>
-          </a:solidFill>
-          <a:ln>
-            <a:solidFill>
-              <a:schemeClr val="bg1"/>
-            </a:solidFill>
-          </a:ln>
-        </p:spPr>
-        <p:style>
-          <a:lnRef idx="2">
-            <a:schemeClr val="accent1">
-              <a:shade val="15000"/>
-            </a:schemeClr>
-          </a:lnRef>
-          <a:fillRef idx="1">
-            <a:schemeClr val="accent1"/>
-          </a:fillRef>
-          <a:effectRef idx="0">
-            <a:schemeClr val="accent1"/>
-          </a:effectRef>
-          <a:fontRef idx="minor">
-            <a:schemeClr val="lt1"/>
-          </a:fontRef>
-        </p:style>
-        <p:txBody>
-          <a:bodyPr rtlCol="0" anchor="ctr"/>
-          <a:lstStyle/>
-          <a:p>
-            <a:pPr algn="ctr"/>
-            <a:r>
-              <a:rPr lang="en-GB" dirty="0">
-                <a:ln>
-                  <a:solidFill>
-                    <a:schemeClr val="tx1"/>
-                  </a:solidFill>
-                </a:ln>
-                <a:solidFill>
-                  <a:sysClr val="windowText" lastClr="000000"/>
-                </a:solidFill>
-              </a:rPr>
-              <a:t>My account</a:t>
-            </a:r>
-          </a:p>
-        </p:txBody>
-      </p:sp>
-      <p:sp>
-        <p:nvSpPr>
-          <p:cNvPr id="7" name="Rectangle 6">
-            <a:extLst>
-              <a:ext uri="{FF2B5EF4-FFF2-40B4-BE49-F238E27FC236}">
-                <a16:creationId xmlns:a16="http://schemas.microsoft.com/office/drawing/2014/main" id="{1B235E0F-009B-1013-6831-46A3F03BD58E}"/>
-              </a:ext>
-            </a:extLst>
-          </p:cNvPr>
-          <p:cNvSpPr/>
-          <p:nvPr/>
-        </p:nvSpPr>
-        <p:spPr>
-          <a:xfrm>
-            <a:off x="2163516" y="126216"/>
-            <a:ext cx="1684816" cy="807813"/>
-          </a:xfrm>
-          <a:prstGeom prst="rect">
-            <a:avLst/>
-          </a:prstGeom>
-          <a:solidFill>
-            <a:schemeClr val="bg1"/>
-          </a:solidFill>
-          <a:ln>
-            <a:solidFill>
-              <a:schemeClr val="bg1"/>
-            </a:solidFill>
-          </a:ln>
-        </p:spPr>
-        <p:style>
-          <a:lnRef idx="2">
-            <a:schemeClr val="accent1">
-              <a:shade val="15000"/>
-            </a:schemeClr>
-          </a:lnRef>
-          <a:fillRef idx="1">
-            <a:schemeClr val="accent1"/>
-          </a:fillRef>
-          <a:effectRef idx="0">
-            <a:schemeClr val="accent1"/>
-          </a:effectRef>
-          <a:fontRef idx="minor">
-            <a:schemeClr val="lt1"/>
-          </a:fontRef>
-        </p:style>
-        <p:txBody>
-          <a:bodyPr rtlCol="0" anchor="ctr"/>
-          <a:lstStyle/>
-          <a:p>
-            <a:pPr algn="ctr"/>
-            <a:r>
-              <a:rPr lang="en-GB" dirty="0">
-                <a:ln>
-                  <a:solidFill>
-                    <a:schemeClr val="tx1"/>
-                  </a:solidFill>
-                </a:ln>
-                <a:solidFill>
-                  <a:sysClr val="windowText" lastClr="000000"/>
-                </a:solidFill>
-              </a:rPr>
-              <a:t>Add stock</a:t>
-            </a:r>
-          </a:p>
-        </p:txBody>
-      </p:sp>
-      <p:sp>
-        <p:nvSpPr>
-          <p:cNvPr id="10" name="Rectangle 9">
-            <a:extLst>
-              <a:ext uri="{FF2B5EF4-FFF2-40B4-BE49-F238E27FC236}">
-                <a16:creationId xmlns:a16="http://schemas.microsoft.com/office/drawing/2014/main" id="{F1057B64-A798-249A-5611-A65D107D054E}"/>
-              </a:ext>
-            </a:extLst>
-          </p:cNvPr>
-          <p:cNvSpPr/>
-          <p:nvPr/>
-        </p:nvSpPr>
-        <p:spPr>
-          <a:xfrm>
-            <a:off x="4226530" y="126217"/>
-            <a:ext cx="1742314" cy="807813"/>
-          </a:xfrm>
-          <a:prstGeom prst="rect">
-            <a:avLst/>
-          </a:prstGeom>
-          <a:solidFill>
-            <a:schemeClr val="bg1"/>
-          </a:solidFill>
-          <a:ln>
-            <a:solidFill>
-              <a:schemeClr val="bg1"/>
-            </a:solidFill>
-          </a:ln>
-        </p:spPr>
-        <p:style>
-          <a:lnRef idx="2">
-            <a:schemeClr val="accent1">
-              <a:shade val="15000"/>
-            </a:schemeClr>
-          </a:lnRef>
-          <a:fillRef idx="1">
-            <a:schemeClr val="accent1"/>
-          </a:fillRef>
-          <a:effectRef idx="0">
-            <a:schemeClr val="accent1"/>
-          </a:effectRef>
-          <a:fontRef idx="minor">
-            <a:schemeClr val="lt1"/>
-          </a:fontRef>
-        </p:style>
-        <p:txBody>
-          <a:bodyPr rtlCol="0" anchor="ctr"/>
-          <a:lstStyle/>
-          <a:p>
-            <a:pPr algn="ctr"/>
-            <a:r>
-              <a:rPr lang="en-GB" dirty="0">
-                <a:ln>
-                  <a:solidFill>
-                    <a:schemeClr val="tx1"/>
-                  </a:solidFill>
-                </a:ln>
-                <a:solidFill>
-                  <a:sysClr val="windowText" lastClr="000000"/>
-                </a:solidFill>
-              </a:rPr>
-              <a:t>Generate barcodes</a:t>
-            </a:r>
-          </a:p>
-        </p:txBody>
-      </p:sp>
-      <p:sp>
-        <p:nvSpPr>
-          <p:cNvPr id="11" name="Rectangle 10">
-            <a:extLst>
-              <a:ext uri="{FF2B5EF4-FFF2-40B4-BE49-F238E27FC236}">
-                <a16:creationId xmlns:a16="http://schemas.microsoft.com/office/drawing/2014/main" id="{ADDEAA7B-FEE5-32EE-3E35-D027BA8F5919}"/>
-              </a:ext>
-            </a:extLst>
-          </p:cNvPr>
-          <p:cNvSpPr/>
-          <p:nvPr/>
-        </p:nvSpPr>
-        <p:spPr>
-          <a:xfrm>
-            <a:off x="6287670" y="126218"/>
-            <a:ext cx="1594122" cy="807813"/>
-          </a:xfrm>
-          <a:prstGeom prst="rect">
-            <a:avLst/>
-          </a:prstGeom>
-          <a:solidFill>
-            <a:schemeClr val="bg1"/>
-          </a:solidFill>
-          <a:ln>
-            <a:solidFill>
-              <a:schemeClr val="bg1"/>
-            </a:solidFill>
-          </a:ln>
-        </p:spPr>
-        <p:style>
-          <a:lnRef idx="2">
-            <a:schemeClr val="accent1">
-              <a:shade val="15000"/>
-            </a:schemeClr>
-          </a:lnRef>
-          <a:fillRef idx="1">
-            <a:schemeClr val="accent1"/>
-          </a:fillRef>
-          <a:effectRef idx="0">
-            <a:schemeClr val="accent1"/>
-          </a:effectRef>
-          <a:fontRef idx="minor">
-            <a:schemeClr val="lt1"/>
-          </a:fontRef>
-        </p:style>
-        <p:txBody>
-          <a:bodyPr rtlCol="0" anchor="ctr"/>
-          <a:lstStyle/>
-          <a:p>
-            <a:pPr algn="ctr"/>
-            <a:r>
-              <a:rPr lang="en-GB" dirty="0">
-                <a:ln>
-                  <a:solidFill>
-                    <a:schemeClr val="tx1"/>
-                  </a:solidFill>
-                </a:ln>
-                <a:solidFill>
-                  <a:sysClr val="windowText" lastClr="000000"/>
-                </a:solidFill>
-              </a:rPr>
-              <a:t>Checkout system</a:t>
-            </a:r>
-          </a:p>
-        </p:txBody>
-      </p:sp>
-      <p:sp>
-        <p:nvSpPr>
-          <p:cNvPr id="14" name="Rectangle 13">
-            <a:extLst>
-              <a:ext uri="{FF2B5EF4-FFF2-40B4-BE49-F238E27FC236}">
-                <a16:creationId xmlns:a16="http://schemas.microsoft.com/office/drawing/2014/main" id="{97F62398-4A97-5D3B-8996-A9D3A1BDEE7B}"/>
-              </a:ext>
-            </a:extLst>
-          </p:cNvPr>
-          <p:cNvSpPr/>
-          <p:nvPr/>
-        </p:nvSpPr>
-        <p:spPr>
-          <a:xfrm>
-            <a:off x="8258584" y="126219"/>
-            <a:ext cx="1676400" cy="807813"/>
-          </a:xfrm>
-          <a:prstGeom prst="rect">
-            <a:avLst/>
-          </a:prstGeom>
-          <a:solidFill>
-            <a:schemeClr val="bg1"/>
-          </a:solidFill>
-          <a:ln>
-            <a:solidFill>
-              <a:schemeClr val="bg1"/>
-            </a:solidFill>
-          </a:ln>
-        </p:spPr>
-        <p:style>
-          <a:lnRef idx="2">
-            <a:schemeClr val="accent1">
-              <a:shade val="15000"/>
-            </a:schemeClr>
-          </a:lnRef>
-          <a:fillRef idx="1">
-            <a:schemeClr val="accent1"/>
-          </a:fillRef>
-          <a:effectRef idx="0">
-            <a:schemeClr val="accent1"/>
-          </a:effectRef>
-          <a:fontRef idx="minor">
-            <a:schemeClr val="lt1"/>
-          </a:fontRef>
-        </p:style>
-        <p:txBody>
-          <a:bodyPr rtlCol="0" anchor="ctr"/>
-          <a:lstStyle/>
-          <a:p>
-            <a:pPr algn="ctr"/>
-            <a:r>
-              <a:rPr lang="en-GB" dirty="0">
-                <a:ln>
-                  <a:solidFill>
-                    <a:schemeClr val="tx1"/>
-                  </a:solidFill>
-                </a:ln>
-                <a:solidFill>
-                  <a:sysClr val="windowText" lastClr="000000"/>
-                </a:solidFill>
-              </a:rPr>
-              <a:t>View orders</a:t>
-            </a:r>
-          </a:p>
-        </p:txBody>
-      </p:sp>
-      <p:sp>
-        <p:nvSpPr>
-          <p:cNvPr id="16" name="Rectangle 15">
-            <a:extLst>
-              <a:ext uri="{FF2B5EF4-FFF2-40B4-BE49-F238E27FC236}">
-                <a16:creationId xmlns:a16="http://schemas.microsoft.com/office/drawing/2014/main" id="{BB745BDA-0EA4-B1EE-2C07-92B3FA6BD789}"/>
-              </a:ext>
-            </a:extLst>
-          </p:cNvPr>
-          <p:cNvSpPr/>
-          <p:nvPr/>
-        </p:nvSpPr>
-        <p:spPr>
-          <a:xfrm>
-            <a:off x="159874" y="126215"/>
-            <a:ext cx="1684816" cy="807813"/>
-          </a:xfrm>
-          <a:prstGeom prst="rect">
-            <a:avLst/>
-          </a:prstGeom>
-          <a:solidFill>
-            <a:schemeClr val="bg1"/>
-          </a:solidFill>
-          <a:ln>
-            <a:solidFill>
-              <a:schemeClr val="bg1"/>
-            </a:solidFill>
-          </a:ln>
-        </p:spPr>
-        <p:style>
-          <a:lnRef idx="2">
-            <a:schemeClr val="accent1">
-              <a:shade val="15000"/>
-            </a:schemeClr>
-          </a:lnRef>
-          <a:fillRef idx="1">
-            <a:schemeClr val="accent1"/>
-          </a:fillRef>
-          <a:effectRef idx="0">
-            <a:schemeClr val="accent1"/>
-          </a:effectRef>
-          <a:fontRef idx="minor">
-            <a:schemeClr val="lt1"/>
-          </a:fontRef>
-        </p:style>
-        <p:txBody>
-          <a:bodyPr rtlCol="0" anchor="ctr"/>
-          <a:lstStyle/>
-          <a:p>
-            <a:pPr algn="ctr"/>
-            <a:r>
-              <a:rPr lang="en-GB" dirty="0">
-                <a:ln>
-                  <a:solidFill>
-                    <a:schemeClr val="tx1"/>
-                  </a:solidFill>
-                </a:ln>
-                <a:solidFill>
-                  <a:sysClr val="windowText" lastClr="000000"/>
-                </a:solidFill>
-              </a:rPr>
-              <a:t>Home</a:t>
-            </a:r>
-          </a:p>
-        </p:txBody>
-      </p:sp>
-      <p:sp>
-        <p:nvSpPr>
-          <p:cNvPr id="2" name="TextBox 1">
-            <a:extLst>
-              <a:ext uri="{FF2B5EF4-FFF2-40B4-BE49-F238E27FC236}">
-                <a16:creationId xmlns:a16="http://schemas.microsoft.com/office/drawing/2014/main" id="{82D2EE23-0245-02D2-692A-541BFCB47CB5}"/>
-              </a:ext>
-            </a:extLst>
-          </p:cNvPr>
-          <p:cNvSpPr txBox="1"/>
-          <p:nvPr/>
-        </p:nvSpPr>
-        <p:spPr>
-          <a:xfrm>
-            <a:off x="1157401" y="2228717"/>
-            <a:ext cx="1632456" cy="369332"/>
-          </a:xfrm>
-          <a:prstGeom prst="rect">
-            <a:avLst/>
-          </a:prstGeom>
-          <a:noFill/>
-        </p:spPr>
-        <p:txBody>
-          <a:bodyPr wrap="square" rtlCol="0">
-            <a:spAutoFit/>
-          </a:bodyPr>
+          <p:cNvPr id="2" name="Title 1">
+            <a:extLst>
+              <a:ext uri="{FF2B5EF4-FFF2-40B4-BE49-F238E27FC236}">
+                <a16:creationId xmlns:a16="http://schemas.microsoft.com/office/drawing/2014/main" id="{587A13A3-98F1-A632-56E3-7D2561130BE8}"/>
+              </a:ext>
+            </a:extLst>
+          </p:cNvPr>
+          <p:cNvSpPr>
+            <a:spLocks noGrp="1"/>
+          </p:cNvSpPr>
+          <p:nvPr>
+            <p:ph type="title"/>
+          </p:nvPr>
+        </p:nvSpPr>
+        <p:spPr/>
+        <p:txBody>
+          <a:bodyPr/>
           <a:lstStyle/>
           <a:p>
             <a:r>
               <a:rPr lang="en-GB" dirty="0"/>
-              <a:t>Scan barcode:</a:t>
-            </a:r>
-          </a:p>
-        </p:txBody>
-      </p:sp>
-      <p:sp>
-        <p:nvSpPr>
-          <p:cNvPr id="3" name="TextBox 2">
-            <a:extLst>
-              <a:ext uri="{FF2B5EF4-FFF2-40B4-BE49-F238E27FC236}">
-                <a16:creationId xmlns:a16="http://schemas.microsoft.com/office/drawing/2014/main" id="{62EF5EF7-39DB-8388-BFAA-4FFC0FA573D9}"/>
-              </a:ext>
-            </a:extLst>
-          </p:cNvPr>
-          <p:cNvSpPr txBox="1"/>
-          <p:nvPr/>
-        </p:nvSpPr>
-        <p:spPr>
-          <a:xfrm>
-            <a:off x="8156979" y="1951672"/>
-            <a:ext cx="3253693" cy="2031325"/>
-          </a:xfrm>
-          <a:prstGeom prst="rect">
-            <a:avLst/>
-          </a:prstGeom>
-          <a:noFill/>
-        </p:spPr>
-        <p:txBody>
-          <a:bodyPr wrap="square" rtlCol="0">
-            <a:spAutoFit/>
-          </a:bodyPr>
-          <a:lstStyle/>
-          <a:p>
-            <a:r>
-              <a:rPr lang="en-GB" dirty="0"/>
-              <a:t>Basket:</a:t>
-            </a:r>
-          </a:p>
-          <a:p>
-            <a:endParaRPr lang="en-GB" dirty="0"/>
-          </a:p>
-          <a:p>
-            <a:endParaRPr lang="en-GB" dirty="0"/>
-          </a:p>
-          <a:p>
-            <a:endParaRPr lang="en-GB" dirty="0"/>
-          </a:p>
-          <a:p>
-            <a:r>
-              <a:rPr lang="en-GB" dirty="0"/>
-              <a:t>Basket items</a:t>
-            </a:r>
-          </a:p>
-          <a:p>
-            <a:endParaRPr lang="en-GB" dirty="0"/>
-          </a:p>
-          <a:p>
-            <a:r>
-              <a:rPr lang="en-GB" dirty="0"/>
-              <a:t>Total:</a:t>
-            </a:r>
-          </a:p>
-        </p:txBody>
-      </p:sp>
-      <p:sp>
-        <p:nvSpPr>
-          <p:cNvPr id="6" name="TextBox 5">
-            <a:extLst>
-              <a:ext uri="{FF2B5EF4-FFF2-40B4-BE49-F238E27FC236}">
-                <a16:creationId xmlns:a16="http://schemas.microsoft.com/office/drawing/2014/main" id="{04754E8D-4641-913F-D2F9-62BFF7410B44}"/>
-              </a:ext>
-            </a:extLst>
-          </p:cNvPr>
-          <p:cNvSpPr txBox="1"/>
-          <p:nvPr/>
-        </p:nvSpPr>
-        <p:spPr>
-          <a:xfrm>
-            <a:off x="2212606" y="4181122"/>
-            <a:ext cx="2013924" cy="369332"/>
-          </a:xfrm>
-          <a:prstGeom prst="rect">
-            <a:avLst/>
-          </a:prstGeom>
-          <a:noFill/>
-          <a:ln>
-            <a:solidFill>
-              <a:schemeClr val="tx1"/>
-            </a:solidFill>
-          </a:ln>
-        </p:spPr>
-        <p:txBody>
-          <a:bodyPr wrap="square" rtlCol="0">
-            <a:spAutoFit/>
-          </a:bodyPr>
-          <a:lstStyle/>
-          <a:p>
-            <a:r>
-              <a:rPr lang="en-GB" dirty="0"/>
-              <a:t>Or input manually</a:t>
-            </a:r>
-          </a:p>
-        </p:txBody>
-      </p:sp>
-      <p:sp>
-        <p:nvSpPr>
-          <p:cNvPr id="9" name="TextBox 8">
-            <a:extLst>
-              <a:ext uri="{FF2B5EF4-FFF2-40B4-BE49-F238E27FC236}">
-                <a16:creationId xmlns:a16="http://schemas.microsoft.com/office/drawing/2014/main" id="{F48FE565-16D5-D9B7-51C1-0A8C47774451}"/>
-              </a:ext>
-            </a:extLst>
-          </p:cNvPr>
-          <p:cNvSpPr txBox="1"/>
-          <p:nvPr/>
-        </p:nvSpPr>
-        <p:spPr>
-          <a:xfrm>
-            <a:off x="2789857" y="2228717"/>
-            <a:ext cx="1852179" cy="369332"/>
-          </a:xfrm>
-          <a:prstGeom prst="rect">
-            <a:avLst/>
-          </a:prstGeom>
-          <a:noFill/>
-          <a:ln>
-            <a:solidFill>
-              <a:schemeClr val="tx1"/>
-            </a:solidFill>
-          </a:ln>
-        </p:spPr>
-        <p:txBody>
-          <a:bodyPr wrap="square" rtlCol="0">
-            <a:spAutoFit/>
-          </a:bodyPr>
-          <a:lstStyle/>
-          <a:p>
-            <a:endParaRPr lang="en-GB" dirty="0"/>
-          </a:p>
-        </p:txBody>
-      </p:sp>
-      <p:sp>
-        <p:nvSpPr>
-          <p:cNvPr id="8" name="TextBox 7">
-            <a:extLst>
-              <a:ext uri="{FF2B5EF4-FFF2-40B4-BE49-F238E27FC236}">
-                <a16:creationId xmlns:a16="http://schemas.microsoft.com/office/drawing/2014/main" id="{99624F69-1760-CB19-EACC-85B2BFCE50DD}"/>
-              </a:ext>
-            </a:extLst>
-          </p:cNvPr>
-          <p:cNvSpPr txBox="1"/>
-          <p:nvPr/>
-        </p:nvSpPr>
-        <p:spPr>
-          <a:xfrm>
-            <a:off x="2402566" y="3390206"/>
-            <a:ext cx="1632456" cy="369332"/>
-          </a:xfrm>
-          <a:prstGeom prst="rect">
-            <a:avLst/>
-          </a:prstGeom>
-          <a:noFill/>
-          <a:ln>
-            <a:solidFill>
-              <a:schemeClr val="tx1"/>
-            </a:solidFill>
-          </a:ln>
-        </p:spPr>
-        <p:txBody>
-          <a:bodyPr wrap="square" rtlCol="0">
-            <a:spAutoFit/>
-          </a:bodyPr>
-          <a:lstStyle/>
-          <a:p>
-            <a:r>
-              <a:rPr lang="en-GB" dirty="0"/>
-              <a:t>Add to basket</a:t>
-            </a:r>
-          </a:p>
-        </p:txBody>
-      </p:sp>
-      <p:sp>
-        <p:nvSpPr>
-          <p:cNvPr id="13" name="TextBox 12">
-            <a:extLst>
-              <a:ext uri="{FF2B5EF4-FFF2-40B4-BE49-F238E27FC236}">
-                <a16:creationId xmlns:a16="http://schemas.microsoft.com/office/drawing/2014/main" id="{DF7A66E9-9C9D-A36B-C703-554723CE452A}"/>
-              </a:ext>
-            </a:extLst>
-          </p:cNvPr>
-          <p:cNvSpPr txBox="1"/>
-          <p:nvPr/>
-        </p:nvSpPr>
-        <p:spPr>
-          <a:xfrm>
-            <a:off x="9241584" y="4449191"/>
-            <a:ext cx="1386799" cy="646331"/>
-          </a:xfrm>
-          <a:prstGeom prst="rect">
-            <a:avLst/>
-          </a:prstGeom>
-          <a:noFill/>
-          <a:ln>
-            <a:solidFill>
-              <a:schemeClr val="tx1"/>
-            </a:solidFill>
-          </a:ln>
-        </p:spPr>
-        <p:txBody>
-          <a:bodyPr wrap="square" rtlCol="0">
-            <a:spAutoFit/>
-          </a:bodyPr>
-          <a:lstStyle/>
-          <a:p>
-            <a:r>
-              <a:rPr lang="en-GB" dirty="0"/>
-              <a:t>Complete transaction</a:t>
+              <a:t>Checkout system (barcode)</a:t>
             </a:r>
           </a:p>
         </p:txBody>
@@ -11820,7 +13876,7 @@
     </p:spTree>
     <p:extLst>
       <p:ext uri="{BB962C8B-B14F-4D97-AF65-F5344CB8AC3E}">
-        <p14:creationId xmlns:p14="http://schemas.microsoft.com/office/powerpoint/2010/main" val="1154686776"/>
+        <p14:creationId xmlns:p14="http://schemas.microsoft.com/office/powerpoint/2010/main" val="560281624"/>
       </p:ext>
     </p:extLst>
   </p:cSld>
@@ -11849,6 +13905,729 @@
       </p:grpSpPr>
       <p:sp>
         <p:nvSpPr>
+          <p:cNvPr id="4" name="Rectangle 3">
+            <a:extLst>
+              <a:ext uri="{FF2B5EF4-FFF2-40B4-BE49-F238E27FC236}">
+                <a16:creationId xmlns:a16="http://schemas.microsoft.com/office/drawing/2014/main" id="{9DF92B7C-3248-8476-5639-82C1CDFBFA0C}"/>
+              </a:ext>
+            </a:extLst>
+          </p:cNvPr>
+          <p:cNvSpPr/>
+          <p:nvPr/>
+        </p:nvSpPr>
+        <p:spPr>
+          <a:xfrm>
+            <a:off x="0" y="0"/>
+            <a:ext cx="12192000" cy="1060255"/>
+          </a:xfrm>
+          <a:prstGeom prst="rect">
+            <a:avLst/>
+          </a:prstGeom>
+        </p:spPr>
+        <p:style>
+          <a:lnRef idx="2">
+            <a:schemeClr val="accent1">
+              <a:shade val="15000"/>
+            </a:schemeClr>
+          </a:lnRef>
+          <a:fillRef idx="1">
+            <a:schemeClr val="accent1"/>
+          </a:fillRef>
+          <a:effectRef idx="0">
+            <a:schemeClr val="accent1"/>
+          </a:effectRef>
+          <a:fontRef idx="minor">
+            <a:schemeClr val="lt1"/>
+          </a:fontRef>
+        </p:style>
+        <p:txBody>
+          <a:bodyPr rtlCol="0" anchor="ctr"/>
+          <a:lstStyle/>
+          <a:p>
+            <a:pPr algn="ctr"/>
+            <a:endParaRPr lang="en-GB"/>
+          </a:p>
+        </p:txBody>
+      </p:sp>
+      <p:sp>
+        <p:nvSpPr>
+          <p:cNvPr id="5" name="Rectangle 4">
+            <a:extLst>
+              <a:ext uri="{FF2B5EF4-FFF2-40B4-BE49-F238E27FC236}">
+                <a16:creationId xmlns:a16="http://schemas.microsoft.com/office/drawing/2014/main" id="{CD2803DB-E044-51FC-403D-F08AE77A7E99}"/>
+              </a:ext>
+            </a:extLst>
+          </p:cNvPr>
+          <p:cNvSpPr/>
+          <p:nvPr/>
+        </p:nvSpPr>
+        <p:spPr>
+          <a:xfrm>
+            <a:off x="10210799" y="126219"/>
+            <a:ext cx="1851238" cy="807813"/>
+          </a:xfrm>
+          <a:prstGeom prst="rect">
+            <a:avLst/>
+          </a:prstGeom>
+          <a:solidFill>
+            <a:schemeClr val="bg1"/>
+          </a:solidFill>
+          <a:ln>
+            <a:solidFill>
+              <a:schemeClr val="bg1"/>
+            </a:solidFill>
+          </a:ln>
+        </p:spPr>
+        <p:style>
+          <a:lnRef idx="2">
+            <a:schemeClr val="accent1">
+              <a:shade val="15000"/>
+            </a:schemeClr>
+          </a:lnRef>
+          <a:fillRef idx="1">
+            <a:schemeClr val="accent1"/>
+          </a:fillRef>
+          <a:effectRef idx="0">
+            <a:schemeClr val="accent1"/>
+          </a:effectRef>
+          <a:fontRef idx="minor">
+            <a:schemeClr val="lt1"/>
+          </a:fontRef>
+        </p:style>
+        <p:txBody>
+          <a:bodyPr rtlCol="0" anchor="ctr"/>
+          <a:lstStyle/>
+          <a:p>
+            <a:pPr algn="ctr"/>
+            <a:r>
+              <a:rPr lang="en-GB" dirty="0">
+                <a:ln>
+                  <a:solidFill>
+                    <a:schemeClr val="tx1"/>
+                  </a:solidFill>
+                </a:ln>
+                <a:solidFill>
+                  <a:sysClr val="windowText" lastClr="000000"/>
+                </a:solidFill>
+              </a:rPr>
+              <a:t>My account</a:t>
+            </a:r>
+          </a:p>
+        </p:txBody>
+      </p:sp>
+      <p:sp>
+        <p:nvSpPr>
+          <p:cNvPr id="7" name="Rectangle 6">
+            <a:extLst>
+              <a:ext uri="{FF2B5EF4-FFF2-40B4-BE49-F238E27FC236}">
+                <a16:creationId xmlns:a16="http://schemas.microsoft.com/office/drawing/2014/main" id="{1B235E0F-009B-1013-6831-46A3F03BD58E}"/>
+              </a:ext>
+            </a:extLst>
+          </p:cNvPr>
+          <p:cNvSpPr/>
+          <p:nvPr/>
+        </p:nvSpPr>
+        <p:spPr>
+          <a:xfrm>
+            <a:off x="2163516" y="126216"/>
+            <a:ext cx="1684816" cy="807813"/>
+          </a:xfrm>
+          <a:prstGeom prst="rect">
+            <a:avLst/>
+          </a:prstGeom>
+          <a:solidFill>
+            <a:schemeClr val="bg1"/>
+          </a:solidFill>
+          <a:ln>
+            <a:solidFill>
+              <a:schemeClr val="bg1"/>
+            </a:solidFill>
+          </a:ln>
+        </p:spPr>
+        <p:style>
+          <a:lnRef idx="2">
+            <a:schemeClr val="accent1">
+              <a:shade val="15000"/>
+            </a:schemeClr>
+          </a:lnRef>
+          <a:fillRef idx="1">
+            <a:schemeClr val="accent1"/>
+          </a:fillRef>
+          <a:effectRef idx="0">
+            <a:schemeClr val="accent1"/>
+          </a:effectRef>
+          <a:fontRef idx="minor">
+            <a:schemeClr val="lt1"/>
+          </a:fontRef>
+        </p:style>
+        <p:txBody>
+          <a:bodyPr rtlCol="0" anchor="ctr"/>
+          <a:lstStyle/>
+          <a:p>
+            <a:pPr algn="ctr"/>
+            <a:r>
+              <a:rPr lang="en-GB" dirty="0">
+                <a:ln>
+                  <a:solidFill>
+                    <a:schemeClr val="tx1"/>
+                  </a:solidFill>
+                </a:ln>
+                <a:solidFill>
+                  <a:sysClr val="windowText" lastClr="000000"/>
+                </a:solidFill>
+              </a:rPr>
+              <a:t>Add stock</a:t>
+            </a:r>
+          </a:p>
+        </p:txBody>
+      </p:sp>
+      <p:sp>
+        <p:nvSpPr>
+          <p:cNvPr id="10" name="Rectangle 9">
+            <a:extLst>
+              <a:ext uri="{FF2B5EF4-FFF2-40B4-BE49-F238E27FC236}">
+                <a16:creationId xmlns:a16="http://schemas.microsoft.com/office/drawing/2014/main" id="{F1057B64-A798-249A-5611-A65D107D054E}"/>
+              </a:ext>
+            </a:extLst>
+          </p:cNvPr>
+          <p:cNvSpPr/>
+          <p:nvPr/>
+        </p:nvSpPr>
+        <p:spPr>
+          <a:xfrm>
+            <a:off x="4226530" y="126217"/>
+            <a:ext cx="1742314" cy="807813"/>
+          </a:xfrm>
+          <a:prstGeom prst="rect">
+            <a:avLst/>
+          </a:prstGeom>
+          <a:solidFill>
+            <a:schemeClr val="bg1"/>
+          </a:solidFill>
+          <a:ln>
+            <a:solidFill>
+              <a:schemeClr val="bg1"/>
+            </a:solidFill>
+          </a:ln>
+        </p:spPr>
+        <p:style>
+          <a:lnRef idx="2">
+            <a:schemeClr val="accent1">
+              <a:shade val="15000"/>
+            </a:schemeClr>
+          </a:lnRef>
+          <a:fillRef idx="1">
+            <a:schemeClr val="accent1"/>
+          </a:fillRef>
+          <a:effectRef idx="0">
+            <a:schemeClr val="accent1"/>
+          </a:effectRef>
+          <a:fontRef idx="minor">
+            <a:schemeClr val="lt1"/>
+          </a:fontRef>
+        </p:style>
+        <p:txBody>
+          <a:bodyPr rtlCol="0" anchor="ctr"/>
+          <a:lstStyle/>
+          <a:p>
+            <a:pPr algn="ctr"/>
+            <a:r>
+              <a:rPr lang="en-GB" dirty="0">
+                <a:ln>
+                  <a:solidFill>
+                    <a:schemeClr val="tx1"/>
+                  </a:solidFill>
+                </a:ln>
+                <a:solidFill>
+                  <a:sysClr val="windowText" lastClr="000000"/>
+                </a:solidFill>
+              </a:rPr>
+              <a:t>Generate barcodes</a:t>
+            </a:r>
+          </a:p>
+        </p:txBody>
+      </p:sp>
+      <p:sp>
+        <p:nvSpPr>
+          <p:cNvPr id="11" name="Rectangle 10">
+            <a:extLst>
+              <a:ext uri="{FF2B5EF4-FFF2-40B4-BE49-F238E27FC236}">
+                <a16:creationId xmlns:a16="http://schemas.microsoft.com/office/drawing/2014/main" id="{ADDEAA7B-FEE5-32EE-3E35-D027BA8F5919}"/>
+              </a:ext>
+            </a:extLst>
+          </p:cNvPr>
+          <p:cNvSpPr/>
+          <p:nvPr/>
+        </p:nvSpPr>
+        <p:spPr>
+          <a:xfrm>
+            <a:off x="6287670" y="126218"/>
+            <a:ext cx="1594122" cy="807813"/>
+          </a:xfrm>
+          <a:prstGeom prst="rect">
+            <a:avLst/>
+          </a:prstGeom>
+          <a:solidFill>
+            <a:schemeClr val="bg1"/>
+          </a:solidFill>
+          <a:ln>
+            <a:solidFill>
+              <a:schemeClr val="bg1"/>
+            </a:solidFill>
+          </a:ln>
+        </p:spPr>
+        <p:style>
+          <a:lnRef idx="2">
+            <a:schemeClr val="accent1">
+              <a:shade val="15000"/>
+            </a:schemeClr>
+          </a:lnRef>
+          <a:fillRef idx="1">
+            <a:schemeClr val="accent1"/>
+          </a:fillRef>
+          <a:effectRef idx="0">
+            <a:schemeClr val="accent1"/>
+          </a:effectRef>
+          <a:fontRef idx="minor">
+            <a:schemeClr val="lt1"/>
+          </a:fontRef>
+        </p:style>
+        <p:txBody>
+          <a:bodyPr rtlCol="0" anchor="ctr"/>
+          <a:lstStyle/>
+          <a:p>
+            <a:pPr algn="ctr"/>
+            <a:r>
+              <a:rPr lang="en-GB" dirty="0">
+                <a:ln>
+                  <a:solidFill>
+                    <a:schemeClr val="tx1"/>
+                  </a:solidFill>
+                </a:ln>
+                <a:solidFill>
+                  <a:sysClr val="windowText" lastClr="000000"/>
+                </a:solidFill>
+              </a:rPr>
+              <a:t>Checkout system</a:t>
+            </a:r>
+          </a:p>
+        </p:txBody>
+      </p:sp>
+      <p:sp>
+        <p:nvSpPr>
+          <p:cNvPr id="14" name="Rectangle 13">
+            <a:extLst>
+              <a:ext uri="{FF2B5EF4-FFF2-40B4-BE49-F238E27FC236}">
+                <a16:creationId xmlns:a16="http://schemas.microsoft.com/office/drawing/2014/main" id="{97F62398-4A97-5D3B-8996-A9D3A1BDEE7B}"/>
+              </a:ext>
+            </a:extLst>
+          </p:cNvPr>
+          <p:cNvSpPr/>
+          <p:nvPr/>
+        </p:nvSpPr>
+        <p:spPr>
+          <a:xfrm>
+            <a:off x="8258584" y="126219"/>
+            <a:ext cx="1676400" cy="807813"/>
+          </a:xfrm>
+          <a:prstGeom prst="rect">
+            <a:avLst/>
+          </a:prstGeom>
+          <a:solidFill>
+            <a:schemeClr val="bg1"/>
+          </a:solidFill>
+          <a:ln>
+            <a:solidFill>
+              <a:schemeClr val="bg1"/>
+            </a:solidFill>
+          </a:ln>
+        </p:spPr>
+        <p:style>
+          <a:lnRef idx="2">
+            <a:schemeClr val="accent1">
+              <a:shade val="15000"/>
+            </a:schemeClr>
+          </a:lnRef>
+          <a:fillRef idx="1">
+            <a:schemeClr val="accent1"/>
+          </a:fillRef>
+          <a:effectRef idx="0">
+            <a:schemeClr val="accent1"/>
+          </a:effectRef>
+          <a:fontRef idx="minor">
+            <a:schemeClr val="lt1"/>
+          </a:fontRef>
+        </p:style>
+        <p:txBody>
+          <a:bodyPr rtlCol="0" anchor="ctr"/>
+          <a:lstStyle/>
+          <a:p>
+            <a:pPr algn="ctr"/>
+            <a:r>
+              <a:rPr lang="en-GB" dirty="0">
+                <a:ln>
+                  <a:solidFill>
+                    <a:schemeClr val="tx1"/>
+                  </a:solidFill>
+                </a:ln>
+                <a:solidFill>
+                  <a:sysClr val="windowText" lastClr="000000"/>
+                </a:solidFill>
+              </a:rPr>
+              <a:t>View orders</a:t>
+            </a:r>
+          </a:p>
+        </p:txBody>
+      </p:sp>
+      <p:sp>
+        <p:nvSpPr>
+          <p:cNvPr id="16" name="Rectangle 15">
+            <a:extLst>
+              <a:ext uri="{FF2B5EF4-FFF2-40B4-BE49-F238E27FC236}">
+                <a16:creationId xmlns:a16="http://schemas.microsoft.com/office/drawing/2014/main" id="{BB745BDA-0EA4-B1EE-2C07-92B3FA6BD789}"/>
+              </a:ext>
+            </a:extLst>
+          </p:cNvPr>
+          <p:cNvSpPr/>
+          <p:nvPr/>
+        </p:nvSpPr>
+        <p:spPr>
+          <a:xfrm>
+            <a:off x="159874" y="126215"/>
+            <a:ext cx="1684816" cy="807813"/>
+          </a:xfrm>
+          <a:prstGeom prst="rect">
+            <a:avLst/>
+          </a:prstGeom>
+          <a:solidFill>
+            <a:schemeClr val="bg1"/>
+          </a:solidFill>
+          <a:ln>
+            <a:solidFill>
+              <a:schemeClr val="bg1"/>
+            </a:solidFill>
+          </a:ln>
+        </p:spPr>
+        <p:style>
+          <a:lnRef idx="2">
+            <a:schemeClr val="accent1">
+              <a:shade val="15000"/>
+            </a:schemeClr>
+          </a:lnRef>
+          <a:fillRef idx="1">
+            <a:schemeClr val="accent1"/>
+          </a:fillRef>
+          <a:effectRef idx="0">
+            <a:schemeClr val="accent1"/>
+          </a:effectRef>
+          <a:fontRef idx="minor">
+            <a:schemeClr val="lt1"/>
+          </a:fontRef>
+        </p:style>
+        <p:txBody>
+          <a:bodyPr rtlCol="0" anchor="ctr"/>
+          <a:lstStyle/>
+          <a:p>
+            <a:pPr algn="ctr"/>
+            <a:r>
+              <a:rPr lang="en-GB" dirty="0">
+                <a:ln>
+                  <a:solidFill>
+                    <a:schemeClr val="tx1"/>
+                  </a:solidFill>
+                </a:ln>
+                <a:solidFill>
+                  <a:sysClr val="windowText" lastClr="000000"/>
+                </a:solidFill>
+              </a:rPr>
+              <a:t>Home</a:t>
+            </a:r>
+          </a:p>
+        </p:txBody>
+      </p:sp>
+      <p:sp>
+        <p:nvSpPr>
+          <p:cNvPr id="2" name="TextBox 1">
+            <a:extLst>
+              <a:ext uri="{FF2B5EF4-FFF2-40B4-BE49-F238E27FC236}">
+                <a16:creationId xmlns:a16="http://schemas.microsoft.com/office/drawing/2014/main" id="{82D2EE23-0245-02D2-692A-541BFCB47CB5}"/>
+              </a:ext>
+            </a:extLst>
+          </p:cNvPr>
+          <p:cNvSpPr txBox="1"/>
+          <p:nvPr/>
+        </p:nvSpPr>
+        <p:spPr>
+          <a:xfrm>
+            <a:off x="1157401" y="2228717"/>
+            <a:ext cx="1632456" cy="369332"/>
+          </a:xfrm>
+          <a:prstGeom prst="rect">
+            <a:avLst/>
+          </a:prstGeom>
+          <a:noFill/>
+        </p:spPr>
+        <p:txBody>
+          <a:bodyPr wrap="square" rtlCol="0">
+            <a:spAutoFit/>
+          </a:bodyPr>
+          <a:lstStyle/>
+          <a:p>
+            <a:r>
+              <a:rPr lang="en-GB" dirty="0"/>
+              <a:t>Scan barcode:</a:t>
+            </a:r>
+          </a:p>
+        </p:txBody>
+      </p:sp>
+      <p:sp>
+        <p:nvSpPr>
+          <p:cNvPr id="3" name="TextBox 2">
+            <a:extLst>
+              <a:ext uri="{FF2B5EF4-FFF2-40B4-BE49-F238E27FC236}">
+                <a16:creationId xmlns:a16="http://schemas.microsoft.com/office/drawing/2014/main" id="{62EF5EF7-39DB-8388-BFAA-4FFC0FA573D9}"/>
+              </a:ext>
+            </a:extLst>
+          </p:cNvPr>
+          <p:cNvSpPr txBox="1"/>
+          <p:nvPr/>
+        </p:nvSpPr>
+        <p:spPr>
+          <a:xfrm>
+            <a:off x="8156979" y="1951672"/>
+            <a:ext cx="3253693" cy="2031325"/>
+          </a:xfrm>
+          <a:prstGeom prst="rect">
+            <a:avLst/>
+          </a:prstGeom>
+          <a:noFill/>
+        </p:spPr>
+        <p:txBody>
+          <a:bodyPr wrap="square" rtlCol="0">
+            <a:spAutoFit/>
+          </a:bodyPr>
+          <a:lstStyle/>
+          <a:p>
+            <a:r>
+              <a:rPr lang="en-GB" dirty="0"/>
+              <a:t>Basket:</a:t>
+            </a:r>
+          </a:p>
+          <a:p>
+            <a:endParaRPr lang="en-GB" dirty="0"/>
+          </a:p>
+          <a:p>
+            <a:endParaRPr lang="en-GB" dirty="0"/>
+          </a:p>
+          <a:p>
+            <a:endParaRPr lang="en-GB" dirty="0"/>
+          </a:p>
+          <a:p>
+            <a:r>
+              <a:rPr lang="en-GB" dirty="0"/>
+              <a:t>Basket items</a:t>
+            </a:r>
+          </a:p>
+          <a:p>
+            <a:endParaRPr lang="en-GB" dirty="0"/>
+          </a:p>
+          <a:p>
+            <a:r>
+              <a:rPr lang="en-GB" dirty="0"/>
+              <a:t>Total:</a:t>
+            </a:r>
+          </a:p>
+        </p:txBody>
+      </p:sp>
+      <p:sp>
+        <p:nvSpPr>
+          <p:cNvPr id="6" name="TextBox 5">
+            <a:extLst>
+              <a:ext uri="{FF2B5EF4-FFF2-40B4-BE49-F238E27FC236}">
+                <a16:creationId xmlns:a16="http://schemas.microsoft.com/office/drawing/2014/main" id="{04754E8D-4641-913F-D2F9-62BFF7410B44}"/>
+              </a:ext>
+            </a:extLst>
+          </p:cNvPr>
+          <p:cNvSpPr txBox="1"/>
+          <p:nvPr/>
+        </p:nvSpPr>
+        <p:spPr>
+          <a:xfrm>
+            <a:off x="2212606" y="4181122"/>
+            <a:ext cx="2013924" cy="369332"/>
+          </a:xfrm>
+          <a:prstGeom prst="rect">
+            <a:avLst/>
+          </a:prstGeom>
+          <a:noFill/>
+          <a:ln>
+            <a:solidFill>
+              <a:schemeClr val="tx1"/>
+            </a:solidFill>
+          </a:ln>
+        </p:spPr>
+        <p:txBody>
+          <a:bodyPr wrap="square" rtlCol="0">
+            <a:spAutoFit/>
+          </a:bodyPr>
+          <a:lstStyle/>
+          <a:p>
+            <a:r>
+              <a:rPr lang="en-GB" dirty="0"/>
+              <a:t>Or input manually</a:t>
+            </a:r>
+          </a:p>
+        </p:txBody>
+      </p:sp>
+      <p:sp>
+        <p:nvSpPr>
+          <p:cNvPr id="9" name="TextBox 8">
+            <a:extLst>
+              <a:ext uri="{FF2B5EF4-FFF2-40B4-BE49-F238E27FC236}">
+                <a16:creationId xmlns:a16="http://schemas.microsoft.com/office/drawing/2014/main" id="{F48FE565-16D5-D9B7-51C1-0A8C47774451}"/>
+              </a:ext>
+            </a:extLst>
+          </p:cNvPr>
+          <p:cNvSpPr txBox="1"/>
+          <p:nvPr/>
+        </p:nvSpPr>
+        <p:spPr>
+          <a:xfrm>
+            <a:off x="2789857" y="2228717"/>
+            <a:ext cx="1852179" cy="369332"/>
+          </a:xfrm>
+          <a:prstGeom prst="rect">
+            <a:avLst/>
+          </a:prstGeom>
+          <a:noFill/>
+          <a:ln>
+            <a:solidFill>
+              <a:schemeClr val="tx1"/>
+            </a:solidFill>
+          </a:ln>
+        </p:spPr>
+        <p:txBody>
+          <a:bodyPr wrap="square" rtlCol="0">
+            <a:spAutoFit/>
+          </a:bodyPr>
+          <a:lstStyle/>
+          <a:p>
+            <a:endParaRPr lang="en-GB" dirty="0"/>
+          </a:p>
+        </p:txBody>
+      </p:sp>
+      <p:sp>
+        <p:nvSpPr>
+          <p:cNvPr id="8" name="TextBox 7">
+            <a:extLst>
+              <a:ext uri="{FF2B5EF4-FFF2-40B4-BE49-F238E27FC236}">
+                <a16:creationId xmlns:a16="http://schemas.microsoft.com/office/drawing/2014/main" id="{99624F69-1760-CB19-EACC-85B2BFCE50DD}"/>
+              </a:ext>
+            </a:extLst>
+          </p:cNvPr>
+          <p:cNvSpPr txBox="1"/>
+          <p:nvPr/>
+        </p:nvSpPr>
+        <p:spPr>
+          <a:xfrm>
+            <a:off x="2402566" y="3390206"/>
+            <a:ext cx="1632456" cy="369332"/>
+          </a:xfrm>
+          <a:prstGeom prst="rect">
+            <a:avLst/>
+          </a:prstGeom>
+          <a:noFill/>
+          <a:ln>
+            <a:solidFill>
+              <a:schemeClr val="tx1"/>
+            </a:solidFill>
+          </a:ln>
+        </p:spPr>
+        <p:txBody>
+          <a:bodyPr wrap="square" rtlCol="0">
+            <a:spAutoFit/>
+          </a:bodyPr>
+          <a:lstStyle/>
+          <a:p>
+            <a:r>
+              <a:rPr lang="en-GB" dirty="0"/>
+              <a:t>Add to basket</a:t>
+            </a:r>
+          </a:p>
+        </p:txBody>
+      </p:sp>
+      <p:sp>
+        <p:nvSpPr>
+          <p:cNvPr id="13" name="TextBox 12">
+            <a:extLst>
+              <a:ext uri="{FF2B5EF4-FFF2-40B4-BE49-F238E27FC236}">
+                <a16:creationId xmlns:a16="http://schemas.microsoft.com/office/drawing/2014/main" id="{DF7A66E9-9C9D-A36B-C703-554723CE452A}"/>
+              </a:ext>
+            </a:extLst>
+          </p:cNvPr>
+          <p:cNvSpPr txBox="1"/>
+          <p:nvPr/>
+        </p:nvSpPr>
+        <p:spPr>
+          <a:xfrm>
+            <a:off x="9241584" y="4449191"/>
+            <a:ext cx="1386799" cy="646331"/>
+          </a:xfrm>
+          <a:prstGeom prst="rect">
+            <a:avLst/>
+          </a:prstGeom>
+          <a:noFill/>
+          <a:ln>
+            <a:solidFill>
+              <a:schemeClr val="tx1"/>
+            </a:solidFill>
+          </a:ln>
+        </p:spPr>
+        <p:txBody>
+          <a:bodyPr wrap="square" rtlCol="0">
+            <a:spAutoFit/>
+          </a:bodyPr>
+          <a:lstStyle/>
+          <a:p>
+            <a:r>
+              <a:rPr lang="en-GB" dirty="0"/>
+              <a:t>Complete transaction</a:t>
+            </a:r>
+          </a:p>
+        </p:txBody>
+      </p:sp>
+    </p:spTree>
+    <p:extLst>
+      <p:ext uri="{BB962C8B-B14F-4D97-AF65-F5344CB8AC3E}">
+        <p14:creationId xmlns:p14="http://schemas.microsoft.com/office/powerpoint/2010/main" val="1154686776"/>
+      </p:ext>
+    </p:extLst>
+  </p:cSld>
+  <p:clrMapOvr>
+    <a:masterClrMapping/>
+  </p:clrMapOvr>
+</p:sld>
+</file>
+
+<file path=ppt/slides/slide25.xml><?xml version="1.0" encoding="utf-8"?>
+<p:sld xmlns:a="http://schemas.openxmlformats.org/drawingml/2006/main" xmlns:r="http://schemas.openxmlformats.org/officeDocument/2006/relationships" xmlns:p="http://schemas.openxmlformats.org/presentationml/2006/main">
+  <p:cSld>
+    <p:spTree>
+      <p:nvGrpSpPr>
+        <p:cNvPr id="1" name=""/>
+        <p:cNvGrpSpPr/>
+        <p:nvPr/>
+      </p:nvGrpSpPr>
+      <p:grpSpPr>
+        <a:xfrm>
+          <a:off x="0" y="0"/>
+          <a:ext cx="0" cy="0"/>
+          <a:chOff x="0" y="0"/>
+          <a:chExt cx="0" cy="0"/>
+        </a:xfrm>
+      </p:grpSpPr>
+      <p:sp>
+        <p:nvSpPr>
           <p:cNvPr id="2" name="Title 1">
             <a:extLst>
               <a:ext uri="{FF2B5EF4-FFF2-40B4-BE49-F238E27FC236}">
@@ -11888,7 +14667,7 @@
 </p:sld>
 </file>
 
-<file path=ppt/slides/slide25.xml><?xml version="1.0" encoding="utf-8"?>
+<file path=ppt/slides/slide26.xml><?xml version="1.0" encoding="utf-8"?>
 <p:sld xmlns:a="http://schemas.openxmlformats.org/drawingml/2006/main" xmlns:r="http://schemas.openxmlformats.org/officeDocument/2006/relationships" xmlns:p="http://schemas.openxmlformats.org/presentationml/2006/main">
   <p:cSld>
     <p:spTree>

</xml_diff>

<commit_message>
work on checkout system
</commit_message>
<xml_diff>
--- a/Writeup/Page designs.pptx
+++ b/Writeup/Page designs.pptx
@@ -222,7 +222,7 @@
           <a:p>
             <a:fld id="{E9CC816A-2BD1-4061-B4C6-11C98283D186}" type="datetimeFigureOut">
               <a:rPr lang="en-GB" smtClean="0"/>
-              <a:t>24/08/2024</a:t>
+              <a:t>27/12/2024</a:t>
             </a:fld>
             <a:endParaRPr lang="en-GB"/>
           </a:p>
@@ -1647,7 +1647,7 @@
           <a:p>
             <a:fld id="{3CBDC1A8-91DF-46E5-9524-B8D429E478EA}" type="datetimeFigureOut">
               <a:rPr lang="en-GB" smtClean="0"/>
-              <a:t>24/08/2024</a:t>
+              <a:t>27/12/2024</a:t>
             </a:fld>
             <a:endParaRPr lang="en-GB"/>
           </a:p>
@@ -1847,7 +1847,7 @@
           <a:p>
             <a:fld id="{3CBDC1A8-91DF-46E5-9524-B8D429E478EA}" type="datetimeFigureOut">
               <a:rPr lang="en-GB" smtClean="0"/>
-              <a:t>24/08/2024</a:t>
+              <a:t>27/12/2024</a:t>
             </a:fld>
             <a:endParaRPr lang="en-GB"/>
           </a:p>
@@ -2057,7 +2057,7 @@
           <a:p>
             <a:fld id="{3CBDC1A8-91DF-46E5-9524-B8D429E478EA}" type="datetimeFigureOut">
               <a:rPr lang="en-GB" smtClean="0"/>
-              <a:t>24/08/2024</a:t>
+              <a:t>27/12/2024</a:t>
             </a:fld>
             <a:endParaRPr lang="en-GB"/>
           </a:p>
@@ -2257,7 +2257,7 @@
           <a:p>
             <a:fld id="{3CBDC1A8-91DF-46E5-9524-B8D429E478EA}" type="datetimeFigureOut">
               <a:rPr lang="en-GB" smtClean="0"/>
-              <a:t>24/08/2024</a:t>
+              <a:t>27/12/2024</a:t>
             </a:fld>
             <a:endParaRPr lang="en-GB"/>
           </a:p>
@@ -2533,7 +2533,7 @@
           <a:p>
             <a:fld id="{3CBDC1A8-91DF-46E5-9524-B8D429E478EA}" type="datetimeFigureOut">
               <a:rPr lang="en-GB" smtClean="0"/>
-              <a:t>24/08/2024</a:t>
+              <a:t>27/12/2024</a:t>
             </a:fld>
             <a:endParaRPr lang="en-GB"/>
           </a:p>
@@ -2801,7 +2801,7 @@
           <a:p>
             <a:fld id="{3CBDC1A8-91DF-46E5-9524-B8D429E478EA}" type="datetimeFigureOut">
               <a:rPr lang="en-GB" smtClean="0"/>
-              <a:t>24/08/2024</a:t>
+              <a:t>27/12/2024</a:t>
             </a:fld>
             <a:endParaRPr lang="en-GB"/>
           </a:p>
@@ -3216,7 +3216,7 @@
           <a:p>
             <a:fld id="{3CBDC1A8-91DF-46E5-9524-B8D429E478EA}" type="datetimeFigureOut">
               <a:rPr lang="en-GB" smtClean="0"/>
-              <a:t>24/08/2024</a:t>
+              <a:t>27/12/2024</a:t>
             </a:fld>
             <a:endParaRPr lang="en-GB"/>
           </a:p>
@@ -3358,7 +3358,7 @@
           <a:p>
             <a:fld id="{3CBDC1A8-91DF-46E5-9524-B8D429E478EA}" type="datetimeFigureOut">
               <a:rPr lang="en-GB" smtClean="0"/>
-              <a:t>24/08/2024</a:t>
+              <a:t>27/12/2024</a:t>
             </a:fld>
             <a:endParaRPr lang="en-GB"/>
           </a:p>
@@ -3471,7 +3471,7 @@
           <a:p>
             <a:fld id="{3CBDC1A8-91DF-46E5-9524-B8D429E478EA}" type="datetimeFigureOut">
               <a:rPr lang="en-GB" smtClean="0"/>
-              <a:t>24/08/2024</a:t>
+              <a:t>27/12/2024</a:t>
             </a:fld>
             <a:endParaRPr lang="en-GB"/>
           </a:p>
@@ -3784,7 +3784,7 @@
           <a:p>
             <a:fld id="{3CBDC1A8-91DF-46E5-9524-B8D429E478EA}" type="datetimeFigureOut">
               <a:rPr lang="en-GB" smtClean="0"/>
-              <a:t>24/08/2024</a:t>
+              <a:t>27/12/2024</a:t>
             </a:fld>
             <a:endParaRPr lang="en-GB"/>
           </a:p>
@@ -4073,7 +4073,7 @@
           <a:p>
             <a:fld id="{3CBDC1A8-91DF-46E5-9524-B8D429E478EA}" type="datetimeFigureOut">
               <a:rPr lang="en-GB" smtClean="0"/>
-              <a:t>24/08/2024</a:t>
+              <a:t>27/12/2024</a:t>
             </a:fld>
             <a:endParaRPr lang="en-GB"/>
           </a:p>
@@ -4316,7 +4316,7 @@
           <a:p>
             <a:fld id="{3CBDC1A8-91DF-46E5-9524-B8D429E478EA}" type="datetimeFigureOut">
               <a:rPr lang="en-GB" smtClean="0"/>
-              <a:t>24/08/2024</a:t>
+              <a:t>27/12/2024</a:t>
             </a:fld>
             <a:endParaRPr lang="en-GB"/>
           </a:p>
@@ -14359,7 +14359,7 @@
         </p:nvSpPr>
         <p:spPr>
           <a:xfrm>
-            <a:off x="1157401" y="2228717"/>
+            <a:off x="310319" y="1819201"/>
             <a:ext cx="1632456" cy="369332"/>
           </a:xfrm>
           <a:prstGeom prst="rect">
@@ -14441,10 +14441,10 @@
       </p:sp>
       <p:sp>
         <p:nvSpPr>
-          <p:cNvPr id="6" name="TextBox 5">
-            <a:extLst>
-              <a:ext uri="{FF2B5EF4-FFF2-40B4-BE49-F238E27FC236}">
-                <a16:creationId xmlns:a16="http://schemas.microsoft.com/office/drawing/2014/main" id="{04754E8D-4641-913F-D2F9-62BFF7410B44}"/>
+          <p:cNvPr id="9" name="TextBox 8">
+            <a:extLst>
+              <a:ext uri="{FF2B5EF4-FFF2-40B4-BE49-F238E27FC236}">
+                <a16:creationId xmlns:a16="http://schemas.microsoft.com/office/drawing/2014/main" id="{F48FE565-16D5-D9B7-51C1-0A8C47774451}"/>
               </a:ext>
             </a:extLst>
           </p:cNvPr>
@@ -14453,8 +14453,8 @@
         </p:nvSpPr>
         <p:spPr>
           <a:xfrm>
-            <a:off x="2212606" y="4181122"/>
-            <a:ext cx="2013924" cy="369332"/>
+            <a:off x="1942775" y="1819201"/>
+            <a:ext cx="1852179" cy="369332"/>
           </a:xfrm>
           <a:prstGeom prst="rect">
             <a:avLst/>
@@ -14472,19 +14472,16 @@
           </a:bodyPr>
           <a:lstStyle/>
           <a:p>
-            <a:r>
-              <a:rPr lang="en-GB" dirty="0"/>
-              <a:t>Or input manually</a:t>
-            </a:r>
-          </a:p>
-        </p:txBody>
-      </p:sp>
-      <p:sp>
-        <p:nvSpPr>
-          <p:cNvPr id="9" name="TextBox 8">
-            <a:extLst>
-              <a:ext uri="{FF2B5EF4-FFF2-40B4-BE49-F238E27FC236}">
-                <a16:creationId xmlns:a16="http://schemas.microsoft.com/office/drawing/2014/main" id="{F48FE565-16D5-D9B7-51C1-0A8C47774451}"/>
+            <a:endParaRPr lang="en-GB" dirty="0"/>
+          </a:p>
+        </p:txBody>
+      </p:sp>
+      <p:sp>
+        <p:nvSpPr>
+          <p:cNvPr id="8" name="TextBox 7">
+            <a:extLst>
+              <a:ext uri="{FF2B5EF4-FFF2-40B4-BE49-F238E27FC236}">
+                <a16:creationId xmlns:a16="http://schemas.microsoft.com/office/drawing/2014/main" id="{99624F69-1760-CB19-EACC-85B2BFCE50DD}"/>
               </a:ext>
             </a:extLst>
           </p:cNvPr>
@@ -14493,44 +14490,7 @@
         </p:nvSpPr>
         <p:spPr>
           <a:xfrm>
-            <a:off x="2789857" y="2228717"/>
-            <a:ext cx="1852179" cy="369332"/>
-          </a:xfrm>
-          <a:prstGeom prst="rect">
-            <a:avLst/>
-          </a:prstGeom>
-          <a:noFill/>
-          <a:ln>
-            <a:solidFill>
-              <a:schemeClr val="tx1"/>
-            </a:solidFill>
-          </a:ln>
-        </p:spPr>
-        <p:txBody>
-          <a:bodyPr wrap="square" rtlCol="0">
-            <a:spAutoFit/>
-          </a:bodyPr>
-          <a:lstStyle/>
-          <a:p>
-            <a:endParaRPr lang="en-GB" dirty="0"/>
-          </a:p>
-        </p:txBody>
-      </p:sp>
-      <p:sp>
-        <p:nvSpPr>
-          <p:cNvPr id="8" name="TextBox 7">
-            <a:extLst>
-              <a:ext uri="{FF2B5EF4-FFF2-40B4-BE49-F238E27FC236}">
-                <a16:creationId xmlns:a16="http://schemas.microsoft.com/office/drawing/2014/main" id="{99624F69-1760-CB19-EACC-85B2BFCE50DD}"/>
-              </a:ext>
-            </a:extLst>
-          </p:cNvPr>
-          <p:cNvSpPr txBox="1"/>
-          <p:nvPr/>
-        </p:nvSpPr>
-        <p:spPr>
-          <a:xfrm>
-            <a:off x="2402566" y="3390206"/>
+            <a:off x="1126547" y="2862884"/>
             <a:ext cx="1632456" cy="369332"/>
           </a:xfrm>
           <a:prstGeom prst="rect">

</xml_diff>